<commit_message>
some ideas for slides
</commit_message>
<xml_diff>
--- a/CLE1_T3G5/present.pptx
+++ b/CLE1_T3G5/present.pptx
@@ -3814,25 +3814,1085 @@
       </p:sp>
       <p:sp>
         <p:nvSpPr>
-          <p:cNvPr id="3" name="Marcador de Posição de Conteúdo 2">
+          <p:cNvPr id="5" name="Retângulo 4">
             <a:extLst>
               <a:ext uri="{FF2B5EF4-FFF2-40B4-BE49-F238E27FC236}">
-                <a16:creationId xmlns:a16="http://schemas.microsoft.com/office/drawing/2014/main" id="{2D745695-6161-41A4-A2E0-37169F11F70A}"/>
+                <a16:creationId xmlns:a16="http://schemas.microsoft.com/office/drawing/2014/main" id="{29F7720A-1671-452A-9D05-6045B26559AD}"/>
               </a:ext>
             </a:extLst>
           </p:cNvPr>
-          <p:cNvSpPr>
-            <a:spLocks noGrp="1"/>
-          </p:cNvSpPr>
-          <p:nvPr>
-            <p:ph idx="1"/>
-          </p:nvPr>
-        </p:nvSpPr>
-        <p:spPr/>
-        <p:txBody>
-          <a:bodyPr/>
-          <a:lstStyle/>
-          <a:p>
+          <p:cNvSpPr/>
+          <p:nvPr/>
+        </p:nvSpPr>
+        <p:spPr>
+          <a:xfrm>
+            <a:off x="8446124" y="2015732"/>
+            <a:ext cx="2608730" cy="2188716"/>
+          </a:xfrm>
+          <a:prstGeom prst="rect">
+            <a:avLst/>
+          </a:prstGeom>
+          <a:solidFill>
+            <a:schemeClr val="dk1">
+              <a:alpha val="50000"/>
+            </a:schemeClr>
+          </a:solidFill>
+          <a:ln w="38100">
+            <a:solidFill>
+              <a:schemeClr val="tx1"/>
+            </a:solidFill>
+          </a:ln>
+        </p:spPr>
+        <p:style>
+          <a:lnRef idx="0">
+            <a:scrgbClr r="0" g="0" b="0"/>
+          </a:lnRef>
+          <a:fillRef idx="0">
+            <a:scrgbClr r="0" g="0" b="0"/>
+          </a:fillRef>
+          <a:effectRef idx="0">
+            <a:scrgbClr r="0" g="0" b="0"/>
+          </a:effectRef>
+          <a:fontRef idx="minor">
+            <a:schemeClr val="lt1"/>
+          </a:fontRef>
+        </p:style>
+        <p:txBody>
+          <a:bodyPr rtlCol="0" anchor="ctr"/>
+          <a:lstStyle/>
+          <a:p>
+            <a:pPr algn="ctr"/>
+            <a:endParaRPr lang="pt-PT" dirty="0"/>
+          </a:p>
+        </p:txBody>
+      </p:sp>
+      <p:sp>
+        <p:nvSpPr>
+          <p:cNvPr id="6" name="CaixaDeTexto 5">
+            <a:extLst>
+              <a:ext uri="{FF2B5EF4-FFF2-40B4-BE49-F238E27FC236}">
+                <a16:creationId xmlns:a16="http://schemas.microsoft.com/office/drawing/2014/main" id="{F7E58B08-A09D-49A3-BEEC-69277A084225}"/>
+              </a:ext>
+            </a:extLst>
+          </p:cNvPr>
+          <p:cNvSpPr txBox="1"/>
+          <p:nvPr/>
+        </p:nvSpPr>
+        <p:spPr>
+          <a:xfrm>
+            <a:off x="8446123" y="2033659"/>
+            <a:ext cx="2608729" cy="369332"/>
+          </a:xfrm>
+          <a:prstGeom prst="rect">
+            <a:avLst/>
+          </a:prstGeom>
+          <a:noFill/>
+        </p:spPr>
+        <p:txBody>
+          <a:bodyPr wrap="square" rtlCol="0">
+            <a:spAutoFit/>
+          </a:bodyPr>
+          <a:lstStyle/>
+          <a:p>
+            <a:pPr algn="ctr"/>
+            <a:r>
+              <a:rPr lang="pt-PT" dirty="0" err="1">
+                <a:solidFill>
+                  <a:schemeClr val="bg1"/>
+                </a:solidFill>
+              </a:rPr>
+              <a:t>SharedMemory</a:t>
+            </a:r>
+            <a:endParaRPr lang="pt-PT" dirty="0">
+              <a:solidFill>
+                <a:schemeClr val="bg1"/>
+              </a:solidFill>
+            </a:endParaRPr>
+          </a:p>
+        </p:txBody>
+      </p:sp>
+      <p:sp>
+        <p:nvSpPr>
+          <p:cNvPr id="7" name="CaixaDeTexto 6">
+            <a:extLst>
+              <a:ext uri="{FF2B5EF4-FFF2-40B4-BE49-F238E27FC236}">
+                <a16:creationId xmlns:a16="http://schemas.microsoft.com/office/drawing/2014/main" id="{717FB2EE-FF16-4062-967A-B8DA6211FFAC}"/>
+              </a:ext>
+            </a:extLst>
+          </p:cNvPr>
+          <p:cNvSpPr txBox="1"/>
+          <p:nvPr/>
+        </p:nvSpPr>
+        <p:spPr>
+          <a:xfrm>
+            <a:off x="8446124" y="2533784"/>
+            <a:ext cx="2608728" cy="1600438"/>
+          </a:xfrm>
+          <a:prstGeom prst="rect">
+            <a:avLst/>
+          </a:prstGeom>
+          <a:noFill/>
+        </p:spPr>
+        <p:txBody>
+          <a:bodyPr wrap="square" rtlCol="0">
+            <a:spAutoFit/>
+          </a:bodyPr>
+          <a:lstStyle/>
+          <a:p>
+            <a:pPr marL="285750" indent="-285750">
+              <a:buFont typeface="Arial" panose="020B0604020202020204" pitchFamily="34" charset="0"/>
+              <a:buChar char="•"/>
+            </a:pPr>
+            <a:r>
+              <a:rPr lang="pt-PT" sz="1400" dirty="0" err="1">
+                <a:solidFill>
+                  <a:schemeClr val="bg1"/>
+                </a:solidFill>
+              </a:rPr>
+              <a:t>struct</a:t>
+            </a:r>
+            <a:r>
+              <a:rPr lang="pt-PT" sz="1400" dirty="0">
+                <a:solidFill>
+                  <a:schemeClr val="bg1"/>
+                </a:solidFill>
+              </a:rPr>
+              <a:t> </a:t>
+            </a:r>
+            <a:r>
+              <a:rPr lang="pt-PT" sz="1400" dirty="0" err="1">
+                <a:solidFill>
+                  <a:schemeClr val="bg1"/>
+                </a:solidFill>
+              </a:rPr>
+              <a:t>FileResult</a:t>
+            </a:r>
+            <a:r>
+              <a:rPr lang="pt-PT" sz="1400" dirty="0">
+                <a:solidFill>
+                  <a:schemeClr val="bg1"/>
+                </a:solidFill>
+              </a:rPr>
+              <a:t>* </a:t>
+            </a:r>
+            <a:r>
+              <a:rPr lang="pt-PT" sz="1400" dirty="0" err="1">
+                <a:solidFill>
+                  <a:schemeClr val="bg1"/>
+                </a:solidFill>
+              </a:rPr>
+              <a:t>fileResults</a:t>
+            </a:r>
+            <a:endParaRPr lang="pt-PT" sz="1400" dirty="0">
+              <a:solidFill>
+                <a:schemeClr val="bg1"/>
+              </a:solidFill>
+            </a:endParaRPr>
+          </a:p>
+          <a:p>
+            <a:pPr marL="285750" indent="-285750">
+              <a:buFont typeface="Arial" panose="020B0604020202020204" pitchFamily="34" charset="0"/>
+              <a:buChar char="•"/>
+            </a:pPr>
+            <a:r>
+              <a:rPr lang="pt-PT" sz="1400" dirty="0" err="1">
+                <a:solidFill>
+                  <a:schemeClr val="bg1"/>
+                </a:solidFill>
+              </a:rPr>
+              <a:t>char</a:t>
+            </a:r>
+            <a:r>
+              <a:rPr lang="pt-PT" sz="1400" dirty="0">
+                <a:solidFill>
+                  <a:schemeClr val="bg1"/>
+                </a:solidFill>
+              </a:rPr>
+              <a:t>** </a:t>
+            </a:r>
+            <a:r>
+              <a:rPr lang="pt-PT" sz="1400" dirty="0" err="1">
+                <a:solidFill>
+                  <a:schemeClr val="bg1"/>
+                </a:solidFill>
+              </a:rPr>
+              <a:t>fileNames</a:t>
+            </a:r>
+            <a:endParaRPr lang="pt-PT" sz="1400" dirty="0">
+              <a:solidFill>
+                <a:schemeClr val="bg1"/>
+              </a:solidFill>
+            </a:endParaRPr>
+          </a:p>
+          <a:p>
+            <a:pPr marL="285750" indent="-285750">
+              <a:buFont typeface="Arial" panose="020B0604020202020204" pitchFamily="34" charset="0"/>
+              <a:buChar char="•"/>
+            </a:pPr>
+            <a:r>
+              <a:rPr lang="pt-PT" sz="1400" dirty="0" err="1">
+                <a:solidFill>
+                  <a:schemeClr val="bg1"/>
+                </a:solidFill>
+              </a:rPr>
+              <a:t>int</a:t>
+            </a:r>
+            <a:r>
+              <a:rPr lang="pt-PT" sz="1400" dirty="0">
+                <a:solidFill>
+                  <a:schemeClr val="bg1"/>
+                </a:solidFill>
+              </a:rPr>
+              <a:t> </a:t>
+            </a:r>
+            <a:r>
+              <a:rPr lang="pt-PT" sz="1400" dirty="0" err="1">
+                <a:solidFill>
+                  <a:schemeClr val="bg1"/>
+                </a:solidFill>
+              </a:rPr>
+              <a:t>fileId</a:t>
+            </a:r>
+            <a:endParaRPr lang="pt-PT" sz="1400" dirty="0">
+              <a:solidFill>
+                <a:schemeClr val="bg1"/>
+              </a:solidFill>
+            </a:endParaRPr>
+          </a:p>
+          <a:p>
+            <a:pPr marL="285750" indent="-285750">
+              <a:buFont typeface="Arial" panose="020B0604020202020204" pitchFamily="34" charset="0"/>
+              <a:buChar char="•"/>
+            </a:pPr>
+            <a:r>
+              <a:rPr lang="pt-PT" sz="1400" dirty="0" err="1">
+                <a:solidFill>
+                  <a:schemeClr val="bg1"/>
+                </a:solidFill>
+              </a:rPr>
+              <a:t>int</a:t>
+            </a:r>
+            <a:r>
+              <a:rPr lang="pt-PT" sz="1400" dirty="0">
+                <a:solidFill>
+                  <a:schemeClr val="bg1"/>
+                </a:solidFill>
+              </a:rPr>
+              <a:t> </a:t>
+            </a:r>
+            <a:r>
+              <a:rPr lang="pt-PT" sz="1400" dirty="0" err="1">
+                <a:solidFill>
+                  <a:schemeClr val="bg1"/>
+                </a:solidFill>
+              </a:rPr>
+              <a:t>totalFiles</a:t>
+            </a:r>
+            <a:endParaRPr lang="pt-PT" sz="1400" dirty="0">
+              <a:solidFill>
+                <a:schemeClr val="bg1"/>
+              </a:solidFill>
+            </a:endParaRPr>
+          </a:p>
+          <a:p>
+            <a:pPr marL="285750" indent="-285750">
+              <a:buFont typeface="Arial" panose="020B0604020202020204" pitchFamily="34" charset="0"/>
+              <a:buChar char="•"/>
+            </a:pPr>
+            <a:r>
+              <a:rPr lang="pt-PT" sz="1400" dirty="0" err="1">
+                <a:solidFill>
+                  <a:schemeClr val="bg1"/>
+                </a:solidFill>
+              </a:rPr>
+              <a:t>int</a:t>
+            </a:r>
+            <a:r>
+              <a:rPr lang="pt-PT" sz="1400" dirty="0">
+                <a:solidFill>
+                  <a:schemeClr val="bg1"/>
+                </a:solidFill>
+              </a:rPr>
+              <a:t> </a:t>
+            </a:r>
+            <a:r>
+              <a:rPr lang="pt-PT" sz="1400" dirty="0" err="1">
+                <a:solidFill>
+                  <a:schemeClr val="bg1"/>
+                </a:solidFill>
+              </a:rPr>
+              <a:t>chunkSize</a:t>
+            </a:r>
+            <a:endParaRPr lang="pt-PT" sz="1400" dirty="0">
+              <a:solidFill>
+                <a:schemeClr val="bg1"/>
+              </a:solidFill>
+            </a:endParaRPr>
+          </a:p>
+          <a:p>
+            <a:pPr marL="285750" indent="-285750">
+              <a:buFont typeface="Arial" panose="020B0604020202020204" pitchFamily="34" charset="0"/>
+              <a:buChar char="•"/>
+            </a:pPr>
+            <a:r>
+              <a:rPr lang="pt-PT" sz="1400" dirty="0" err="1">
+                <a:solidFill>
+                  <a:schemeClr val="bg1"/>
+                </a:solidFill>
+              </a:rPr>
+              <a:t>bool</a:t>
+            </a:r>
+            <a:r>
+              <a:rPr lang="pt-PT" sz="1400" dirty="0">
+                <a:solidFill>
+                  <a:schemeClr val="bg1"/>
+                </a:solidFill>
+              </a:rPr>
+              <a:t> </a:t>
+            </a:r>
+            <a:r>
+              <a:rPr lang="pt-PT" sz="1400" dirty="0" err="1">
+                <a:solidFill>
+                  <a:schemeClr val="bg1"/>
+                </a:solidFill>
+              </a:rPr>
+              <a:t>openFile</a:t>
+            </a:r>
+            <a:endParaRPr lang="pt-PT" sz="1400" dirty="0">
+              <a:solidFill>
+                <a:schemeClr val="bg1"/>
+              </a:solidFill>
+            </a:endParaRPr>
+          </a:p>
+          <a:p>
+            <a:pPr marL="285750" indent="-285750">
+              <a:buFont typeface="Arial" panose="020B0604020202020204" pitchFamily="34" charset="0"/>
+              <a:buChar char="•"/>
+            </a:pPr>
+            <a:r>
+              <a:rPr lang="pt-PT" sz="1400" dirty="0">
+                <a:solidFill>
+                  <a:schemeClr val="bg1"/>
+                </a:solidFill>
+              </a:rPr>
+              <a:t>File* </a:t>
+            </a:r>
+            <a:r>
+              <a:rPr lang="pt-PT" sz="1400" dirty="0" err="1">
+                <a:solidFill>
+                  <a:schemeClr val="bg1"/>
+                </a:solidFill>
+              </a:rPr>
+              <a:t>currentFile</a:t>
+            </a:r>
+            <a:endParaRPr lang="pt-PT" sz="1400" dirty="0">
+              <a:solidFill>
+                <a:schemeClr val="bg1"/>
+              </a:solidFill>
+            </a:endParaRPr>
+          </a:p>
+        </p:txBody>
+      </p:sp>
+      <p:sp>
+        <p:nvSpPr>
+          <p:cNvPr id="12" name="Retângulo 11">
+            <a:extLst>
+              <a:ext uri="{FF2B5EF4-FFF2-40B4-BE49-F238E27FC236}">
+                <a16:creationId xmlns:a16="http://schemas.microsoft.com/office/drawing/2014/main" id="{084C925D-D4F7-43DC-89EE-C59442D43FE5}"/>
+              </a:ext>
+            </a:extLst>
+          </p:cNvPr>
+          <p:cNvSpPr/>
+          <p:nvPr/>
+        </p:nvSpPr>
+        <p:spPr>
+          <a:xfrm>
+            <a:off x="8446124" y="4561709"/>
+            <a:ext cx="2608730" cy="1256384"/>
+          </a:xfrm>
+          <a:prstGeom prst="rect">
+            <a:avLst/>
+          </a:prstGeom>
+          <a:solidFill>
+            <a:schemeClr val="dk1">
+              <a:alpha val="50000"/>
+            </a:schemeClr>
+          </a:solidFill>
+          <a:ln>
+            <a:noFill/>
+          </a:ln>
+        </p:spPr>
+        <p:style>
+          <a:lnRef idx="0">
+            <a:scrgbClr r="0" g="0" b="0"/>
+          </a:lnRef>
+          <a:fillRef idx="0">
+            <a:scrgbClr r="0" g="0" b="0"/>
+          </a:fillRef>
+          <a:effectRef idx="0">
+            <a:scrgbClr r="0" g="0" b="0"/>
+          </a:effectRef>
+          <a:fontRef idx="minor">
+            <a:schemeClr val="lt1"/>
+          </a:fontRef>
+        </p:style>
+        <p:txBody>
+          <a:bodyPr rtlCol="0" anchor="ctr"/>
+          <a:lstStyle/>
+          <a:p>
+            <a:pPr algn="ctr"/>
+            <a:endParaRPr lang="pt-PT" dirty="0"/>
+          </a:p>
+        </p:txBody>
+      </p:sp>
+      <p:sp>
+        <p:nvSpPr>
+          <p:cNvPr id="13" name="CaixaDeTexto 12">
+            <a:extLst>
+              <a:ext uri="{FF2B5EF4-FFF2-40B4-BE49-F238E27FC236}">
+                <a16:creationId xmlns:a16="http://schemas.microsoft.com/office/drawing/2014/main" id="{902ED50C-BB19-4988-A429-E5917976072E}"/>
+              </a:ext>
+            </a:extLst>
+          </p:cNvPr>
+          <p:cNvSpPr txBox="1"/>
+          <p:nvPr/>
+        </p:nvSpPr>
+        <p:spPr>
+          <a:xfrm>
+            <a:off x="8446123" y="4579636"/>
+            <a:ext cx="2608729" cy="369332"/>
+          </a:xfrm>
+          <a:prstGeom prst="rect">
+            <a:avLst/>
+          </a:prstGeom>
+          <a:noFill/>
+        </p:spPr>
+        <p:txBody>
+          <a:bodyPr wrap="square" rtlCol="0">
+            <a:spAutoFit/>
+          </a:bodyPr>
+          <a:lstStyle/>
+          <a:p>
+            <a:pPr algn="ctr"/>
+            <a:r>
+              <a:rPr lang="pt-PT" dirty="0" err="1">
+                <a:solidFill>
+                  <a:schemeClr val="bg1"/>
+                </a:solidFill>
+              </a:rPr>
+              <a:t>FileResults</a:t>
+            </a:r>
+            <a:endParaRPr lang="pt-PT" dirty="0">
+              <a:solidFill>
+                <a:schemeClr val="bg1"/>
+              </a:solidFill>
+            </a:endParaRPr>
+          </a:p>
+        </p:txBody>
+      </p:sp>
+      <p:sp>
+        <p:nvSpPr>
+          <p:cNvPr id="14" name="CaixaDeTexto 13">
+            <a:extLst>
+              <a:ext uri="{FF2B5EF4-FFF2-40B4-BE49-F238E27FC236}">
+                <a16:creationId xmlns:a16="http://schemas.microsoft.com/office/drawing/2014/main" id="{9305E7AD-A7AC-4270-B857-86C147BDBCF8}"/>
+              </a:ext>
+            </a:extLst>
+          </p:cNvPr>
+          <p:cNvSpPr txBox="1"/>
+          <p:nvPr/>
+        </p:nvSpPr>
+        <p:spPr>
+          <a:xfrm>
+            <a:off x="8446124" y="5079761"/>
+            <a:ext cx="2608728" cy="738664"/>
+          </a:xfrm>
+          <a:prstGeom prst="rect">
+            <a:avLst/>
+          </a:prstGeom>
+          <a:noFill/>
+        </p:spPr>
+        <p:txBody>
+          <a:bodyPr wrap="square" rtlCol="0">
+            <a:spAutoFit/>
+          </a:bodyPr>
+          <a:lstStyle/>
+          <a:p>
+            <a:pPr marL="285750" indent="-285750">
+              <a:buFont typeface="Arial" panose="020B0604020202020204" pitchFamily="34" charset="0"/>
+              <a:buChar char="•"/>
+            </a:pPr>
+            <a:r>
+              <a:rPr lang="pt-PT" sz="1400" dirty="0" err="1">
+                <a:solidFill>
+                  <a:schemeClr val="bg1"/>
+                </a:solidFill>
+              </a:rPr>
+              <a:t>int</a:t>
+            </a:r>
+            <a:r>
+              <a:rPr lang="pt-PT" sz="1400" dirty="0">
+                <a:solidFill>
+                  <a:schemeClr val="bg1"/>
+                </a:solidFill>
+              </a:rPr>
+              <a:t> </a:t>
+            </a:r>
+            <a:r>
+              <a:rPr lang="pt-PT" sz="1400" dirty="0" err="1">
+                <a:solidFill>
+                  <a:schemeClr val="bg1"/>
+                </a:solidFill>
+              </a:rPr>
+              <a:t>nWords</a:t>
+            </a:r>
+            <a:endParaRPr lang="pt-PT" sz="1400" dirty="0">
+              <a:solidFill>
+                <a:schemeClr val="bg1"/>
+              </a:solidFill>
+            </a:endParaRPr>
+          </a:p>
+          <a:p>
+            <a:pPr marL="285750" indent="-285750">
+              <a:buFont typeface="Arial" panose="020B0604020202020204" pitchFamily="34" charset="0"/>
+              <a:buChar char="•"/>
+            </a:pPr>
+            <a:r>
+              <a:rPr lang="pt-PT" sz="1400" dirty="0" err="1">
+                <a:solidFill>
+                  <a:schemeClr val="bg1"/>
+                </a:solidFill>
+              </a:rPr>
+              <a:t>int</a:t>
+            </a:r>
+            <a:r>
+              <a:rPr lang="pt-PT" sz="1400" dirty="0">
+                <a:solidFill>
+                  <a:schemeClr val="bg1"/>
+                </a:solidFill>
+              </a:rPr>
+              <a:t> </a:t>
+            </a:r>
+            <a:r>
+              <a:rPr lang="pt-PT" sz="1400" dirty="0" err="1">
+                <a:solidFill>
+                  <a:schemeClr val="bg1"/>
+                </a:solidFill>
+              </a:rPr>
+              <a:t>vowels</a:t>
+            </a:r>
+            <a:r>
+              <a:rPr lang="pt-PT" sz="1400" dirty="0">
+                <a:solidFill>
+                  <a:schemeClr val="bg1"/>
+                </a:solidFill>
+              </a:rPr>
+              <a:t>[6]</a:t>
+            </a:r>
+          </a:p>
+          <a:p>
+            <a:pPr marL="285750" indent="-285750">
+              <a:buFont typeface="Arial" panose="020B0604020202020204" pitchFamily="34" charset="0"/>
+              <a:buChar char="•"/>
+            </a:pPr>
+            <a:r>
+              <a:rPr lang="pt-PT" sz="1400" dirty="0" err="1">
+                <a:solidFill>
+                  <a:schemeClr val="bg1"/>
+                </a:solidFill>
+              </a:rPr>
+              <a:t>char</a:t>
+            </a:r>
+            <a:r>
+              <a:rPr lang="pt-PT" sz="1400" dirty="0">
+                <a:solidFill>
+                  <a:schemeClr val="bg1"/>
+                </a:solidFill>
+              </a:rPr>
+              <a:t>* </a:t>
+            </a:r>
+            <a:r>
+              <a:rPr lang="pt-PT" sz="1400" dirty="0" err="1">
+                <a:solidFill>
+                  <a:schemeClr val="bg1"/>
+                </a:solidFill>
+              </a:rPr>
+              <a:t>fileName</a:t>
+            </a:r>
+            <a:endParaRPr lang="pt-PT" sz="1400" dirty="0">
+              <a:solidFill>
+                <a:schemeClr val="bg1"/>
+              </a:solidFill>
+            </a:endParaRPr>
+          </a:p>
+        </p:txBody>
+      </p:sp>
+      <p:sp>
+        <p:nvSpPr>
+          <p:cNvPr id="15" name="CaixaDeTexto 14">
+            <a:extLst>
+              <a:ext uri="{FF2B5EF4-FFF2-40B4-BE49-F238E27FC236}">
+                <a16:creationId xmlns:a16="http://schemas.microsoft.com/office/drawing/2014/main" id="{76F53E89-4251-4B7E-BFF6-5604277C9C8F}"/>
+              </a:ext>
+            </a:extLst>
+          </p:cNvPr>
+          <p:cNvSpPr txBox="1"/>
+          <p:nvPr/>
+        </p:nvSpPr>
+        <p:spPr>
+          <a:xfrm>
+            <a:off x="2948703" y="2033659"/>
+            <a:ext cx="2439770" cy="369332"/>
+          </a:xfrm>
+          <a:prstGeom prst="rect">
+            <a:avLst/>
+          </a:prstGeom>
+          <a:noFill/>
+        </p:spPr>
+        <p:txBody>
+          <a:bodyPr wrap="square" rtlCol="0">
+            <a:spAutoFit/>
+          </a:bodyPr>
+          <a:lstStyle/>
+          <a:p>
+            <a:pPr algn="ctr"/>
+            <a:r>
+              <a:rPr lang="pt-PT" dirty="0" err="1"/>
+              <a:t>Threads</a:t>
+            </a:r>
+            <a:r>
+              <a:rPr lang="pt-PT" dirty="0"/>
+              <a:t> </a:t>
+            </a:r>
+            <a:r>
+              <a:rPr lang="pt-PT" dirty="0" err="1"/>
+              <a:t>initialization</a:t>
+            </a:r>
+            <a:endParaRPr lang="pt-PT" dirty="0"/>
+          </a:p>
+        </p:txBody>
+      </p:sp>
+      <p:cxnSp>
+        <p:nvCxnSpPr>
+          <p:cNvPr id="17" name="Conexão reta unidirecional 16">
+            <a:extLst>
+              <a:ext uri="{FF2B5EF4-FFF2-40B4-BE49-F238E27FC236}">
+                <a16:creationId xmlns:a16="http://schemas.microsoft.com/office/drawing/2014/main" id="{553E32DC-E45B-44D9-80E9-55F80C45FA56}"/>
+              </a:ext>
+            </a:extLst>
+          </p:cNvPr>
+          <p:cNvCxnSpPr>
+            <a:cxnSpLocks/>
+          </p:cNvCxnSpPr>
+          <p:nvPr/>
+        </p:nvCxnSpPr>
+        <p:spPr>
+          <a:xfrm>
+            <a:off x="4150660" y="2420921"/>
+            <a:ext cx="0" cy="322280"/>
+          </a:xfrm>
+          <a:prstGeom prst="straightConnector1">
+            <a:avLst/>
+          </a:prstGeom>
+          <a:ln>
+            <a:tailEnd type="triangle"/>
+          </a:ln>
+        </p:spPr>
+        <p:style>
+          <a:lnRef idx="1">
+            <a:schemeClr val="accent1"/>
+          </a:lnRef>
+          <a:fillRef idx="0">
+            <a:schemeClr val="accent1"/>
+          </a:fillRef>
+          <a:effectRef idx="0">
+            <a:schemeClr val="accent1"/>
+          </a:effectRef>
+          <a:fontRef idx="minor">
+            <a:schemeClr val="tx1"/>
+          </a:fontRef>
+        </p:style>
+      </p:cxnSp>
+      <p:sp>
+        <p:nvSpPr>
+          <p:cNvPr id="19" name="CaixaDeTexto 18">
+            <a:extLst>
+              <a:ext uri="{FF2B5EF4-FFF2-40B4-BE49-F238E27FC236}">
+                <a16:creationId xmlns:a16="http://schemas.microsoft.com/office/drawing/2014/main" id="{18BF5EFF-4E50-4808-BEBF-076E982D032A}"/>
+              </a:ext>
+            </a:extLst>
+          </p:cNvPr>
+          <p:cNvSpPr txBox="1"/>
+          <p:nvPr/>
+        </p:nvSpPr>
+        <p:spPr>
+          <a:xfrm>
+            <a:off x="2948703" y="2725271"/>
+            <a:ext cx="2439770" cy="369332"/>
+          </a:xfrm>
+          <a:prstGeom prst="rect">
+            <a:avLst/>
+          </a:prstGeom>
+          <a:noFill/>
+        </p:spPr>
+        <p:txBody>
+          <a:bodyPr wrap="square" rtlCol="0">
+            <a:spAutoFit/>
+          </a:bodyPr>
+          <a:lstStyle/>
+          <a:p>
+            <a:pPr algn="ctr"/>
+            <a:r>
+              <a:rPr lang="pt-PT" dirty="0" err="1"/>
+              <a:t>Fill</a:t>
+            </a:r>
+            <a:r>
+              <a:rPr lang="pt-PT" dirty="0"/>
+              <a:t> </a:t>
+            </a:r>
+            <a:r>
+              <a:rPr lang="pt-PT" dirty="0" err="1"/>
+              <a:t>shared</a:t>
+            </a:r>
+            <a:r>
+              <a:rPr lang="pt-PT" dirty="0"/>
+              <a:t> </a:t>
+            </a:r>
+            <a:r>
+              <a:rPr lang="pt-PT" dirty="0" err="1"/>
+              <a:t>memory</a:t>
+            </a:r>
+            <a:endParaRPr lang="pt-PT" dirty="0"/>
+          </a:p>
+        </p:txBody>
+      </p:sp>
+      <p:sp>
+        <p:nvSpPr>
+          <p:cNvPr id="21" name="CaixaDeTexto 20">
+            <a:extLst>
+              <a:ext uri="{FF2B5EF4-FFF2-40B4-BE49-F238E27FC236}">
+                <a16:creationId xmlns:a16="http://schemas.microsoft.com/office/drawing/2014/main" id="{6BA57DE3-534E-4077-931E-473808C41764}"/>
+              </a:ext>
+            </a:extLst>
+          </p:cNvPr>
+          <p:cNvSpPr txBox="1"/>
+          <p:nvPr/>
+        </p:nvSpPr>
+        <p:spPr>
+          <a:xfrm>
+            <a:off x="2930775" y="3416883"/>
+            <a:ext cx="2439770" cy="369332"/>
+          </a:xfrm>
+          <a:prstGeom prst="rect">
+            <a:avLst/>
+          </a:prstGeom>
+          <a:noFill/>
+        </p:spPr>
+        <p:txBody>
+          <a:bodyPr wrap="square" rtlCol="0">
+            <a:spAutoFit/>
+          </a:bodyPr>
+          <a:lstStyle/>
+          <a:p>
+            <a:pPr algn="ctr"/>
+            <a:r>
+              <a:rPr lang="pt-PT" dirty="0" err="1"/>
+              <a:t>Start</a:t>
+            </a:r>
+            <a:r>
+              <a:rPr lang="pt-PT" dirty="0"/>
+              <a:t> </a:t>
+            </a:r>
+            <a:r>
+              <a:rPr lang="pt-PT" dirty="0" err="1"/>
+              <a:t>threads</a:t>
+            </a:r>
+            <a:endParaRPr lang="pt-PT" dirty="0"/>
+          </a:p>
+        </p:txBody>
+      </p:sp>
+      <p:sp>
+        <p:nvSpPr>
+          <p:cNvPr id="23" name="CaixaDeTexto 22">
+            <a:extLst>
+              <a:ext uri="{FF2B5EF4-FFF2-40B4-BE49-F238E27FC236}">
+                <a16:creationId xmlns:a16="http://schemas.microsoft.com/office/drawing/2014/main" id="{E414D643-A511-4194-8DD4-1D009D671CD4}"/>
+              </a:ext>
+            </a:extLst>
+          </p:cNvPr>
+          <p:cNvSpPr txBox="1"/>
+          <p:nvPr/>
+        </p:nvSpPr>
+        <p:spPr>
+          <a:xfrm>
+            <a:off x="2948703" y="4103347"/>
+            <a:ext cx="2439770" cy="369332"/>
+          </a:xfrm>
+          <a:prstGeom prst="rect">
+            <a:avLst/>
+          </a:prstGeom>
+          <a:noFill/>
+        </p:spPr>
+        <p:txBody>
+          <a:bodyPr wrap="square" rtlCol="0">
+            <a:spAutoFit/>
+          </a:bodyPr>
+          <a:lstStyle/>
+          <a:p>
+            <a:pPr algn="ctr"/>
+            <a:r>
+              <a:rPr lang="pt-PT" dirty="0"/>
+              <a:t>…</a:t>
+            </a:r>
+          </a:p>
+        </p:txBody>
+      </p:sp>
+      <p:cxnSp>
+        <p:nvCxnSpPr>
+          <p:cNvPr id="25" name="Conexão reta unidirecional 24">
+            <a:extLst>
+              <a:ext uri="{FF2B5EF4-FFF2-40B4-BE49-F238E27FC236}">
+                <a16:creationId xmlns:a16="http://schemas.microsoft.com/office/drawing/2014/main" id="{45FA949B-C680-423D-BB75-E98626B23652}"/>
+              </a:ext>
+            </a:extLst>
+          </p:cNvPr>
+          <p:cNvCxnSpPr>
+            <a:cxnSpLocks/>
+          </p:cNvCxnSpPr>
+          <p:nvPr/>
+        </p:nvCxnSpPr>
+        <p:spPr>
+          <a:xfrm>
+            <a:off x="4150660" y="3110756"/>
+            <a:ext cx="0" cy="322280"/>
+          </a:xfrm>
+          <a:prstGeom prst="straightConnector1">
+            <a:avLst/>
+          </a:prstGeom>
+          <a:ln>
+            <a:tailEnd type="triangle"/>
+          </a:ln>
+        </p:spPr>
+        <p:style>
+          <a:lnRef idx="1">
+            <a:schemeClr val="accent1"/>
+          </a:lnRef>
+          <a:fillRef idx="0">
+            <a:schemeClr val="accent1"/>
+          </a:fillRef>
+          <a:effectRef idx="0">
+            <a:schemeClr val="accent1"/>
+          </a:effectRef>
+          <a:fontRef idx="minor">
+            <a:schemeClr val="tx1"/>
+          </a:fontRef>
+        </p:style>
+      </p:cxnSp>
+      <p:cxnSp>
+        <p:nvCxnSpPr>
+          <p:cNvPr id="26" name="Conexão reta unidirecional 25">
+            <a:extLst>
+              <a:ext uri="{FF2B5EF4-FFF2-40B4-BE49-F238E27FC236}">
+                <a16:creationId xmlns:a16="http://schemas.microsoft.com/office/drawing/2014/main" id="{E91AF71E-F317-4336-9015-4FF8C192AB67}"/>
+              </a:ext>
+            </a:extLst>
+          </p:cNvPr>
+          <p:cNvCxnSpPr>
+            <a:cxnSpLocks/>
+          </p:cNvCxnSpPr>
+          <p:nvPr/>
+        </p:nvCxnSpPr>
+        <p:spPr>
+          <a:xfrm>
+            <a:off x="4150660" y="3834856"/>
+            <a:ext cx="0" cy="322280"/>
+          </a:xfrm>
+          <a:prstGeom prst="straightConnector1">
+            <a:avLst/>
+          </a:prstGeom>
+          <a:ln>
+            <a:tailEnd type="triangle"/>
+          </a:ln>
+        </p:spPr>
+        <p:style>
+          <a:lnRef idx="1">
+            <a:schemeClr val="accent1"/>
+          </a:lnRef>
+          <a:fillRef idx="0">
+            <a:schemeClr val="accent1"/>
+          </a:fillRef>
+          <a:effectRef idx="0">
+            <a:schemeClr val="accent1"/>
+          </a:effectRef>
+          <a:fontRef idx="minor">
+            <a:schemeClr val="tx1"/>
+          </a:fontRef>
+        </p:style>
+      </p:cxnSp>
+      <p:cxnSp>
+        <p:nvCxnSpPr>
+          <p:cNvPr id="27" name="Conexão reta unidirecional 26">
+            <a:extLst>
+              <a:ext uri="{FF2B5EF4-FFF2-40B4-BE49-F238E27FC236}">
+                <a16:creationId xmlns:a16="http://schemas.microsoft.com/office/drawing/2014/main" id="{ADEA7A9B-3DC0-4453-9776-B6D778BD5870}"/>
+              </a:ext>
+            </a:extLst>
+          </p:cNvPr>
+          <p:cNvCxnSpPr>
+            <a:cxnSpLocks/>
+          </p:cNvCxnSpPr>
+          <p:nvPr/>
+        </p:nvCxnSpPr>
+        <p:spPr>
+          <a:xfrm>
+            <a:off x="4141696" y="4481644"/>
+            <a:ext cx="0" cy="322280"/>
+          </a:xfrm>
+          <a:prstGeom prst="straightConnector1">
+            <a:avLst/>
+          </a:prstGeom>
+          <a:ln>
+            <a:tailEnd type="triangle"/>
+          </a:ln>
+        </p:spPr>
+        <p:style>
+          <a:lnRef idx="1">
+            <a:schemeClr val="accent1"/>
+          </a:lnRef>
+          <a:fillRef idx="0">
+            <a:schemeClr val="accent1"/>
+          </a:fillRef>
+          <a:effectRef idx="0">
+            <a:schemeClr val="accent1"/>
+          </a:effectRef>
+          <a:fontRef idx="minor">
+            <a:schemeClr val="tx1"/>
+          </a:fontRef>
+        </p:style>
+      </p:cxnSp>
+      <p:sp>
+        <p:nvSpPr>
+          <p:cNvPr id="28" name="CaixaDeTexto 27">
+            <a:extLst>
+              <a:ext uri="{FF2B5EF4-FFF2-40B4-BE49-F238E27FC236}">
+                <a16:creationId xmlns:a16="http://schemas.microsoft.com/office/drawing/2014/main" id="{CF274CB7-C6D3-4DF0-9E0C-6A7048985AF8}"/>
+              </a:ext>
+            </a:extLst>
+          </p:cNvPr>
+          <p:cNvSpPr txBox="1"/>
+          <p:nvPr/>
+        </p:nvSpPr>
+        <p:spPr>
+          <a:xfrm>
+            <a:off x="2948703" y="4789811"/>
+            <a:ext cx="2439770" cy="369332"/>
+          </a:xfrm>
+          <a:prstGeom prst="rect">
+            <a:avLst/>
+          </a:prstGeom>
+          <a:noFill/>
+        </p:spPr>
+        <p:txBody>
+          <a:bodyPr wrap="square" rtlCol="0">
+            <a:spAutoFit/>
+          </a:bodyPr>
+          <a:lstStyle/>
+          <a:p>
+            <a:pPr algn="ctr"/>
+            <a:r>
+              <a:rPr lang="pt-PT" dirty="0" err="1"/>
+              <a:t>Wait</a:t>
+            </a:r>
+            <a:r>
+              <a:rPr lang="pt-PT" dirty="0"/>
+              <a:t> </a:t>
+            </a:r>
+            <a:r>
+              <a:rPr lang="pt-PT" dirty="0" err="1"/>
+              <a:t>workers</a:t>
+            </a:r>
+            <a:endParaRPr lang="pt-PT" dirty="0"/>
+          </a:p>
+        </p:txBody>
+      </p:sp>
+      <p:cxnSp>
+        <p:nvCxnSpPr>
+          <p:cNvPr id="29" name="Conexão reta unidirecional 28">
+            <a:extLst>
+              <a:ext uri="{FF2B5EF4-FFF2-40B4-BE49-F238E27FC236}">
+                <a16:creationId xmlns:a16="http://schemas.microsoft.com/office/drawing/2014/main" id="{93496383-EDDC-4F00-B3EB-BFF4FFFD26DF}"/>
+              </a:ext>
+            </a:extLst>
+          </p:cNvPr>
+          <p:cNvCxnSpPr>
+            <a:cxnSpLocks/>
+          </p:cNvCxnSpPr>
+          <p:nvPr/>
+        </p:nvCxnSpPr>
+        <p:spPr>
+          <a:xfrm>
+            <a:off x="4141696" y="5159143"/>
+            <a:ext cx="0" cy="322280"/>
+          </a:xfrm>
+          <a:prstGeom prst="straightConnector1">
+            <a:avLst/>
+          </a:prstGeom>
+          <a:ln>
+            <a:tailEnd type="triangle"/>
+          </a:ln>
+        </p:spPr>
+        <p:style>
+          <a:lnRef idx="1">
+            <a:schemeClr val="accent1"/>
+          </a:lnRef>
+          <a:fillRef idx="0">
+            <a:schemeClr val="accent1"/>
+          </a:fillRef>
+          <a:effectRef idx="0">
+            <a:schemeClr val="accent1"/>
+          </a:effectRef>
+          <a:fontRef idx="minor">
+            <a:schemeClr val="tx1"/>
+          </a:fontRef>
+        </p:style>
+      </p:cxnSp>
+      <p:sp>
+        <p:nvSpPr>
+          <p:cNvPr id="30" name="CaixaDeTexto 29">
+            <a:extLst>
+              <a:ext uri="{FF2B5EF4-FFF2-40B4-BE49-F238E27FC236}">
+                <a16:creationId xmlns:a16="http://schemas.microsoft.com/office/drawing/2014/main" id="{B3339711-D1E5-487A-800C-1663429EA463}"/>
+              </a:ext>
+            </a:extLst>
+          </p:cNvPr>
+          <p:cNvSpPr txBox="1"/>
+          <p:nvPr/>
+        </p:nvSpPr>
+        <p:spPr>
+          <a:xfrm>
+            <a:off x="2948703" y="5514362"/>
+            <a:ext cx="2439770" cy="369332"/>
+          </a:xfrm>
+          <a:prstGeom prst="rect">
+            <a:avLst/>
+          </a:prstGeom>
+          <a:noFill/>
+        </p:spPr>
+        <p:txBody>
+          <a:bodyPr wrap="square" rtlCol="0">
+            <a:spAutoFit/>
+          </a:bodyPr>
+          <a:lstStyle/>
+          <a:p>
+            <a:pPr algn="ctr"/>
+            <a:r>
+              <a:rPr lang="pt-PT" dirty="0"/>
+              <a:t>Print </a:t>
+            </a:r>
+            <a:r>
+              <a:rPr lang="pt-PT" dirty="0" err="1"/>
+              <a:t>results</a:t>
+            </a:r>
             <a:endParaRPr lang="pt-PT" dirty="0"/>
           </a:p>
         </p:txBody>
@@ -3926,36 +4986,19 @@
               </a:rPr>
               <a:t>Workers</a:t>
             </a:r>
+            <a:r>
+              <a:rPr lang="pt-PT" sz="2200" dirty="0">
+                <a:latin typeface="Calibri" panose="020F0502020204030204" pitchFamily="34" charset="0"/>
+                <a:ea typeface="Calibri" panose="020F0502020204030204" pitchFamily="34" charset="0"/>
+                <a:cs typeface="Calibri" panose="020F0502020204030204" pitchFamily="34" charset="0"/>
+              </a:rPr>
+              <a:t> LIFECYCLE</a:t>
+            </a:r>
             <a:endParaRPr lang="pt-PT" dirty="0">
               <a:latin typeface="Calibri" panose="020F0502020204030204" pitchFamily="34" charset="0"/>
               <a:ea typeface="Calibri" panose="020F0502020204030204" pitchFamily="34" charset="0"/>
               <a:cs typeface="Calibri" panose="020F0502020204030204" pitchFamily="34" charset="0"/>
             </a:endParaRPr>
-          </a:p>
-        </p:txBody>
-      </p:sp>
-      <p:sp>
-        <p:nvSpPr>
-          <p:cNvPr id="3" name="Marcador de Posição de Conteúdo 2">
-            <a:extLst>
-              <a:ext uri="{FF2B5EF4-FFF2-40B4-BE49-F238E27FC236}">
-                <a16:creationId xmlns:a16="http://schemas.microsoft.com/office/drawing/2014/main" id="{2D745695-6161-41A4-A2E0-37169F11F70A}"/>
-              </a:ext>
-            </a:extLst>
-          </p:cNvPr>
-          <p:cNvSpPr>
-            <a:spLocks noGrp="1"/>
-          </p:cNvSpPr>
-          <p:nvPr>
-            <p:ph idx="1"/>
-          </p:nvPr>
-        </p:nvSpPr>
-        <p:spPr/>
-        <p:txBody>
-          <a:bodyPr/>
-          <a:lstStyle/>
-          <a:p>
-            <a:endParaRPr lang="pt-PT" dirty="0"/>
           </a:p>
         </p:txBody>
       </p:sp>
@@ -4299,290 +5342,6 @@
           </a:graphicData>
         </a:graphic>
       </p:graphicFrame>
-      <p:sp>
-        <p:nvSpPr>
-          <p:cNvPr id="3" name="CaixaDeTexto 2">
-            <a:extLst>
-              <a:ext uri="{FF2B5EF4-FFF2-40B4-BE49-F238E27FC236}">
-                <a16:creationId xmlns:a16="http://schemas.microsoft.com/office/drawing/2014/main" id="{16F8CB4E-7BAE-42BF-AD63-C9A47547EE63}"/>
-              </a:ext>
-            </a:extLst>
-          </p:cNvPr>
-          <p:cNvSpPr txBox="1"/>
-          <p:nvPr/>
-        </p:nvSpPr>
-        <p:spPr>
-          <a:xfrm>
-            <a:off x="2205192" y="3486114"/>
-            <a:ext cx="7781617" cy="1754326"/>
-          </a:xfrm>
-          <a:prstGeom prst="rect">
-            <a:avLst/>
-          </a:prstGeom>
-          <a:noFill/>
-          <a:ln w="9525" cap="flat" cmpd="sng" algn="ctr">
-            <a:solidFill>
-              <a:schemeClr val="dk1"/>
-            </a:solidFill>
-            <a:prstDash val="solid"/>
-            <a:round/>
-            <a:headEnd type="none" w="med" len="med"/>
-            <a:tailEnd type="none" w="med" len="med"/>
-          </a:ln>
-        </p:spPr>
-        <p:style>
-          <a:lnRef idx="0">
-            <a:scrgbClr r="0" g="0" b="0"/>
-          </a:lnRef>
-          <a:fillRef idx="0">
-            <a:scrgbClr r="0" g="0" b="0"/>
-          </a:fillRef>
-          <a:effectRef idx="0">
-            <a:scrgbClr r="0" g="0" b="0"/>
-          </a:effectRef>
-          <a:fontRef idx="minor">
-            <a:schemeClr val="dk1"/>
-          </a:fontRef>
-        </p:style>
-        <p:txBody>
-          <a:bodyPr wrap="none" rtlCol="0">
-            <a:spAutoFit/>
-          </a:bodyPr>
-          <a:lstStyle/>
-          <a:p>
-            <a:pPr marL="285750" indent="-285750">
-              <a:buFont typeface="Wingdings" panose="05000000000000000000" pitchFamily="2" charset="2"/>
-              <a:buChar char="Ø"/>
-            </a:pPr>
-            <a:r>
-              <a:rPr lang="pt-PT" u="sng" dirty="0"/>
-              <a:t>Compile </a:t>
-            </a:r>
-            <a:r>
-              <a:rPr lang="pt-PT" u="sng" dirty="0" err="1"/>
-              <a:t>command</a:t>
-            </a:r>
-            <a:endParaRPr lang="pt-PT" u="sng" dirty="0"/>
-          </a:p>
-          <a:p>
-            <a:r>
-              <a:rPr lang="en-US" dirty="0"/>
-              <a:t>	</a:t>
-            </a:r>
-            <a:r>
-              <a:rPr lang="en-US" dirty="0" err="1">
-                <a:effectLst>
-                  <a:outerShdw blurRad="38100" dist="38100" dir="2700000" algn="tl">
-                    <a:srgbClr val="000000">
-                      <a:alpha val="43137"/>
-                    </a:srgbClr>
-                  </a:outerShdw>
-                </a:effectLst>
-              </a:rPr>
-              <a:t>gcc</a:t>
-            </a:r>
-            <a:r>
-              <a:rPr lang="en-US" dirty="0">
-                <a:effectLst>
-                  <a:outerShdw blurRad="38100" dist="38100" dir="2700000" algn="tl">
-                    <a:srgbClr val="000000">
-                      <a:alpha val="43137"/>
-                    </a:srgbClr>
-                  </a:outerShdw>
-                </a:effectLst>
-              </a:rPr>
-              <a:t> -Wall -O3 -o </a:t>
-            </a:r>
-            <a:r>
-              <a:rPr lang="en-US" dirty="0" err="1">
-                <a:effectLst>
-                  <a:outerShdw blurRad="38100" dist="38100" dir="2700000" algn="tl">
-                    <a:srgbClr val="000000">
-                      <a:alpha val="43137"/>
-                    </a:srgbClr>
-                  </a:outerShdw>
-                </a:effectLst>
-              </a:rPr>
-              <a:t>countWords</a:t>
-            </a:r>
-            <a:r>
-              <a:rPr lang="en-US" dirty="0">
-                <a:effectLst>
-                  <a:outerShdw blurRad="38100" dist="38100" dir="2700000" algn="tl">
-                    <a:srgbClr val="000000">
-                      <a:alpha val="43137"/>
-                    </a:srgbClr>
-                  </a:outerShdw>
-                </a:effectLst>
-              </a:rPr>
-              <a:t> </a:t>
-            </a:r>
-            <a:r>
-              <a:rPr lang="en-US" dirty="0" err="1">
-                <a:effectLst>
-                  <a:outerShdw blurRad="38100" dist="38100" dir="2700000" algn="tl">
-                    <a:srgbClr val="000000">
-                      <a:alpha val="43137"/>
-                    </a:srgbClr>
-                  </a:outerShdw>
-                </a:effectLst>
-              </a:rPr>
-              <a:t>countWords.c</a:t>
-            </a:r>
-            <a:r>
-              <a:rPr lang="en-US" dirty="0">
-                <a:effectLst>
-                  <a:outerShdw blurRad="38100" dist="38100" dir="2700000" algn="tl">
-                    <a:srgbClr val="000000">
-                      <a:alpha val="43137"/>
-                    </a:srgbClr>
-                  </a:outerShdw>
-                </a:effectLst>
-              </a:rPr>
-              <a:t> </a:t>
-            </a:r>
-            <a:r>
-              <a:rPr lang="en-US" dirty="0" err="1">
-                <a:effectLst>
-                  <a:outerShdw blurRad="38100" dist="38100" dir="2700000" algn="tl">
-                    <a:srgbClr val="000000">
-                      <a:alpha val="43137"/>
-                    </a:srgbClr>
-                  </a:outerShdw>
-                </a:effectLst>
-              </a:rPr>
-              <a:t>sharedMemory.c</a:t>
-            </a:r>
-            <a:r>
-              <a:rPr lang="en-US" dirty="0">
-                <a:effectLst>
-                  <a:outerShdw blurRad="38100" dist="38100" dir="2700000" algn="tl">
-                    <a:srgbClr val="000000">
-                      <a:alpha val="43137"/>
-                    </a:srgbClr>
-                  </a:outerShdw>
-                </a:effectLst>
-              </a:rPr>
-              <a:t> -</a:t>
-            </a:r>
-            <a:r>
-              <a:rPr lang="en-US" dirty="0" err="1">
-                <a:effectLst>
-                  <a:outerShdw blurRad="38100" dist="38100" dir="2700000" algn="tl">
-                    <a:srgbClr val="000000">
-                      <a:alpha val="43137"/>
-                    </a:srgbClr>
-                  </a:outerShdw>
-                </a:effectLst>
-              </a:rPr>
-              <a:t>lpthread</a:t>
-            </a:r>
-            <a:r>
-              <a:rPr lang="en-US" dirty="0">
-                <a:effectLst>
-                  <a:outerShdw blurRad="38100" dist="38100" dir="2700000" algn="tl">
-                    <a:srgbClr val="000000">
-                      <a:alpha val="43137"/>
-                    </a:srgbClr>
-                  </a:outerShdw>
-                </a:effectLst>
-              </a:rPr>
-              <a:t> –</a:t>
-            </a:r>
-            <a:r>
-              <a:rPr lang="en-US" dirty="0" err="1">
-                <a:effectLst>
-                  <a:outerShdw blurRad="38100" dist="38100" dir="2700000" algn="tl">
-                    <a:srgbClr val="000000">
-                      <a:alpha val="43137"/>
-                    </a:srgbClr>
-                  </a:outerShdw>
-                </a:effectLst>
-              </a:rPr>
-              <a:t>lm</a:t>
-            </a:r>
-            <a:endParaRPr lang="en-US" dirty="0">
-              <a:effectLst>
-                <a:outerShdw blurRad="38100" dist="38100" dir="2700000" algn="tl">
-                  <a:srgbClr val="000000">
-                    <a:alpha val="43137"/>
-                  </a:srgbClr>
-                </a:outerShdw>
-              </a:effectLst>
-            </a:endParaRPr>
-          </a:p>
-          <a:p>
-            <a:endParaRPr lang="en-US" dirty="0"/>
-          </a:p>
-          <a:p>
-            <a:pPr marL="285750" indent="-285750">
-              <a:buFont typeface="Wingdings" panose="05000000000000000000" pitchFamily="2" charset="2"/>
-              <a:buChar char="Ø"/>
-            </a:pPr>
-            <a:r>
-              <a:rPr lang="en-US" u="sng" dirty="0"/>
-              <a:t>Run command</a:t>
-            </a:r>
-          </a:p>
-          <a:p>
-            <a:r>
-              <a:rPr lang="en-US" dirty="0"/>
-              <a:t>	</a:t>
-            </a:r>
-            <a:r>
-              <a:rPr lang="en-US" dirty="0">
-                <a:effectLst>
-                  <a:outerShdw blurRad="38100" dist="38100" dir="2700000" algn="tl">
-                    <a:srgbClr val="000000">
-                      <a:alpha val="43137"/>
-                    </a:srgbClr>
-                  </a:outerShdw>
-                </a:effectLst>
-              </a:rPr>
-              <a:t>./</a:t>
-            </a:r>
-            <a:r>
-              <a:rPr lang="en-US" dirty="0" err="1">
-                <a:effectLst>
-                  <a:outerShdw blurRad="38100" dist="38100" dir="2700000" algn="tl">
-                    <a:srgbClr val="000000">
-                      <a:alpha val="43137"/>
-                    </a:srgbClr>
-                  </a:outerShdw>
-                </a:effectLst>
-              </a:rPr>
-              <a:t>countWords</a:t>
-            </a:r>
-            <a:r>
-              <a:rPr lang="en-US" dirty="0">
-                <a:effectLst>
-                  <a:outerShdw blurRad="38100" dist="38100" dir="2700000" algn="tl">
-                    <a:srgbClr val="000000">
-                      <a:alpha val="43137"/>
-                    </a:srgbClr>
-                  </a:outerShdw>
-                </a:effectLst>
-              </a:rPr>
-              <a:t> text0.txt text1.txt text2.txt text3.txt text4.txt</a:t>
-            </a:r>
-            <a:endParaRPr lang="pt-PT" dirty="0">
-              <a:effectLst>
-                <a:outerShdw blurRad="38100" dist="38100" dir="2700000" algn="tl">
-                  <a:srgbClr val="000000">
-                    <a:alpha val="43137"/>
-                  </a:srgbClr>
-                </a:outerShdw>
-              </a:effectLst>
-            </a:endParaRPr>
-          </a:p>
-          <a:p>
-            <a:r>
-              <a:rPr lang="pt-PT" dirty="0"/>
-              <a:t>	</a:t>
-            </a:r>
-          </a:p>
-        </p:txBody>
-      </p:sp>
     </p:spTree>
     <p:extLst>
       <p:ext uri="{BB962C8B-B14F-4D97-AF65-F5344CB8AC3E}">
@@ -4956,7 +5715,7 @@
             <p:ph idx="1"/>
             <p:extLst>
               <p:ext uri="{D42A27DB-BD31-4B8C-83A1-F6EECF244321}">
-                <p14:modId xmlns:p14="http://schemas.microsoft.com/office/powerpoint/2010/main" val="3032451300"/>
+                <p14:modId xmlns:p14="http://schemas.microsoft.com/office/powerpoint/2010/main" val="2241353057"/>
               </p:ext>
             </p:extLst>
           </p:nvPr>
@@ -5509,23 +6268,7 @@
                           <a:ea typeface="Calibri" panose="020F0502020204030204" pitchFamily="34" charset="0"/>
                           <a:cs typeface="Calibri" panose="020F0502020204030204" pitchFamily="34" charset="0"/>
                         </a:rPr>
-                        <a:t>25.01592</a:t>
-                      </a:r>
-                      <a:r>
-                        <a:rPr lang="pt-PT" u="sng">
-                          <a:latin typeface="Calibri" panose="020F0502020204030204" pitchFamily="34" charset="0"/>
-                          <a:ea typeface="Calibri" panose="020F0502020204030204" pitchFamily="34" charset="0"/>
-                          <a:cs typeface="Calibri" panose="020F0502020204030204" pitchFamily="34" charset="0"/>
-                        </a:rPr>
-                        <a:t>s</a:t>
-                      </a:r>
-                      <a:r>
-                        <a:rPr lang="pt-PT">
-                          <a:latin typeface="Calibri" panose="020F0502020204030204" pitchFamily="34" charset="0"/>
-                          <a:ea typeface="Calibri" panose="020F0502020204030204" pitchFamily="34" charset="0"/>
-                          <a:cs typeface="Calibri" panose="020F0502020204030204" pitchFamily="34" charset="0"/>
-                        </a:rPr>
-                        <a:t> ()</a:t>
+                        <a:t>25.01592 (s)</a:t>
                       </a:r>
                       <a:endParaRPr lang="pt-PT" dirty="0">
                         <a:latin typeface="Calibri" panose="020F0502020204030204" pitchFamily="34" charset="0"/>
@@ -5546,305 +6289,6 @@
           </a:graphicData>
         </a:graphic>
       </p:graphicFrame>
-      <p:sp>
-        <p:nvSpPr>
-          <p:cNvPr id="8" name="CaixaDeTexto 7">
-            <a:extLst>
-              <a:ext uri="{FF2B5EF4-FFF2-40B4-BE49-F238E27FC236}">
-                <a16:creationId xmlns:a16="http://schemas.microsoft.com/office/drawing/2014/main" id="{C21A4B6E-E24A-4553-9F63-5C358B965921}"/>
-              </a:ext>
-            </a:extLst>
-          </p:cNvPr>
-          <p:cNvSpPr txBox="1"/>
-          <p:nvPr/>
-        </p:nvSpPr>
-        <p:spPr>
-          <a:xfrm>
-            <a:off x="2205192" y="4144447"/>
-            <a:ext cx="8470589" cy="1754326"/>
-          </a:xfrm>
-          <a:prstGeom prst="rect">
-            <a:avLst/>
-          </a:prstGeom>
-          <a:noFill/>
-          <a:ln w="9525" cap="flat" cmpd="sng" algn="ctr">
-            <a:solidFill>
-              <a:schemeClr val="dk1"/>
-            </a:solidFill>
-            <a:prstDash val="solid"/>
-            <a:round/>
-            <a:headEnd type="none" w="med" len="med"/>
-            <a:tailEnd type="none" w="med" len="med"/>
-          </a:ln>
-        </p:spPr>
-        <p:style>
-          <a:lnRef idx="0">
-            <a:scrgbClr r="0" g="0" b="0"/>
-          </a:lnRef>
-          <a:fillRef idx="0">
-            <a:scrgbClr r="0" g="0" b="0"/>
-          </a:fillRef>
-          <a:effectRef idx="0">
-            <a:scrgbClr r="0" g="0" b="0"/>
-          </a:effectRef>
-          <a:fontRef idx="minor">
-            <a:schemeClr val="dk1"/>
-          </a:fontRef>
-        </p:style>
-        <p:txBody>
-          <a:bodyPr wrap="none" rtlCol="0">
-            <a:spAutoFit/>
-          </a:bodyPr>
-          <a:lstStyle/>
-          <a:p>
-            <a:pPr marL="285750" indent="-285750">
-              <a:buFont typeface="Wingdings" panose="05000000000000000000" pitchFamily="2" charset="2"/>
-              <a:buChar char="Ø"/>
-            </a:pPr>
-            <a:r>
-              <a:rPr lang="pt-PT" u="sng" dirty="0"/>
-              <a:t>Compile </a:t>
-            </a:r>
-            <a:r>
-              <a:rPr lang="pt-PT" u="sng" dirty="0" err="1"/>
-              <a:t>command</a:t>
-            </a:r>
-            <a:endParaRPr lang="pt-PT" u="sng" dirty="0"/>
-          </a:p>
-          <a:p>
-            <a:r>
-              <a:rPr lang="en-US" dirty="0"/>
-              <a:t>	</a:t>
-            </a:r>
-            <a:r>
-              <a:rPr lang="en-US" dirty="0" err="1">
-                <a:effectLst>
-                  <a:outerShdw blurRad="38100" dist="38100" dir="2700000" algn="tl">
-                    <a:srgbClr val="000000">
-                      <a:alpha val="43137"/>
-                    </a:srgbClr>
-                  </a:outerShdw>
-                </a:effectLst>
-              </a:rPr>
-              <a:t>gcc</a:t>
-            </a:r>
-            <a:r>
-              <a:rPr lang="en-US" dirty="0">
-                <a:effectLst>
-                  <a:outerShdw blurRad="38100" dist="38100" dir="2700000" algn="tl">
-                    <a:srgbClr val="000000">
-                      <a:alpha val="43137"/>
-                    </a:srgbClr>
-                  </a:outerShdw>
-                </a:effectLst>
-              </a:rPr>
-              <a:t> -Wall -O3 -o </a:t>
-            </a:r>
-            <a:r>
-              <a:rPr lang="en-US" dirty="0" err="1">
-                <a:effectLst>
-                  <a:outerShdw blurRad="38100" dist="38100" dir="2700000" algn="tl">
-                    <a:srgbClr val="000000">
-                      <a:alpha val="43137"/>
-                    </a:srgbClr>
-                  </a:outerShdw>
-                </a:effectLst>
-              </a:rPr>
-              <a:t>sortingSequence</a:t>
-            </a:r>
-            <a:r>
-              <a:rPr lang="en-US" dirty="0">
-                <a:effectLst>
-                  <a:outerShdw blurRad="38100" dist="38100" dir="2700000" algn="tl">
-                    <a:srgbClr val="000000">
-                      <a:alpha val="43137"/>
-                    </a:srgbClr>
-                  </a:outerShdw>
-                </a:effectLst>
-              </a:rPr>
-              <a:t> </a:t>
-            </a:r>
-            <a:r>
-              <a:rPr lang="en-US" dirty="0" err="1">
-                <a:effectLst>
-                  <a:outerShdw blurRad="38100" dist="38100" dir="2700000" algn="tl">
-                    <a:srgbClr val="000000">
-                      <a:alpha val="43137"/>
-                    </a:srgbClr>
-                  </a:outerShdw>
-                </a:effectLst>
-              </a:rPr>
-              <a:t>sortingSequence.c</a:t>
-            </a:r>
-            <a:r>
-              <a:rPr lang="en-US" dirty="0">
-                <a:effectLst>
-                  <a:outerShdw blurRad="38100" dist="38100" dir="2700000" algn="tl">
-                    <a:srgbClr val="000000">
-                      <a:alpha val="43137"/>
-                    </a:srgbClr>
-                  </a:outerShdw>
-                </a:effectLst>
-              </a:rPr>
-              <a:t> </a:t>
-            </a:r>
-            <a:r>
-              <a:rPr lang="en-US" dirty="0" err="1">
-                <a:effectLst>
-                  <a:outerShdw blurRad="38100" dist="38100" dir="2700000" algn="tl">
-                    <a:srgbClr val="000000">
-                      <a:alpha val="43137"/>
-                    </a:srgbClr>
-                  </a:outerShdw>
-                </a:effectLst>
-              </a:rPr>
-              <a:t>sharedMemory.c</a:t>
-            </a:r>
-            <a:r>
-              <a:rPr lang="en-US" dirty="0">
-                <a:effectLst>
-                  <a:outerShdw blurRad="38100" dist="38100" dir="2700000" algn="tl">
-                    <a:srgbClr val="000000">
-                      <a:alpha val="43137"/>
-                    </a:srgbClr>
-                  </a:outerShdw>
-                </a:effectLst>
-              </a:rPr>
-              <a:t> -</a:t>
-            </a:r>
-            <a:r>
-              <a:rPr lang="en-US" dirty="0" err="1">
-                <a:effectLst>
-                  <a:outerShdw blurRad="38100" dist="38100" dir="2700000" algn="tl">
-                    <a:srgbClr val="000000">
-                      <a:alpha val="43137"/>
-                    </a:srgbClr>
-                  </a:outerShdw>
-                </a:effectLst>
-              </a:rPr>
-              <a:t>lpthread</a:t>
-            </a:r>
-            <a:r>
-              <a:rPr lang="en-US" dirty="0">
-                <a:effectLst>
-                  <a:outerShdw blurRad="38100" dist="38100" dir="2700000" algn="tl">
-                    <a:srgbClr val="000000">
-                      <a:alpha val="43137"/>
-                    </a:srgbClr>
-                  </a:outerShdw>
-                </a:effectLst>
-              </a:rPr>
-              <a:t> -</a:t>
-            </a:r>
-            <a:r>
-              <a:rPr lang="en-US" dirty="0" err="1">
-                <a:effectLst>
-                  <a:outerShdw blurRad="38100" dist="38100" dir="2700000" algn="tl">
-                    <a:srgbClr val="000000">
-                      <a:alpha val="43137"/>
-                    </a:srgbClr>
-                  </a:outerShdw>
-                </a:effectLst>
-              </a:rPr>
-              <a:t>lm</a:t>
-            </a:r>
-            <a:endParaRPr lang="en-US" dirty="0">
-              <a:effectLst>
-                <a:outerShdw blurRad="38100" dist="38100" dir="2700000" algn="tl">
-                  <a:srgbClr val="000000">
-                    <a:alpha val="43137"/>
-                  </a:srgbClr>
-                </a:outerShdw>
-              </a:effectLst>
-            </a:endParaRPr>
-          </a:p>
-          <a:p>
-            <a:endParaRPr lang="en-US" dirty="0"/>
-          </a:p>
-          <a:p>
-            <a:pPr marL="285750" indent="-285750">
-              <a:buFont typeface="Wingdings" panose="05000000000000000000" pitchFamily="2" charset="2"/>
-              <a:buChar char="Ø"/>
-            </a:pPr>
-            <a:r>
-              <a:rPr lang="en-US" u="sng" dirty="0"/>
-              <a:t>Run command</a:t>
-            </a:r>
-          </a:p>
-          <a:p>
-            <a:r>
-              <a:rPr lang="en-US" dirty="0"/>
-              <a:t>	</a:t>
-            </a:r>
-            <a:r>
-              <a:rPr lang="pt-PT" dirty="0">
-                <a:effectLst>
-                  <a:outerShdw blurRad="38100" dist="38100" dir="2700000" algn="tl">
-                    <a:srgbClr val="000000">
-                      <a:alpha val="43137"/>
-                    </a:srgbClr>
-                  </a:outerShdw>
-                </a:effectLst>
-              </a:rPr>
-              <a:t>./</a:t>
-            </a:r>
-            <a:r>
-              <a:rPr lang="pt-PT" dirty="0" err="1">
-                <a:effectLst>
-                  <a:outerShdw blurRad="38100" dist="38100" dir="2700000" algn="tl">
-                    <a:srgbClr val="000000">
-                      <a:alpha val="43137"/>
-                    </a:srgbClr>
-                  </a:outerShdw>
-                </a:effectLst>
-              </a:rPr>
-              <a:t>sortingSequence</a:t>
-            </a:r>
-            <a:r>
-              <a:rPr lang="pt-PT" dirty="0">
-                <a:effectLst>
-                  <a:outerShdw blurRad="38100" dist="38100" dir="2700000" algn="tl">
-                    <a:srgbClr val="000000">
-                      <a:alpha val="43137"/>
-                    </a:srgbClr>
-                  </a:outerShdw>
-                </a:effectLst>
-              </a:rPr>
-              <a:t> [</a:t>
-            </a:r>
-            <a:r>
-              <a:rPr lang="pt-PT" i="1" dirty="0" err="1">
-                <a:effectLst>
-                  <a:outerShdw blurRad="38100" dist="38100" dir="2700000" algn="tl">
-                    <a:srgbClr val="000000">
-                      <a:alpha val="43137"/>
-                    </a:srgbClr>
-                  </a:outerShdw>
-                </a:effectLst>
-              </a:rPr>
-              <a:t>binary_file_name</a:t>
-            </a:r>
-            <a:r>
-              <a:rPr lang="pt-PT" dirty="0">
-                <a:effectLst>
-                  <a:outerShdw blurRad="38100" dist="38100" dir="2700000" algn="tl">
-                    <a:srgbClr val="000000">
-                      <a:alpha val="43137"/>
-                    </a:srgbClr>
-                  </a:outerShdw>
-                </a:effectLst>
-              </a:rPr>
-              <a:t>]</a:t>
-            </a:r>
-          </a:p>
-          <a:p>
-            <a:r>
-              <a:rPr lang="pt-PT" dirty="0"/>
-              <a:t>	</a:t>
-            </a:r>
-          </a:p>
-        </p:txBody>
-      </p:sp>
     </p:spTree>
     <p:extLst>
       <p:ext uri="{BB962C8B-B14F-4D97-AF65-F5344CB8AC3E}">

</xml_diff>

<commit_message>
added entities diagrams to presentation
</commit_message>
<xml_diff>
--- a/CLE1_T3G5/present.pptx
+++ b/CLE1_T3G5/present.pptx
@@ -7,11 +7,11 @@
   <p:sldIdLst>
     <p:sldId id="256" r:id="rId2"/>
     <p:sldId id="257" r:id="rId3"/>
-    <p:sldId id="258" r:id="rId4"/>
-    <p:sldId id="259" r:id="rId5"/>
+    <p:sldId id="259" r:id="rId4"/>
+    <p:sldId id="258" r:id="rId5"/>
     <p:sldId id="260" r:id="rId6"/>
-    <p:sldId id="261" r:id="rId7"/>
-    <p:sldId id="262" r:id="rId8"/>
+    <p:sldId id="262" r:id="rId7"/>
+    <p:sldId id="261" r:id="rId8"/>
   </p:sldIdLst>
   <p:sldSz cx="12192000" cy="6858000"/>
   <p:notesSz cx="6858000" cy="9144000"/>
@@ -257,7 +257,7 @@
           <a:p>
             <a:fld id="{65E3D7AB-6C06-41C6-99AC-C74008AD09CE}" type="datetimeFigureOut">
               <a:rPr lang="pt-PT" smtClean="0"/>
-              <a:t>20/03/2023</a:t>
+              <a:t>21/03/2023</a:t>
             </a:fld>
             <a:endParaRPr lang="pt-PT"/>
           </a:p>
@@ -468,7 +468,7 @@
           <a:p>
             <a:fld id="{65E3D7AB-6C06-41C6-99AC-C74008AD09CE}" type="datetimeFigureOut">
               <a:rPr lang="pt-PT" smtClean="0"/>
-              <a:t>20/03/2023</a:t>
+              <a:t>21/03/2023</a:t>
             </a:fld>
             <a:endParaRPr lang="pt-PT"/>
           </a:p>
@@ -683,7 +683,7 @@
           <a:p>
             <a:fld id="{65E3D7AB-6C06-41C6-99AC-C74008AD09CE}" type="datetimeFigureOut">
               <a:rPr lang="pt-PT" smtClean="0"/>
-              <a:t>20/03/2023</a:t>
+              <a:t>21/03/2023</a:t>
             </a:fld>
             <a:endParaRPr lang="pt-PT"/>
           </a:p>
@@ -884,7 +884,7 @@
           <a:p>
             <a:fld id="{65E3D7AB-6C06-41C6-99AC-C74008AD09CE}" type="datetimeFigureOut">
               <a:rPr lang="pt-PT" smtClean="0"/>
-              <a:t>20/03/2023</a:t>
+              <a:t>21/03/2023</a:t>
             </a:fld>
             <a:endParaRPr lang="pt-PT"/>
           </a:p>
@@ -1163,7 +1163,7 @@
           <a:p>
             <a:fld id="{65E3D7AB-6C06-41C6-99AC-C74008AD09CE}" type="datetimeFigureOut">
               <a:rPr lang="pt-PT" smtClean="0"/>
-              <a:t>20/03/2023</a:t>
+              <a:t>21/03/2023</a:t>
             </a:fld>
             <a:endParaRPr lang="pt-PT"/>
           </a:p>
@@ -1431,7 +1431,7 @@
           <a:p>
             <a:fld id="{65E3D7AB-6C06-41C6-99AC-C74008AD09CE}" type="datetimeFigureOut">
               <a:rPr lang="pt-PT" smtClean="0"/>
-              <a:t>20/03/2023</a:t>
+              <a:t>21/03/2023</a:t>
             </a:fld>
             <a:endParaRPr lang="pt-PT"/>
           </a:p>
@@ -1847,7 +1847,7 @@
           <a:p>
             <a:fld id="{65E3D7AB-6C06-41C6-99AC-C74008AD09CE}" type="datetimeFigureOut">
               <a:rPr lang="pt-PT" smtClean="0"/>
-              <a:t>20/03/2023</a:t>
+              <a:t>21/03/2023</a:t>
             </a:fld>
             <a:endParaRPr lang="pt-PT"/>
           </a:p>
@@ -1996,7 +1996,7 @@
           <a:p>
             <a:fld id="{65E3D7AB-6C06-41C6-99AC-C74008AD09CE}" type="datetimeFigureOut">
               <a:rPr lang="pt-PT" smtClean="0"/>
-              <a:t>20/03/2023</a:t>
+              <a:t>21/03/2023</a:t>
             </a:fld>
             <a:endParaRPr lang="pt-PT"/>
           </a:p>
@@ -2122,7 +2122,7 @@
           <a:p>
             <a:fld id="{65E3D7AB-6C06-41C6-99AC-C74008AD09CE}" type="datetimeFigureOut">
               <a:rPr lang="pt-PT" smtClean="0"/>
-              <a:t>20/03/2023</a:t>
+              <a:t>21/03/2023</a:t>
             </a:fld>
             <a:endParaRPr lang="pt-PT"/>
           </a:p>
@@ -2373,7 +2373,7 @@
           <a:p>
             <a:fld id="{65E3D7AB-6C06-41C6-99AC-C74008AD09CE}" type="datetimeFigureOut">
               <a:rPr lang="pt-PT" smtClean="0"/>
-              <a:t>20/03/2023</a:t>
+              <a:t>21/03/2023</a:t>
             </a:fld>
             <a:endParaRPr lang="pt-PT"/>
           </a:p>
@@ -2818,7 +2818,7 @@
           <a:p>
             <a:fld id="{65E3D7AB-6C06-41C6-99AC-C74008AD09CE}" type="datetimeFigureOut">
               <a:rPr lang="pt-PT" smtClean="0"/>
-              <a:t>20/03/2023</a:t>
+              <a:t>21/03/2023</a:t>
             </a:fld>
             <a:endParaRPr lang="pt-PT"/>
           </a:p>
@@ -3145,7 +3145,7 @@
           <a:p>
             <a:fld id="{65E3D7AB-6C06-41C6-99AC-C74008AD09CE}" type="datetimeFigureOut">
               <a:rPr lang="pt-PT" smtClean="0"/>
-              <a:t>20/03/2023</a:t>
+              <a:t>21/03/2023</a:t>
             </a:fld>
             <a:endParaRPr lang="pt-PT"/>
           </a:p>
@@ -3802,7 +3802,23 @@
                 <a:ea typeface="Calibri" panose="020F0502020204030204" pitchFamily="34" charset="0"/>
                 <a:cs typeface="Calibri" panose="020F0502020204030204" pitchFamily="34" charset="0"/>
               </a:rPr>
-              <a:t>Initializations</a:t>
+              <a:t>Entities</a:t>
+            </a:r>
+            <a:r>
+              <a:rPr lang="pt-PT" sz="2200" dirty="0">
+                <a:latin typeface="Calibri" panose="020F0502020204030204" pitchFamily="34" charset="0"/>
+                <a:ea typeface="Calibri" panose="020F0502020204030204" pitchFamily="34" charset="0"/>
+                <a:cs typeface="Calibri" panose="020F0502020204030204" pitchFamily="34" charset="0"/>
+              </a:rPr>
+              <a:t> </a:t>
+            </a:r>
+            <a:r>
+              <a:rPr lang="pt-PT" sz="2200" dirty="0" err="1">
+                <a:latin typeface="Calibri" panose="020F0502020204030204" pitchFamily="34" charset="0"/>
+                <a:ea typeface="Calibri" panose="020F0502020204030204" pitchFamily="34" charset="0"/>
+                <a:cs typeface="Calibri" panose="020F0502020204030204" pitchFamily="34" charset="0"/>
+              </a:rPr>
+              <a:t>diagram</a:t>
             </a:r>
             <a:endParaRPr lang="pt-PT" dirty="0">
               <a:latin typeface="Calibri" panose="020F0502020204030204" pitchFamily="34" charset="0"/>
@@ -3832,162 +3848,66 @@
           <a:prstGeom prst="rect">
             <a:avLst/>
           </a:prstGeom>
-          <a:solidFill>
-            <a:schemeClr val="dk1">
-              <a:alpha val="50000"/>
-            </a:schemeClr>
-          </a:solidFill>
-          <a:ln w="38100">
-            <a:solidFill>
-              <a:schemeClr val="tx1"/>
-            </a:solidFill>
-          </a:ln>
+          <a:ln/>
         </p:spPr>
         <p:style>
-          <a:lnRef idx="0">
-            <a:scrgbClr r="0" g="0" b="0"/>
+          <a:lnRef idx="2">
+            <a:schemeClr val="dk1"/>
           </a:lnRef>
-          <a:fillRef idx="0">
-            <a:scrgbClr r="0" g="0" b="0"/>
+          <a:fillRef idx="1">
+            <a:schemeClr val="lt1"/>
           </a:fillRef>
           <a:effectRef idx="0">
-            <a:scrgbClr r="0" g="0" b="0"/>
+            <a:schemeClr val="dk1"/>
           </a:effectRef>
           <a:fontRef idx="minor">
-            <a:schemeClr val="lt1"/>
+            <a:schemeClr val="dk1"/>
           </a:fontRef>
         </p:style>
         <p:txBody>
           <a:bodyPr rtlCol="0" anchor="ctr"/>
           <a:lstStyle/>
           <a:p>
-            <a:pPr algn="ctr"/>
-            <a:endParaRPr lang="pt-PT" dirty="0"/>
-          </a:p>
-        </p:txBody>
-      </p:sp>
-      <p:sp>
-        <p:nvSpPr>
-          <p:cNvPr id="6" name="CaixaDeTexto 5">
-            <a:extLst>
-              <a:ext uri="{FF2B5EF4-FFF2-40B4-BE49-F238E27FC236}">
-                <a16:creationId xmlns:a16="http://schemas.microsoft.com/office/drawing/2014/main" id="{F7E58B08-A09D-49A3-BEEC-69277A084225}"/>
-              </a:ext>
-            </a:extLst>
-          </p:cNvPr>
-          <p:cNvSpPr txBox="1"/>
-          <p:nvPr/>
-        </p:nvSpPr>
-        <p:spPr>
-          <a:xfrm>
-            <a:off x="8446123" y="2033659"/>
-            <a:ext cx="2608729" cy="369332"/>
-          </a:xfrm>
-          <a:prstGeom prst="rect">
-            <a:avLst/>
-          </a:prstGeom>
-          <a:noFill/>
-        </p:spPr>
-        <p:txBody>
-          <a:bodyPr wrap="square" rtlCol="0">
-            <a:spAutoFit/>
-          </a:bodyPr>
-          <a:lstStyle/>
-          <a:p>
-            <a:pPr algn="ctr"/>
-            <a:r>
-              <a:rPr lang="pt-PT" dirty="0" err="1">
-                <a:solidFill>
-                  <a:schemeClr val="bg1"/>
-                </a:solidFill>
-              </a:rPr>
-              <a:t>SharedMemory</a:t>
-            </a:r>
-            <a:endParaRPr lang="pt-PT" dirty="0">
-              <a:solidFill>
-                <a:schemeClr val="bg1"/>
-              </a:solidFill>
-            </a:endParaRPr>
-          </a:p>
-        </p:txBody>
-      </p:sp>
-      <p:sp>
-        <p:nvSpPr>
-          <p:cNvPr id="7" name="CaixaDeTexto 6">
-            <a:extLst>
-              <a:ext uri="{FF2B5EF4-FFF2-40B4-BE49-F238E27FC236}">
-                <a16:creationId xmlns:a16="http://schemas.microsoft.com/office/drawing/2014/main" id="{717FB2EE-FF16-4062-967A-B8DA6211FFAC}"/>
-              </a:ext>
-            </a:extLst>
-          </p:cNvPr>
-          <p:cNvSpPr txBox="1"/>
-          <p:nvPr/>
-        </p:nvSpPr>
-        <p:spPr>
-          <a:xfrm>
-            <a:off x="8446124" y="2533784"/>
-            <a:ext cx="2608728" cy="1600438"/>
-          </a:xfrm>
-          <a:prstGeom prst="rect">
-            <a:avLst/>
-          </a:prstGeom>
-          <a:noFill/>
-        </p:spPr>
-        <p:txBody>
-          <a:bodyPr wrap="square" rtlCol="0">
-            <a:spAutoFit/>
-          </a:bodyPr>
-          <a:lstStyle/>
+            <a:r>
+              <a:rPr lang="pt-PT" dirty="0" err="1"/>
+              <a:t>Shared</a:t>
+            </a:r>
+            <a:r>
+              <a:rPr lang="pt-PT" dirty="0"/>
+              <a:t> </a:t>
+            </a:r>
+            <a:r>
+              <a:rPr lang="pt-PT" dirty="0" err="1"/>
+              <a:t>Region</a:t>
+            </a:r>
+            <a:endParaRPr lang="pt-PT" sz="1400" dirty="0"/>
+          </a:p>
           <a:p>
             <a:pPr marL="285750" indent="-285750">
               <a:buFont typeface="Arial" panose="020B0604020202020204" pitchFamily="34" charset="0"/>
               <a:buChar char="•"/>
             </a:pPr>
             <a:r>
-              <a:rPr lang="pt-PT" sz="1400" dirty="0" err="1">
-                <a:solidFill>
-                  <a:schemeClr val="bg1"/>
-                </a:solidFill>
-              </a:rPr>
+              <a:rPr lang="pt-PT" sz="1400" dirty="0" err="1"/>
               <a:t>struct</a:t>
             </a:r>
             <a:r>
-              <a:rPr lang="pt-PT" sz="1400" dirty="0">
-                <a:solidFill>
-                  <a:schemeClr val="bg1"/>
-                </a:solidFill>
-              </a:rPr>
+              <a:rPr lang="pt-PT" sz="1400" dirty="0"/>
               <a:t> </a:t>
             </a:r>
             <a:r>
-              <a:rPr lang="pt-PT" sz="1400" dirty="0" err="1">
-                <a:solidFill>
-                  <a:schemeClr val="bg1"/>
-                </a:solidFill>
-              </a:rPr>
+              <a:rPr lang="pt-PT" sz="1400" dirty="0" err="1"/>
               <a:t>FileResult</a:t>
             </a:r>
             <a:r>
-              <a:rPr lang="pt-PT" sz="1400" dirty="0">
-                <a:solidFill>
-                  <a:schemeClr val="bg1"/>
-                </a:solidFill>
-              </a:rPr>
+              <a:rPr lang="pt-PT" sz="1400" dirty="0"/>
               <a:t>* </a:t>
             </a:r>
             <a:r>
-              <a:rPr lang="pt-PT" sz="1400" dirty="0" err="1">
-                <a:solidFill>
-                  <a:schemeClr val="bg1"/>
-                </a:solidFill>
-              </a:rPr>
+              <a:rPr lang="pt-PT" sz="1400" dirty="0" err="1"/>
               <a:t>fileResults</a:t>
             </a:r>
-            <a:endParaRPr lang="pt-PT" sz="1400" dirty="0">
-              <a:solidFill>
-                <a:schemeClr val="bg1"/>
-              </a:solidFill>
-            </a:endParaRPr>
+            <a:endParaRPr lang="pt-PT" sz="1400" dirty="0"/>
           </a:p>
           <a:p>
             <a:pPr marL="285750" indent="-285750">
@@ -3995,34 +3915,18 @@
               <a:buChar char="•"/>
             </a:pPr>
             <a:r>
-              <a:rPr lang="pt-PT" sz="1400" dirty="0" err="1">
-                <a:solidFill>
-                  <a:schemeClr val="bg1"/>
-                </a:solidFill>
-              </a:rPr>
+              <a:rPr lang="pt-PT" sz="1400" dirty="0" err="1"/>
               <a:t>char</a:t>
             </a:r>
             <a:r>
-              <a:rPr lang="pt-PT" sz="1400" dirty="0">
-                <a:solidFill>
-                  <a:schemeClr val="bg1"/>
-                </a:solidFill>
-              </a:rPr>
+              <a:rPr lang="pt-PT" sz="1400" dirty="0"/>
               <a:t>** </a:t>
             </a:r>
             <a:r>
-              <a:rPr lang="pt-PT" sz="1400" dirty="0" err="1">
-                <a:solidFill>
-                  <a:schemeClr val="bg1"/>
-                </a:solidFill>
-              </a:rPr>
+              <a:rPr lang="pt-PT" sz="1400" dirty="0" err="1"/>
               <a:t>fileNames</a:t>
             </a:r>
-            <a:endParaRPr lang="pt-PT" sz="1400" dirty="0">
-              <a:solidFill>
-                <a:schemeClr val="bg1"/>
-              </a:solidFill>
-            </a:endParaRPr>
+            <a:endParaRPr lang="pt-PT" sz="1400" dirty="0"/>
           </a:p>
           <a:p>
             <a:pPr marL="285750" indent="-285750">
@@ -4030,34 +3934,18 @@
               <a:buChar char="•"/>
             </a:pPr>
             <a:r>
-              <a:rPr lang="pt-PT" sz="1400" dirty="0" err="1">
-                <a:solidFill>
-                  <a:schemeClr val="bg1"/>
-                </a:solidFill>
-              </a:rPr>
+              <a:rPr lang="pt-PT" sz="1400" dirty="0" err="1"/>
               <a:t>int</a:t>
             </a:r>
             <a:r>
-              <a:rPr lang="pt-PT" sz="1400" dirty="0">
-                <a:solidFill>
-                  <a:schemeClr val="bg1"/>
-                </a:solidFill>
-              </a:rPr>
+              <a:rPr lang="pt-PT" sz="1400" dirty="0"/>
               <a:t> </a:t>
             </a:r>
             <a:r>
-              <a:rPr lang="pt-PT" sz="1400" dirty="0" err="1">
-                <a:solidFill>
-                  <a:schemeClr val="bg1"/>
-                </a:solidFill>
-              </a:rPr>
+              <a:rPr lang="pt-PT" sz="1400" dirty="0" err="1"/>
               <a:t>fileId</a:t>
             </a:r>
-            <a:endParaRPr lang="pt-PT" sz="1400" dirty="0">
-              <a:solidFill>
-                <a:schemeClr val="bg1"/>
-              </a:solidFill>
-            </a:endParaRPr>
+            <a:endParaRPr lang="pt-PT" sz="1400" dirty="0"/>
           </a:p>
           <a:p>
             <a:pPr marL="285750" indent="-285750">
@@ -4065,34 +3953,18 @@
               <a:buChar char="•"/>
             </a:pPr>
             <a:r>
-              <a:rPr lang="pt-PT" sz="1400" dirty="0" err="1">
-                <a:solidFill>
-                  <a:schemeClr val="bg1"/>
-                </a:solidFill>
-              </a:rPr>
+              <a:rPr lang="pt-PT" sz="1400" dirty="0" err="1"/>
               <a:t>int</a:t>
             </a:r>
             <a:r>
-              <a:rPr lang="pt-PT" sz="1400" dirty="0">
-                <a:solidFill>
-                  <a:schemeClr val="bg1"/>
-                </a:solidFill>
-              </a:rPr>
+              <a:rPr lang="pt-PT" sz="1400" dirty="0"/>
               <a:t> </a:t>
             </a:r>
             <a:r>
-              <a:rPr lang="pt-PT" sz="1400" dirty="0" err="1">
-                <a:solidFill>
-                  <a:schemeClr val="bg1"/>
-                </a:solidFill>
-              </a:rPr>
+              <a:rPr lang="pt-PT" sz="1400" dirty="0" err="1"/>
               <a:t>totalFiles</a:t>
             </a:r>
-            <a:endParaRPr lang="pt-PT" sz="1400" dirty="0">
-              <a:solidFill>
-                <a:schemeClr val="bg1"/>
-              </a:solidFill>
-            </a:endParaRPr>
+            <a:endParaRPr lang="pt-PT" sz="1400" dirty="0"/>
           </a:p>
           <a:p>
             <a:pPr marL="285750" indent="-285750">
@@ -4100,34 +3972,18 @@
               <a:buChar char="•"/>
             </a:pPr>
             <a:r>
-              <a:rPr lang="pt-PT" sz="1400" dirty="0" err="1">
-                <a:solidFill>
-                  <a:schemeClr val="bg1"/>
-                </a:solidFill>
-              </a:rPr>
+              <a:rPr lang="pt-PT" sz="1400" dirty="0" err="1"/>
               <a:t>int</a:t>
             </a:r>
             <a:r>
-              <a:rPr lang="pt-PT" sz="1400" dirty="0">
-                <a:solidFill>
-                  <a:schemeClr val="bg1"/>
-                </a:solidFill>
-              </a:rPr>
+              <a:rPr lang="pt-PT" sz="1400" dirty="0"/>
               <a:t> </a:t>
             </a:r>
             <a:r>
-              <a:rPr lang="pt-PT" sz="1400" dirty="0" err="1">
-                <a:solidFill>
-                  <a:schemeClr val="bg1"/>
-                </a:solidFill>
-              </a:rPr>
+              <a:rPr lang="pt-PT" sz="1400" dirty="0" err="1"/>
               <a:t>chunkSize</a:t>
             </a:r>
-            <a:endParaRPr lang="pt-PT" sz="1400" dirty="0">
-              <a:solidFill>
-                <a:schemeClr val="bg1"/>
-              </a:solidFill>
-            </a:endParaRPr>
+            <a:endParaRPr lang="pt-PT" sz="1400" dirty="0"/>
           </a:p>
           <a:p>
             <a:pPr marL="285750" indent="-285750">
@@ -4135,34 +3991,18 @@
               <a:buChar char="•"/>
             </a:pPr>
             <a:r>
-              <a:rPr lang="pt-PT" sz="1400" dirty="0" err="1">
-                <a:solidFill>
-                  <a:schemeClr val="bg1"/>
-                </a:solidFill>
-              </a:rPr>
+              <a:rPr lang="pt-PT" sz="1400" dirty="0" err="1"/>
               <a:t>bool</a:t>
             </a:r>
             <a:r>
-              <a:rPr lang="pt-PT" sz="1400" dirty="0">
-                <a:solidFill>
-                  <a:schemeClr val="bg1"/>
-                </a:solidFill>
-              </a:rPr>
+              <a:rPr lang="pt-PT" sz="1400" dirty="0"/>
               <a:t> </a:t>
             </a:r>
             <a:r>
-              <a:rPr lang="pt-PT" sz="1400" dirty="0" err="1">
-                <a:solidFill>
-                  <a:schemeClr val="bg1"/>
-                </a:solidFill>
-              </a:rPr>
+              <a:rPr lang="pt-PT" sz="1400" dirty="0" err="1"/>
               <a:t>openFile</a:t>
             </a:r>
-            <a:endParaRPr lang="pt-PT" sz="1400" dirty="0">
-              <a:solidFill>
-                <a:schemeClr val="bg1"/>
-              </a:solidFill>
-            </a:endParaRPr>
+            <a:endParaRPr lang="pt-PT" sz="1400" dirty="0"/>
           </a:p>
           <a:p>
             <a:pPr marL="285750" indent="-285750">
@@ -4170,26 +4010,18 @@
               <a:buChar char="•"/>
             </a:pPr>
             <a:r>
-              <a:rPr lang="pt-PT" sz="1400" dirty="0">
-                <a:solidFill>
-                  <a:schemeClr val="bg1"/>
-                </a:solidFill>
-              </a:rPr>
+              <a:rPr lang="pt-PT" sz="1400" dirty="0"/>
               <a:t>File* </a:t>
             </a:r>
             <a:r>
-              <a:rPr lang="pt-PT" sz="1400" dirty="0" err="1">
-                <a:solidFill>
-                  <a:schemeClr val="bg1"/>
-                </a:solidFill>
-              </a:rPr>
+              <a:rPr lang="pt-PT" sz="1400" dirty="0" err="1"/>
               <a:t>currentFile</a:t>
             </a:r>
-            <a:endParaRPr lang="pt-PT" sz="1400" dirty="0">
-              <a:solidFill>
-                <a:schemeClr val="bg1"/>
-              </a:solidFill>
-            </a:endParaRPr>
+            <a:endParaRPr lang="pt-PT" sz="1400" dirty="0"/>
+          </a:p>
+          <a:p>
+            <a:pPr algn="ctr"/>
+            <a:endParaRPr lang="pt-PT" dirty="0"/>
           </a:p>
         </p:txBody>
       </p:sp>
@@ -4429,55 +4261,157 @@
       </p:sp>
       <p:sp>
         <p:nvSpPr>
-          <p:cNvPr id="15" name="CaixaDeTexto 14">
+          <p:cNvPr id="3" name="Oval 2">
             <a:extLst>
               <a:ext uri="{FF2B5EF4-FFF2-40B4-BE49-F238E27FC236}">
-                <a16:creationId xmlns:a16="http://schemas.microsoft.com/office/drawing/2014/main" id="{76F53E89-4251-4B7E-BFF6-5604277C9C8F}"/>
+                <a16:creationId xmlns:a16="http://schemas.microsoft.com/office/drawing/2014/main" id="{791F2C36-FF8A-8503-D50C-6E21F53831B1}"/>
               </a:ext>
             </a:extLst>
           </p:cNvPr>
-          <p:cNvSpPr txBox="1"/>
+          <p:cNvSpPr/>
           <p:nvPr/>
         </p:nvSpPr>
         <p:spPr>
           <a:xfrm>
-            <a:off x="2948703" y="2033659"/>
-            <a:ext cx="2439770" cy="369332"/>
+            <a:off x="1988474" y="2019521"/>
+            <a:ext cx="1090569" cy="1090569"/>
           </a:xfrm>
-          <a:prstGeom prst="rect">
+          <a:prstGeom prst="ellipse">
             <a:avLst/>
           </a:prstGeom>
-          <a:noFill/>
+          <a:ln>
+            <a:headEnd type="none" w="med" len="med"/>
+            <a:tailEnd type="none" w="med" len="med"/>
+          </a:ln>
         </p:spPr>
-        <p:txBody>
-          <a:bodyPr wrap="square" rtlCol="0">
-            <a:spAutoFit/>
-          </a:bodyPr>
+        <p:style>
+          <a:lnRef idx="2">
+            <a:schemeClr val="dk1"/>
+          </a:lnRef>
+          <a:fillRef idx="1">
+            <a:schemeClr val="lt1"/>
+          </a:fillRef>
+          <a:effectRef idx="0">
+            <a:schemeClr val="dk1"/>
+          </a:effectRef>
+          <a:fontRef idx="minor">
+            <a:schemeClr val="dk1"/>
+          </a:fontRef>
+        </p:style>
+        <p:txBody>
+          <a:bodyPr rtlCol="0" anchor="ctr"/>
           <a:lstStyle/>
           <a:p>
             <a:pPr algn="ctr"/>
             <a:r>
-              <a:rPr lang="pt-PT" dirty="0" err="1"/>
-              <a:t>Threads</a:t>
-            </a:r>
-            <a:r>
               <a:rPr lang="pt-PT" dirty="0"/>
-              <a:t> </a:t>
-            </a:r>
-            <a:r>
-              <a:rPr lang="pt-PT" dirty="0" err="1"/>
-              <a:t>initialization</a:t>
-            </a:r>
-            <a:endParaRPr lang="pt-PT" dirty="0"/>
+              <a:t>Main</a:t>
+            </a:r>
           </a:p>
         </p:txBody>
       </p:sp>
       <p:cxnSp>
         <p:nvCxnSpPr>
-          <p:cNvPr id="17" name="Conexão reta unidirecional 16">
+          <p:cNvPr id="8" name="Conexão reta unidirecional 7">
             <a:extLst>
               <a:ext uri="{FF2B5EF4-FFF2-40B4-BE49-F238E27FC236}">
-                <a16:creationId xmlns:a16="http://schemas.microsoft.com/office/drawing/2014/main" id="{553E32DC-E45B-44D9-80E9-55F80C45FA56}"/>
+                <a16:creationId xmlns:a16="http://schemas.microsoft.com/office/drawing/2014/main" id="{24EF4C42-522C-72FB-0974-BA6BB336B72D}"/>
+              </a:ext>
+            </a:extLst>
+          </p:cNvPr>
+          <p:cNvCxnSpPr>
+            <a:stCxn id="3" idx="6"/>
+          </p:cNvCxnSpPr>
+          <p:nvPr/>
+        </p:nvCxnSpPr>
+        <p:spPr>
+          <a:xfrm>
+            <a:off x="3079043" y="2564806"/>
+            <a:ext cx="5367080" cy="10614"/>
+          </a:xfrm>
+          <a:prstGeom prst="straightConnector1">
+            <a:avLst/>
+          </a:prstGeom>
+          <a:ln>
+            <a:tailEnd type="triangle"/>
+          </a:ln>
+        </p:spPr>
+        <p:style>
+          <a:lnRef idx="1">
+            <a:schemeClr val="dk1"/>
+          </a:lnRef>
+          <a:fillRef idx="0">
+            <a:schemeClr val="dk1"/>
+          </a:fillRef>
+          <a:effectRef idx="0">
+            <a:schemeClr val="dk1"/>
+          </a:effectRef>
+          <a:fontRef idx="minor">
+            <a:schemeClr val="tx1"/>
+          </a:fontRef>
+        </p:style>
+      </p:cxnSp>
+      <p:sp>
+        <p:nvSpPr>
+          <p:cNvPr id="9" name="Oval 8">
+            <a:extLst>
+              <a:ext uri="{FF2B5EF4-FFF2-40B4-BE49-F238E27FC236}">
+                <a16:creationId xmlns:a16="http://schemas.microsoft.com/office/drawing/2014/main" id="{8F1A33A3-E536-B0D3-5A1A-55CA7228B7FD}"/>
+              </a:ext>
+            </a:extLst>
+          </p:cNvPr>
+          <p:cNvSpPr/>
+          <p:nvPr/>
+        </p:nvSpPr>
+        <p:spPr>
+          <a:xfrm>
+            <a:off x="3953944" y="3032243"/>
+            <a:ext cx="1090569" cy="1090569"/>
+          </a:xfrm>
+          <a:prstGeom prst="ellipse">
+            <a:avLst/>
+          </a:prstGeom>
+          <a:ln>
+            <a:headEnd type="none" w="med" len="med"/>
+            <a:tailEnd type="none" w="med" len="med"/>
+          </a:ln>
+        </p:spPr>
+        <p:style>
+          <a:lnRef idx="2">
+            <a:schemeClr val="dk1"/>
+          </a:lnRef>
+          <a:fillRef idx="1">
+            <a:schemeClr val="lt1"/>
+          </a:fillRef>
+          <a:effectRef idx="0">
+            <a:schemeClr val="dk1"/>
+          </a:effectRef>
+          <a:fontRef idx="minor">
+            <a:schemeClr val="dk1"/>
+          </a:fontRef>
+        </p:style>
+        <p:txBody>
+          <a:bodyPr rtlCol="0" anchor="ctr"/>
+          <a:lstStyle/>
+          <a:p>
+            <a:pPr algn="ctr"/>
+            <a:r>
+              <a:rPr lang="pt-PT" sz="1400" dirty="0" err="1"/>
+              <a:t>Worker</a:t>
+            </a:r>
+            <a:r>
+              <a:rPr lang="pt-PT" sz="1400" dirty="0"/>
+              <a:t>[n]</a:t>
+            </a:r>
+          </a:p>
+        </p:txBody>
+      </p:sp>
+      <p:cxnSp>
+        <p:nvCxnSpPr>
+          <p:cNvPr id="11" name="Conexão reta unidirecional 10">
+            <a:extLst>
+              <a:ext uri="{FF2B5EF4-FFF2-40B4-BE49-F238E27FC236}">
+                <a16:creationId xmlns:a16="http://schemas.microsoft.com/office/drawing/2014/main" id="{31403509-54BC-7649-9F16-A3C4D7049008}"/>
               </a:ext>
             </a:extLst>
           </p:cNvPr>
@@ -4488,8 +4422,8 @@
         </p:nvCxnSpPr>
         <p:spPr>
           <a:xfrm>
-            <a:off x="4150660" y="2420921"/>
-            <a:ext cx="0" cy="322280"/>
+            <a:off x="3020037" y="2810312"/>
+            <a:ext cx="954269" cy="599638"/>
           </a:xfrm>
           <a:prstGeom prst="straightConnector1">
             <a:avLst/>
@@ -4500,171 +4434,37 @@
         </p:spPr>
         <p:style>
           <a:lnRef idx="1">
-            <a:schemeClr val="accent1"/>
+            <a:schemeClr val="dk1"/>
           </a:lnRef>
           <a:fillRef idx="0">
-            <a:schemeClr val="accent1"/>
+            <a:schemeClr val="dk1"/>
           </a:fillRef>
           <a:effectRef idx="0">
-            <a:schemeClr val="accent1"/>
+            <a:schemeClr val="dk1"/>
           </a:effectRef>
           <a:fontRef idx="minor">
             <a:schemeClr val="tx1"/>
           </a:fontRef>
         </p:style>
       </p:cxnSp>
-      <p:sp>
-        <p:nvSpPr>
-          <p:cNvPr id="19" name="CaixaDeTexto 18">
+      <p:cxnSp>
+        <p:nvCxnSpPr>
+          <p:cNvPr id="34" name="Conexão reta unidirecional 33">
             <a:extLst>
               <a:ext uri="{FF2B5EF4-FFF2-40B4-BE49-F238E27FC236}">
-                <a16:creationId xmlns:a16="http://schemas.microsoft.com/office/drawing/2014/main" id="{18BF5EFF-4E50-4808-BEBF-076E982D032A}"/>
-              </a:ext>
-            </a:extLst>
-          </p:cNvPr>
-          <p:cNvSpPr txBox="1"/>
-          <p:nvPr/>
-        </p:nvSpPr>
-        <p:spPr>
-          <a:xfrm>
-            <a:off x="2948703" y="2725271"/>
-            <a:ext cx="2439770" cy="369332"/>
-          </a:xfrm>
-          <a:prstGeom prst="rect">
-            <a:avLst/>
-          </a:prstGeom>
-          <a:noFill/>
-        </p:spPr>
-        <p:txBody>
-          <a:bodyPr wrap="square" rtlCol="0">
-            <a:spAutoFit/>
-          </a:bodyPr>
-          <a:lstStyle/>
-          <a:p>
-            <a:pPr algn="ctr"/>
-            <a:r>
-              <a:rPr lang="pt-PT" dirty="0" err="1"/>
-              <a:t>Fill</a:t>
-            </a:r>
-            <a:r>
-              <a:rPr lang="pt-PT" dirty="0"/>
-              <a:t> </a:t>
-            </a:r>
-            <a:r>
-              <a:rPr lang="pt-PT" dirty="0" err="1"/>
-              <a:t>shared</a:t>
-            </a:r>
-            <a:r>
-              <a:rPr lang="pt-PT" dirty="0"/>
-              <a:t> </a:t>
-            </a:r>
-            <a:r>
-              <a:rPr lang="pt-PT" dirty="0" err="1"/>
-              <a:t>memory</a:t>
-            </a:r>
-            <a:endParaRPr lang="pt-PT" dirty="0"/>
-          </a:p>
-        </p:txBody>
-      </p:sp>
-      <p:sp>
-        <p:nvSpPr>
-          <p:cNvPr id="21" name="CaixaDeTexto 20">
-            <a:extLst>
-              <a:ext uri="{FF2B5EF4-FFF2-40B4-BE49-F238E27FC236}">
-                <a16:creationId xmlns:a16="http://schemas.microsoft.com/office/drawing/2014/main" id="{6BA57DE3-534E-4077-931E-473808C41764}"/>
-              </a:ext>
-            </a:extLst>
-          </p:cNvPr>
-          <p:cNvSpPr txBox="1"/>
-          <p:nvPr/>
-        </p:nvSpPr>
-        <p:spPr>
-          <a:xfrm>
-            <a:off x="2930775" y="3416883"/>
-            <a:ext cx="2439770" cy="369332"/>
-          </a:xfrm>
-          <a:prstGeom prst="rect">
-            <a:avLst/>
-          </a:prstGeom>
-          <a:noFill/>
-        </p:spPr>
-        <p:txBody>
-          <a:bodyPr wrap="square" rtlCol="0">
-            <a:spAutoFit/>
-          </a:bodyPr>
-          <a:lstStyle/>
-          <a:p>
-            <a:pPr algn="ctr"/>
-            <a:r>
-              <a:rPr lang="pt-PT" dirty="0" err="1"/>
-              <a:t>Start</a:t>
-            </a:r>
-            <a:r>
-              <a:rPr lang="pt-PT" dirty="0"/>
-              <a:t> </a:t>
-            </a:r>
-            <a:r>
-              <a:rPr lang="pt-PT" dirty="0" err="1"/>
-              <a:t>threads</a:t>
-            </a:r>
-            <a:endParaRPr lang="pt-PT" dirty="0"/>
-          </a:p>
-        </p:txBody>
-      </p:sp>
-      <p:sp>
-        <p:nvSpPr>
-          <p:cNvPr id="23" name="CaixaDeTexto 22">
-            <a:extLst>
-              <a:ext uri="{FF2B5EF4-FFF2-40B4-BE49-F238E27FC236}">
-                <a16:creationId xmlns:a16="http://schemas.microsoft.com/office/drawing/2014/main" id="{E414D643-A511-4194-8DD4-1D009D671CD4}"/>
-              </a:ext>
-            </a:extLst>
-          </p:cNvPr>
-          <p:cNvSpPr txBox="1"/>
-          <p:nvPr/>
-        </p:nvSpPr>
-        <p:spPr>
-          <a:xfrm>
-            <a:off x="2948703" y="4103347"/>
-            <a:ext cx="2439770" cy="369332"/>
-          </a:xfrm>
-          <a:prstGeom prst="rect">
-            <a:avLst/>
-          </a:prstGeom>
-          <a:noFill/>
-        </p:spPr>
-        <p:txBody>
-          <a:bodyPr wrap="square" rtlCol="0">
-            <a:spAutoFit/>
-          </a:bodyPr>
-          <a:lstStyle/>
-          <a:p>
-            <a:pPr algn="ctr"/>
-            <a:r>
-              <a:rPr lang="pt-PT" dirty="0"/>
-              <a:t>…</a:t>
-            </a:r>
-          </a:p>
-        </p:txBody>
-      </p:sp>
-      <p:cxnSp>
-        <p:nvCxnSpPr>
-          <p:cNvPr id="25" name="Conexão reta unidirecional 24">
-            <a:extLst>
-              <a:ext uri="{FF2B5EF4-FFF2-40B4-BE49-F238E27FC236}">
-                <a16:creationId xmlns:a16="http://schemas.microsoft.com/office/drawing/2014/main" id="{45FA949B-C680-423D-BB75-E98626B23652}"/>
+                <a16:creationId xmlns:a16="http://schemas.microsoft.com/office/drawing/2014/main" id="{64B5B1AF-29A0-AE8A-4D84-201D4ED0DFA7}"/>
               </a:ext>
             </a:extLst>
           </p:cNvPr>
           <p:cNvCxnSpPr>
-            <a:cxnSpLocks/>
+            <a:stCxn id="9" idx="6"/>
           </p:cNvCxnSpPr>
           <p:nvPr/>
         </p:nvCxnSpPr>
         <p:spPr>
-          <a:xfrm>
-            <a:off x="4150660" y="3110756"/>
-            <a:ext cx="0" cy="322280"/>
+          <a:xfrm flipV="1">
+            <a:off x="5044513" y="3577527"/>
+            <a:ext cx="3401610" cy="1"/>
           </a:xfrm>
           <a:prstGeom prst="straightConnector1">
             <a:avLst/>
@@ -4675,107 +4475,25 @@
         </p:spPr>
         <p:style>
           <a:lnRef idx="1">
-            <a:schemeClr val="accent1"/>
+            <a:schemeClr val="dk1"/>
           </a:lnRef>
           <a:fillRef idx="0">
-            <a:schemeClr val="accent1"/>
+            <a:schemeClr val="dk1"/>
           </a:fillRef>
           <a:effectRef idx="0">
-            <a:schemeClr val="accent1"/>
+            <a:schemeClr val="dk1"/>
           </a:effectRef>
           <a:fontRef idx="minor">
             <a:schemeClr val="tx1"/>
           </a:fontRef>
         </p:style>
       </p:cxnSp>
-      <p:cxnSp>
-        <p:nvCxnSpPr>
-          <p:cNvPr id="26" name="Conexão reta unidirecional 25">
+      <p:sp>
+        <p:nvSpPr>
+          <p:cNvPr id="35" name="CaixaDeTexto 34">
             <a:extLst>
               <a:ext uri="{FF2B5EF4-FFF2-40B4-BE49-F238E27FC236}">
-                <a16:creationId xmlns:a16="http://schemas.microsoft.com/office/drawing/2014/main" id="{E91AF71E-F317-4336-9015-4FF8C192AB67}"/>
-              </a:ext>
-            </a:extLst>
-          </p:cNvPr>
-          <p:cNvCxnSpPr>
-            <a:cxnSpLocks/>
-          </p:cNvCxnSpPr>
-          <p:nvPr/>
-        </p:nvCxnSpPr>
-        <p:spPr>
-          <a:xfrm>
-            <a:off x="4150660" y="3834856"/>
-            <a:ext cx="0" cy="322280"/>
-          </a:xfrm>
-          <a:prstGeom prst="straightConnector1">
-            <a:avLst/>
-          </a:prstGeom>
-          <a:ln>
-            <a:tailEnd type="triangle"/>
-          </a:ln>
-        </p:spPr>
-        <p:style>
-          <a:lnRef idx="1">
-            <a:schemeClr val="accent1"/>
-          </a:lnRef>
-          <a:fillRef idx="0">
-            <a:schemeClr val="accent1"/>
-          </a:fillRef>
-          <a:effectRef idx="0">
-            <a:schemeClr val="accent1"/>
-          </a:effectRef>
-          <a:fontRef idx="minor">
-            <a:schemeClr val="tx1"/>
-          </a:fontRef>
-        </p:style>
-      </p:cxnSp>
-      <p:cxnSp>
-        <p:nvCxnSpPr>
-          <p:cNvPr id="27" name="Conexão reta unidirecional 26">
-            <a:extLst>
-              <a:ext uri="{FF2B5EF4-FFF2-40B4-BE49-F238E27FC236}">
-                <a16:creationId xmlns:a16="http://schemas.microsoft.com/office/drawing/2014/main" id="{ADEA7A9B-3DC0-4453-9776-B6D778BD5870}"/>
-              </a:ext>
-            </a:extLst>
-          </p:cNvPr>
-          <p:cNvCxnSpPr>
-            <a:cxnSpLocks/>
-          </p:cNvCxnSpPr>
-          <p:nvPr/>
-        </p:nvCxnSpPr>
-        <p:spPr>
-          <a:xfrm>
-            <a:off x="4141696" y="4481644"/>
-            <a:ext cx="0" cy="322280"/>
-          </a:xfrm>
-          <a:prstGeom prst="straightConnector1">
-            <a:avLst/>
-          </a:prstGeom>
-          <a:ln>
-            <a:tailEnd type="triangle"/>
-          </a:ln>
-        </p:spPr>
-        <p:style>
-          <a:lnRef idx="1">
-            <a:schemeClr val="accent1"/>
-          </a:lnRef>
-          <a:fillRef idx="0">
-            <a:schemeClr val="accent1"/>
-          </a:fillRef>
-          <a:effectRef idx="0">
-            <a:schemeClr val="accent1"/>
-          </a:effectRef>
-          <a:fontRef idx="minor">
-            <a:schemeClr val="tx1"/>
-          </a:fontRef>
-        </p:style>
-      </p:cxnSp>
-      <p:sp>
-        <p:nvSpPr>
-          <p:cNvPr id="28" name="CaixaDeTexto 27">
-            <a:extLst>
-              <a:ext uri="{FF2B5EF4-FFF2-40B4-BE49-F238E27FC236}">
-                <a16:creationId xmlns:a16="http://schemas.microsoft.com/office/drawing/2014/main" id="{CF274CB7-C6D3-4DF0-9E0C-6A7048985AF8}"/>
+                <a16:creationId xmlns:a16="http://schemas.microsoft.com/office/drawing/2014/main" id="{30CF57D2-8CE2-92F6-EC1A-F213959268AA}"/>
               </a:ext>
             </a:extLst>
           </p:cNvPr>
@@ -4784,8 +4502,8 @@
         </p:nvSpPr>
         <p:spPr>
           <a:xfrm>
-            <a:off x="2948703" y="4789811"/>
-            <a:ext cx="2439770" cy="369332"/>
+            <a:off x="3484542" y="2810312"/>
+            <a:ext cx="142329" cy="369332"/>
           </a:xfrm>
           <a:prstGeom prst="rect">
             <a:avLst/>
@@ -4798,70 +4516,19 @@
           </a:bodyPr>
           <a:lstStyle/>
           <a:p>
-            <a:pPr algn="ctr"/>
-            <a:r>
-              <a:rPr lang="pt-PT" dirty="0" err="1"/>
-              <a:t>Wait</a:t>
-            </a:r>
             <a:r>
               <a:rPr lang="pt-PT" dirty="0"/>
-              <a:t> </a:t>
-            </a:r>
-            <a:r>
-              <a:rPr lang="pt-PT" dirty="0" err="1"/>
-              <a:t>workers</a:t>
-            </a:r>
-            <a:endParaRPr lang="pt-PT" dirty="0"/>
-          </a:p>
-        </p:txBody>
-      </p:sp>
-      <p:cxnSp>
-        <p:nvCxnSpPr>
-          <p:cNvPr id="29" name="Conexão reta unidirecional 28">
+              <a:t>1</a:t>
+            </a:r>
+          </a:p>
+        </p:txBody>
+      </p:sp>
+      <p:sp>
+        <p:nvSpPr>
+          <p:cNvPr id="36" name="CaixaDeTexto 35">
             <a:extLst>
               <a:ext uri="{FF2B5EF4-FFF2-40B4-BE49-F238E27FC236}">
-                <a16:creationId xmlns:a16="http://schemas.microsoft.com/office/drawing/2014/main" id="{93496383-EDDC-4F00-B3EB-BFF4FFFD26DF}"/>
-              </a:ext>
-            </a:extLst>
-          </p:cNvPr>
-          <p:cNvCxnSpPr>
-            <a:cxnSpLocks/>
-          </p:cNvCxnSpPr>
-          <p:nvPr/>
-        </p:nvCxnSpPr>
-        <p:spPr>
-          <a:xfrm>
-            <a:off x="4141696" y="5159143"/>
-            <a:ext cx="0" cy="322280"/>
-          </a:xfrm>
-          <a:prstGeom prst="straightConnector1">
-            <a:avLst/>
-          </a:prstGeom>
-          <a:ln>
-            <a:tailEnd type="triangle"/>
-          </a:ln>
-        </p:spPr>
-        <p:style>
-          <a:lnRef idx="1">
-            <a:schemeClr val="accent1"/>
-          </a:lnRef>
-          <a:fillRef idx="0">
-            <a:schemeClr val="accent1"/>
-          </a:fillRef>
-          <a:effectRef idx="0">
-            <a:schemeClr val="accent1"/>
-          </a:effectRef>
-          <a:fontRef idx="minor">
-            <a:schemeClr val="tx1"/>
-          </a:fontRef>
-        </p:style>
-      </p:cxnSp>
-      <p:sp>
-        <p:nvSpPr>
-          <p:cNvPr id="30" name="CaixaDeTexto 29">
-            <a:extLst>
-              <a:ext uri="{FF2B5EF4-FFF2-40B4-BE49-F238E27FC236}">
-                <a16:creationId xmlns:a16="http://schemas.microsoft.com/office/drawing/2014/main" id="{B3339711-D1E5-487A-800C-1663429EA463}"/>
+                <a16:creationId xmlns:a16="http://schemas.microsoft.com/office/drawing/2014/main" id="{CDCE6BB6-80F6-7A47-4882-D3DF9B80C9F5}"/>
               </a:ext>
             </a:extLst>
           </p:cNvPr>
@@ -4870,8 +4537,8 @@
         </p:nvSpPr>
         <p:spPr>
           <a:xfrm>
-            <a:off x="2948703" y="5514362"/>
-            <a:ext cx="2439770" cy="369332"/>
+            <a:off x="5620253" y="2235539"/>
+            <a:ext cx="142329" cy="369332"/>
           </a:xfrm>
           <a:prstGeom prst="rect">
             <a:avLst/>
@@ -4884,16 +4551,362 @@
           </a:bodyPr>
           <a:lstStyle/>
           <a:p>
-            <a:pPr algn="ctr"/>
             <a:r>
               <a:rPr lang="pt-PT" dirty="0"/>
-              <a:t>Print </a:t>
-            </a:r>
-            <a:r>
-              <a:rPr lang="pt-PT" dirty="0" err="1"/>
+              <a:t>2</a:t>
+            </a:r>
+          </a:p>
+        </p:txBody>
+      </p:sp>
+      <p:sp>
+        <p:nvSpPr>
+          <p:cNvPr id="37" name="CaixaDeTexto 36">
+            <a:extLst>
+              <a:ext uri="{FF2B5EF4-FFF2-40B4-BE49-F238E27FC236}">
+                <a16:creationId xmlns:a16="http://schemas.microsoft.com/office/drawing/2014/main" id="{C19BA16D-E817-74E9-8926-8AA3E42BDEAC}"/>
+              </a:ext>
+            </a:extLst>
+          </p:cNvPr>
+          <p:cNvSpPr txBox="1"/>
+          <p:nvPr/>
+        </p:nvSpPr>
+        <p:spPr>
+          <a:xfrm>
+            <a:off x="6614796" y="3244334"/>
+            <a:ext cx="142329" cy="369332"/>
+          </a:xfrm>
+          <a:prstGeom prst="rect">
+            <a:avLst/>
+          </a:prstGeom>
+          <a:noFill/>
+        </p:spPr>
+        <p:txBody>
+          <a:bodyPr wrap="square" rtlCol="0">
+            <a:spAutoFit/>
+          </a:bodyPr>
+          <a:lstStyle/>
+          <a:p>
+            <a:r>
+              <a:rPr lang="pt-PT" dirty="0"/>
+              <a:t>3</a:t>
+            </a:r>
+          </a:p>
+        </p:txBody>
+      </p:sp>
+      <p:sp>
+        <p:nvSpPr>
+          <p:cNvPr id="38" name="CaixaDeTexto 37">
+            <a:extLst>
+              <a:ext uri="{FF2B5EF4-FFF2-40B4-BE49-F238E27FC236}">
+                <a16:creationId xmlns:a16="http://schemas.microsoft.com/office/drawing/2014/main" id="{84E5CD45-DCFD-7E28-F5B8-C972B21EFD70}"/>
+              </a:ext>
+            </a:extLst>
+          </p:cNvPr>
+          <p:cNvSpPr txBox="1"/>
+          <p:nvPr/>
+        </p:nvSpPr>
+        <p:spPr>
+          <a:xfrm>
+            <a:off x="293615" y="4014448"/>
+            <a:ext cx="7843706" cy="1785104"/>
+          </a:xfrm>
+          <a:prstGeom prst="rect">
+            <a:avLst/>
+          </a:prstGeom>
+          <a:noFill/>
+        </p:spPr>
+        <p:txBody>
+          <a:bodyPr wrap="square" rtlCol="0">
+            <a:spAutoFit/>
+          </a:bodyPr>
+          <a:lstStyle/>
+          <a:p>
+            <a:r>
+              <a:rPr lang="pt-PT" sz="1400" b="1" dirty="0" err="1"/>
+              <a:t>Legend</a:t>
+            </a:r>
+            <a:endParaRPr lang="pt-PT" sz="1400" b="1" dirty="0"/>
+          </a:p>
+          <a:p>
+            <a:r>
+              <a:rPr lang="pt-PT" sz="1200" dirty="0"/>
+              <a:t>1</a:t>
+            </a:r>
+          </a:p>
+          <a:p>
+            <a:pPr marL="171450" indent="-171450">
+              <a:buFont typeface="Arial" panose="020B0604020202020204" pitchFamily="34" charset="0"/>
+              <a:buChar char="•"/>
+            </a:pPr>
+            <a:r>
+              <a:rPr lang="pt-PT" sz="1200" dirty="0" err="1"/>
+              <a:t>init</a:t>
+            </a:r>
+            <a:r>
+              <a:rPr lang="pt-PT" sz="1200" dirty="0"/>
+              <a:t> and </a:t>
+            </a:r>
+            <a:r>
+              <a:rPr lang="pt-PT" sz="1200" dirty="0" err="1"/>
+              <a:t>start</a:t>
+            </a:r>
+            <a:r>
+              <a:rPr lang="pt-PT" sz="1200" dirty="0"/>
+              <a:t> </a:t>
+            </a:r>
+            <a:r>
+              <a:rPr lang="pt-PT" sz="1200" dirty="0" err="1"/>
+              <a:t>workers</a:t>
+            </a:r>
+            <a:endParaRPr lang="pt-PT" sz="1200" dirty="0"/>
+          </a:p>
+          <a:p>
+            <a:r>
+              <a:rPr lang="pt-PT" sz="1200" dirty="0"/>
+              <a:t>2</a:t>
+            </a:r>
+          </a:p>
+          <a:p>
+            <a:pPr marL="171450" indent="-171450">
+              <a:buFont typeface="Arial" panose="020B0604020202020204" pitchFamily="34" charset="0"/>
+              <a:buChar char="•"/>
+            </a:pPr>
+            <a:r>
+              <a:rPr lang="pt-PT" sz="1200" dirty="0" err="1"/>
+              <a:t>fillSharedMem</a:t>
+            </a:r>
+            <a:r>
+              <a:rPr lang="pt-PT" sz="1200" dirty="0"/>
+              <a:t> – </a:t>
+            </a:r>
+            <a:r>
+              <a:rPr lang="pt-PT" sz="1200" dirty="0" err="1"/>
+              <a:t>fill</a:t>
+            </a:r>
+            <a:r>
+              <a:rPr lang="pt-PT" sz="1200" dirty="0"/>
+              <a:t> </a:t>
+            </a:r>
+            <a:r>
+              <a:rPr lang="pt-PT" sz="1200" dirty="0" err="1"/>
+              <a:t>shared</a:t>
+            </a:r>
+            <a:r>
+              <a:rPr lang="pt-PT" sz="1200" dirty="0"/>
+              <a:t> </a:t>
+            </a:r>
+            <a:r>
+              <a:rPr lang="pt-PT" sz="1200" dirty="0" err="1"/>
+              <a:t>memory</a:t>
+            </a:r>
+            <a:r>
+              <a:rPr lang="pt-PT" sz="1200" dirty="0"/>
+              <a:t> </a:t>
+            </a:r>
+            <a:r>
+              <a:rPr lang="pt-PT" sz="1200" dirty="0" err="1"/>
+              <a:t>with</a:t>
+            </a:r>
+            <a:r>
+              <a:rPr lang="pt-PT" sz="1200" dirty="0"/>
+              <a:t> file </a:t>
+            </a:r>
+            <a:r>
+              <a:rPr lang="pt-PT" sz="1200" dirty="0" err="1"/>
+              <a:t>names</a:t>
+            </a:r>
+            <a:r>
+              <a:rPr lang="pt-PT" sz="1200" dirty="0"/>
+              <a:t>; </a:t>
+            </a:r>
+            <a:r>
+              <a:rPr lang="pt-PT" sz="1200" dirty="0" err="1"/>
+              <a:t>initialize</a:t>
+            </a:r>
+            <a:r>
+              <a:rPr lang="pt-PT" sz="1200" dirty="0"/>
+              <a:t> </a:t>
+            </a:r>
+            <a:r>
+              <a:rPr lang="pt-PT" sz="1200" dirty="0" err="1"/>
+              <a:t>remaining</a:t>
+            </a:r>
+            <a:r>
+              <a:rPr lang="pt-PT" sz="1200" dirty="0"/>
+              <a:t> </a:t>
+            </a:r>
+            <a:r>
+              <a:rPr lang="pt-PT" sz="1200" dirty="0" err="1"/>
+              <a:t>entites</a:t>
+            </a:r>
+            <a:r>
+              <a:rPr lang="pt-PT" sz="1200" dirty="0"/>
+              <a:t> </a:t>
+            </a:r>
+            <a:r>
+              <a:rPr lang="pt-PT" sz="1200" dirty="0" err="1"/>
+              <a:t>with</a:t>
+            </a:r>
+            <a:r>
+              <a:rPr lang="pt-PT" sz="1200" dirty="0"/>
+              <a:t> </a:t>
+            </a:r>
+            <a:r>
+              <a:rPr lang="pt-PT" sz="1200" dirty="0" err="1"/>
+              <a:t>default</a:t>
+            </a:r>
+            <a:r>
+              <a:rPr lang="pt-PT" sz="1200" dirty="0"/>
+              <a:t> </a:t>
+            </a:r>
+            <a:r>
+              <a:rPr lang="pt-PT" sz="1200" dirty="0" err="1"/>
+              <a:t>values</a:t>
+            </a:r>
+            <a:endParaRPr lang="pt-PT" sz="1200" dirty="0"/>
+          </a:p>
+          <a:p>
+            <a:pPr marL="171450" indent="-171450">
+              <a:buFont typeface="Arial" panose="020B0604020202020204" pitchFamily="34" charset="0"/>
+              <a:buChar char="•"/>
+            </a:pPr>
+            <a:r>
+              <a:rPr lang="pt-PT" sz="1200" dirty="0" err="1"/>
+              <a:t>printResults</a:t>
+            </a:r>
+            <a:r>
+              <a:rPr lang="pt-PT" sz="1200" dirty="0"/>
+              <a:t> – print </a:t>
+            </a:r>
+            <a:r>
+              <a:rPr lang="pt-PT" sz="1200" dirty="0" err="1"/>
+              <a:t>all</a:t>
+            </a:r>
+            <a:r>
+              <a:rPr lang="pt-PT" sz="1200" dirty="0"/>
+              <a:t> </a:t>
+            </a:r>
+            <a:r>
+              <a:rPr lang="pt-PT" sz="1200" dirty="0" err="1"/>
+              <a:t>obtained</a:t>
+            </a:r>
+            <a:r>
+              <a:rPr lang="pt-PT" sz="1200" dirty="0"/>
+              <a:t> file </a:t>
+            </a:r>
+            <a:r>
+              <a:rPr lang="pt-PT" sz="1200" dirty="0" err="1"/>
               <a:t>results</a:t>
             </a:r>
-            <a:endParaRPr lang="pt-PT" dirty="0"/>
+            <a:endParaRPr lang="pt-PT" sz="1200" dirty="0"/>
+          </a:p>
+          <a:p>
+            <a:r>
+              <a:rPr lang="pt-PT" sz="1200" dirty="0"/>
+              <a:t>3</a:t>
+            </a:r>
+          </a:p>
+          <a:p>
+            <a:pPr marL="171450" indent="-171450">
+              <a:buFont typeface="Arial" panose="020B0604020202020204" pitchFamily="34" charset="0"/>
+              <a:buChar char="•"/>
+            </a:pPr>
+            <a:r>
+              <a:rPr lang="pt-PT" sz="1200" dirty="0" err="1"/>
+              <a:t>requestChunk</a:t>
+            </a:r>
+            <a:r>
+              <a:rPr lang="pt-PT" sz="1200" dirty="0"/>
+              <a:t> – </a:t>
+            </a:r>
+            <a:r>
+              <a:rPr lang="pt-PT" sz="1200" dirty="0" err="1"/>
+              <a:t>request</a:t>
+            </a:r>
+            <a:r>
+              <a:rPr lang="pt-PT" sz="1200" dirty="0"/>
+              <a:t> a </a:t>
+            </a:r>
+            <a:r>
+              <a:rPr lang="pt-PT" sz="1200" dirty="0" err="1"/>
+              <a:t>chunk</a:t>
+            </a:r>
+            <a:r>
+              <a:rPr lang="pt-PT" sz="1200" dirty="0"/>
+              <a:t> of </a:t>
+            </a:r>
+            <a:r>
+              <a:rPr lang="pt-PT" sz="1200" dirty="0" err="1"/>
+              <a:t>text</a:t>
+            </a:r>
+            <a:r>
+              <a:rPr lang="pt-PT" sz="1200" dirty="0"/>
+              <a:t> to </a:t>
+            </a:r>
+            <a:r>
+              <a:rPr lang="pt-PT" sz="1200" dirty="0" err="1"/>
+              <a:t>be</a:t>
+            </a:r>
+            <a:r>
+              <a:rPr lang="pt-PT" sz="1200" dirty="0"/>
+              <a:t> </a:t>
+            </a:r>
+            <a:r>
+              <a:rPr lang="pt-PT" sz="1200" dirty="0" err="1"/>
+              <a:t>processed</a:t>
+            </a:r>
+            <a:endParaRPr lang="pt-PT" sz="1200" dirty="0"/>
+          </a:p>
+          <a:p>
+            <a:pPr marL="171450" indent="-171450">
+              <a:buFont typeface="Arial" panose="020B0604020202020204" pitchFamily="34" charset="0"/>
+              <a:buChar char="•"/>
+            </a:pPr>
+            <a:r>
+              <a:rPr lang="pt-PT" sz="1200" dirty="0" err="1"/>
+              <a:t>postResults</a:t>
+            </a:r>
+            <a:r>
+              <a:rPr lang="pt-PT" sz="1200" dirty="0"/>
+              <a:t> – </a:t>
+            </a:r>
+            <a:r>
+              <a:rPr lang="pt-PT" sz="1200" dirty="0" err="1"/>
+              <a:t>post</a:t>
+            </a:r>
+            <a:r>
+              <a:rPr lang="pt-PT" sz="1200" dirty="0"/>
+              <a:t> the </a:t>
+            </a:r>
+            <a:r>
+              <a:rPr lang="pt-PT" sz="1200" dirty="0" err="1"/>
+              <a:t>obtained</a:t>
+            </a:r>
+            <a:r>
+              <a:rPr lang="pt-PT" sz="1200" dirty="0"/>
+              <a:t> </a:t>
+            </a:r>
+            <a:r>
+              <a:rPr lang="pt-PT" sz="1200" dirty="0" err="1"/>
+              <a:t>results</a:t>
+            </a:r>
+            <a:r>
+              <a:rPr lang="pt-PT" sz="1200" dirty="0"/>
+              <a:t> in the </a:t>
+            </a:r>
+            <a:r>
+              <a:rPr lang="pt-PT" sz="1200" dirty="0" err="1"/>
+              <a:t>shared</a:t>
+            </a:r>
+            <a:r>
+              <a:rPr lang="pt-PT" sz="1200" dirty="0"/>
+              <a:t> </a:t>
+            </a:r>
+            <a:r>
+              <a:rPr lang="pt-PT" sz="1200" dirty="0" err="1"/>
+              <a:t>region</a:t>
+            </a:r>
+            <a:endParaRPr lang="pt-PT" sz="1200" dirty="0"/>
           </a:p>
         </p:txBody>
       </p:sp>
@@ -4911,111 +4924,6 @@
 </file>
 
 <file path=ppt/slides/slide3.xml><?xml version="1.0" encoding="utf-8"?>
-<p:sld xmlns:a="http://schemas.openxmlformats.org/drawingml/2006/main" xmlns:r="http://schemas.openxmlformats.org/officeDocument/2006/relationships" xmlns:p="http://schemas.openxmlformats.org/presentationml/2006/main">
-  <p:cSld>
-    <p:spTree>
-      <p:nvGrpSpPr>
-        <p:cNvPr id="1" name=""/>
-        <p:cNvGrpSpPr/>
-        <p:nvPr/>
-      </p:nvGrpSpPr>
-      <p:grpSpPr>
-        <a:xfrm>
-          <a:off x="0" y="0"/>
-          <a:ext cx="0" cy="0"/>
-          <a:chOff x="0" y="0"/>
-          <a:chExt cx="0" cy="0"/>
-        </a:xfrm>
-      </p:grpSpPr>
-      <p:sp>
-        <p:nvSpPr>
-          <p:cNvPr id="2" name="Título 1">
-            <a:extLst>
-              <a:ext uri="{FF2B5EF4-FFF2-40B4-BE49-F238E27FC236}">
-                <a16:creationId xmlns:a16="http://schemas.microsoft.com/office/drawing/2014/main" id="{C7D52C90-E3ED-4F3F-A8E5-D53ABE83C150}"/>
-              </a:ext>
-            </a:extLst>
-          </p:cNvPr>
-          <p:cNvSpPr>
-            <a:spLocks noGrp="1"/>
-          </p:cNvSpPr>
-          <p:nvPr>
-            <p:ph type="title"/>
-          </p:nvPr>
-        </p:nvSpPr>
-        <p:spPr>
-          <a:xfrm>
-            <a:off x="1451579" y="1039907"/>
-            <a:ext cx="9603275" cy="813848"/>
-          </a:xfrm>
-        </p:spPr>
-        <p:txBody>
-          <a:bodyPr>
-            <a:normAutofit fontScale="90000"/>
-          </a:bodyPr>
-          <a:lstStyle/>
-          <a:p>
-            <a:r>
-              <a:rPr lang="pt-PT" sz="3600" b="1" dirty="0" err="1">
-                <a:latin typeface="Calibri" panose="020F0502020204030204" pitchFamily="34" charset="0"/>
-                <a:ea typeface="Calibri" panose="020F0502020204030204" pitchFamily="34" charset="0"/>
-                <a:cs typeface="Calibri" panose="020F0502020204030204" pitchFamily="34" charset="0"/>
-              </a:rPr>
-              <a:t>Problem</a:t>
-            </a:r>
-            <a:r>
-              <a:rPr lang="pt-PT" sz="3600" b="1" dirty="0">
-                <a:latin typeface="Calibri" panose="020F0502020204030204" pitchFamily="34" charset="0"/>
-                <a:ea typeface="Calibri" panose="020F0502020204030204" pitchFamily="34" charset="0"/>
-                <a:cs typeface="Calibri" panose="020F0502020204030204" pitchFamily="34" charset="0"/>
-              </a:rPr>
-              <a:t> 1</a:t>
-            </a:r>
-            <a:br>
-              <a:rPr lang="pt-PT" dirty="0">
-                <a:latin typeface="Calibri" panose="020F0502020204030204" pitchFamily="34" charset="0"/>
-                <a:ea typeface="Calibri" panose="020F0502020204030204" pitchFamily="34" charset="0"/>
-                <a:cs typeface="Calibri" panose="020F0502020204030204" pitchFamily="34" charset="0"/>
-              </a:rPr>
-            </a:br>
-            <a:r>
-              <a:rPr lang="pt-PT" sz="2200" dirty="0" err="1">
-                <a:latin typeface="Calibri" panose="020F0502020204030204" pitchFamily="34" charset="0"/>
-                <a:ea typeface="Calibri" panose="020F0502020204030204" pitchFamily="34" charset="0"/>
-                <a:cs typeface="Calibri" panose="020F0502020204030204" pitchFamily="34" charset="0"/>
-              </a:rPr>
-              <a:t>Workers</a:t>
-            </a:r>
-            <a:r>
-              <a:rPr lang="pt-PT" sz="2200" dirty="0">
-                <a:latin typeface="Calibri" panose="020F0502020204030204" pitchFamily="34" charset="0"/>
-                <a:ea typeface="Calibri" panose="020F0502020204030204" pitchFamily="34" charset="0"/>
-                <a:cs typeface="Calibri" panose="020F0502020204030204" pitchFamily="34" charset="0"/>
-              </a:rPr>
-              <a:t> LIFECYCLE</a:t>
-            </a:r>
-            <a:endParaRPr lang="pt-PT" dirty="0">
-              <a:latin typeface="Calibri" panose="020F0502020204030204" pitchFamily="34" charset="0"/>
-              <a:ea typeface="Calibri" panose="020F0502020204030204" pitchFamily="34" charset="0"/>
-              <a:cs typeface="Calibri" panose="020F0502020204030204" pitchFamily="34" charset="0"/>
-            </a:endParaRPr>
-          </a:p>
-        </p:txBody>
-      </p:sp>
-    </p:spTree>
-    <p:extLst>
-      <p:ext uri="{BB962C8B-B14F-4D97-AF65-F5344CB8AC3E}">
-        <p14:creationId xmlns:p14="http://schemas.microsoft.com/office/powerpoint/2010/main" val="220112480"/>
-      </p:ext>
-    </p:extLst>
-  </p:cSld>
-  <p:clrMapOvr>
-    <a:masterClrMapping/>
-  </p:clrMapOvr>
-</p:sld>
-</file>
-
-<file path=ppt/slides/slide4.xml><?xml version="1.0" encoding="utf-8"?>
 <p:sld xmlns:a="http://schemas.openxmlformats.org/drawingml/2006/main" xmlns:r="http://schemas.openxmlformats.org/officeDocument/2006/relationships" xmlns:p="http://schemas.openxmlformats.org/presentationml/2006/main">
   <p:cSld>
     <p:spTree>
@@ -5355,6 +5263,103 @@
 </p:sld>
 </file>
 
+<file path=ppt/slides/slide4.xml><?xml version="1.0" encoding="utf-8"?>
+<p:sld xmlns:a="http://schemas.openxmlformats.org/drawingml/2006/main" xmlns:r="http://schemas.openxmlformats.org/officeDocument/2006/relationships" xmlns:p="http://schemas.openxmlformats.org/presentationml/2006/main">
+  <p:cSld>
+    <p:spTree>
+      <p:nvGrpSpPr>
+        <p:cNvPr id="1" name=""/>
+        <p:cNvGrpSpPr/>
+        <p:nvPr/>
+      </p:nvGrpSpPr>
+      <p:grpSpPr>
+        <a:xfrm>
+          <a:off x="0" y="0"/>
+          <a:ext cx="0" cy="0"/>
+          <a:chOff x="0" y="0"/>
+          <a:chExt cx="0" cy="0"/>
+        </a:xfrm>
+      </p:grpSpPr>
+      <p:sp>
+        <p:nvSpPr>
+          <p:cNvPr id="2" name="Título 1">
+            <a:extLst>
+              <a:ext uri="{FF2B5EF4-FFF2-40B4-BE49-F238E27FC236}">
+                <a16:creationId xmlns:a16="http://schemas.microsoft.com/office/drawing/2014/main" id="{C7D52C90-E3ED-4F3F-A8E5-D53ABE83C150}"/>
+              </a:ext>
+            </a:extLst>
+          </p:cNvPr>
+          <p:cNvSpPr>
+            <a:spLocks noGrp="1"/>
+          </p:cNvSpPr>
+          <p:nvPr>
+            <p:ph type="title"/>
+          </p:nvPr>
+        </p:nvSpPr>
+        <p:spPr>
+          <a:xfrm>
+            <a:off x="1451579" y="1039907"/>
+            <a:ext cx="9603275" cy="813848"/>
+          </a:xfrm>
+        </p:spPr>
+        <p:txBody>
+          <a:bodyPr>
+            <a:normAutofit fontScale="90000"/>
+          </a:bodyPr>
+          <a:lstStyle/>
+          <a:p>
+            <a:r>
+              <a:rPr lang="pt-PT" sz="3600" b="1" dirty="0" err="1">
+                <a:latin typeface="Calibri" panose="020F0502020204030204" pitchFamily="34" charset="0"/>
+                <a:ea typeface="Calibri" panose="020F0502020204030204" pitchFamily="34" charset="0"/>
+                <a:cs typeface="Calibri" panose="020F0502020204030204" pitchFamily="34" charset="0"/>
+              </a:rPr>
+              <a:t>Problem</a:t>
+            </a:r>
+            <a:r>
+              <a:rPr lang="pt-PT" sz="3600" b="1" dirty="0">
+                <a:latin typeface="Calibri" panose="020F0502020204030204" pitchFamily="34" charset="0"/>
+                <a:ea typeface="Calibri" panose="020F0502020204030204" pitchFamily="34" charset="0"/>
+                <a:cs typeface="Calibri" panose="020F0502020204030204" pitchFamily="34" charset="0"/>
+              </a:rPr>
+              <a:t> 1</a:t>
+            </a:r>
+            <a:br>
+              <a:rPr lang="pt-PT" dirty="0">
+                <a:latin typeface="Calibri" panose="020F0502020204030204" pitchFamily="34" charset="0"/>
+                <a:ea typeface="Calibri" panose="020F0502020204030204" pitchFamily="34" charset="0"/>
+                <a:cs typeface="Calibri" panose="020F0502020204030204" pitchFamily="34" charset="0"/>
+              </a:rPr>
+            </a:br>
+            <a:r>
+              <a:rPr lang="pt-PT" sz="2200" dirty="0" err="1">
+                <a:latin typeface="Calibri" panose="020F0502020204030204" pitchFamily="34" charset="0"/>
+                <a:ea typeface="Calibri" panose="020F0502020204030204" pitchFamily="34" charset="0"/>
+                <a:cs typeface="Calibri" panose="020F0502020204030204" pitchFamily="34" charset="0"/>
+              </a:rPr>
+              <a:t>Conclusions</a:t>
+            </a:r>
+            <a:endParaRPr lang="pt-PT" dirty="0">
+              <a:latin typeface="Calibri" panose="020F0502020204030204" pitchFamily="34" charset="0"/>
+              <a:ea typeface="Calibri" panose="020F0502020204030204" pitchFamily="34" charset="0"/>
+              <a:cs typeface="Calibri" panose="020F0502020204030204" pitchFamily="34" charset="0"/>
+            </a:endParaRPr>
+          </a:p>
+        </p:txBody>
+      </p:sp>
+    </p:spTree>
+    <p:extLst>
+      <p:ext uri="{BB962C8B-B14F-4D97-AF65-F5344CB8AC3E}">
+        <p14:creationId xmlns:p14="http://schemas.microsoft.com/office/powerpoint/2010/main" val="220112480"/>
+      </p:ext>
+    </p:extLst>
+  </p:cSld>
+  <p:clrMapOvr>
+    <a:masterClrMapping/>
+  </p:clrMapOvr>
+</p:sld>
+</file>
+
 <file path=ppt/slides/slide5.xml><?xml version="1.0" encoding="utf-8"?>
 <p:sld xmlns:a="http://schemas.openxmlformats.org/drawingml/2006/main" xmlns:r="http://schemas.openxmlformats.org/officeDocument/2006/relationships" xmlns:p="http://schemas.openxmlformats.org/presentationml/2006/main">
   <p:cSld>
@@ -5429,7 +5434,23 @@
                 <a:ea typeface="Calibri" panose="020F0502020204030204" pitchFamily="34" charset="0"/>
                 <a:cs typeface="Calibri" panose="020F0502020204030204" pitchFamily="34" charset="0"/>
               </a:rPr>
-              <a:t>Initializations</a:t>
+              <a:t>Entities</a:t>
+            </a:r>
+            <a:r>
+              <a:rPr lang="pt-PT" sz="2200" dirty="0">
+                <a:latin typeface="Calibri" panose="020F0502020204030204" pitchFamily="34" charset="0"/>
+                <a:ea typeface="Calibri" panose="020F0502020204030204" pitchFamily="34" charset="0"/>
+                <a:cs typeface="Calibri" panose="020F0502020204030204" pitchFamily="34" charset="0"/>
+              </a:rPr>
+              <a:t> </a:t>
+            </a:r>
+            <a:r>
+              <a:rPr lang="pt-PT" sz="2200" dirty="0" err="1">
+                <a:latin typeface="Calibri" panose="020F0502020204030204" pitchFamily="34" charset="0"/>
+                <a:ea typeface="Calibri" panose="020F0502020204030204" pitchFamily="34" charset="0"/>
+                <a:cs typeface="Calibri" panose="020F0502020204030204" pitchFamily="34" charset="0"/>
+              </a:rPr>
+              <a:t>diagram</a:t>
             </a:r>
             <a:endParaRPr lang="pt-PT" dirty="0">
               <a:latin typeface="Calibri" panose="020F0502020204030204" pitchFamily="34" charset="0"/>
@@ -5441,26 +5462,1208 @@
       </p:sp>
       <p:sp>
         <p:nvSpPr>
-          <p:cNvPr id="3" name="Marcador de Posição de Conteúdo 2">
+          <p:cNvPr id="4" name="Retângulo 3">
             <a:extLst>
               <a:ext uri="{FF2B5EF4-FFF2-40B4-BE49-F238E27FC236}">
-                <a16:creationId xmlns:a16="http://schemas.microsoft.com/office/drawing/2014/main" id="{2D745695-6161-41A4-A2E0-37169F11F70A}"/>
+                <a16:creationId xmlns:a16="http://schemas.microsoft.com/office/drawing/2014/main" id="{C6B61889-36B2-1753-13D0-6F9AADA8DFF0}"/>
               </a:ext>
             </a:extLst>
           </p:cNvPr>
-          <p:cNvSpPr>
-            <a:spLocks noGrp="1"/>
-          </p:cNvSpPr>
-          <p:nvPr>
-            <p:ph idx="1"/>
-          </p:nvPr>
-        </p:nvSpPr>
-        <p:spPr/>
-        <p:txBody>
-          <a:bodyPr/>
+          <p:cNvSpPr/>
+          <p:nvPr/>
+        </p:nvSpPr>
+        <p:spPr>
+          <a:xfrm>
+            <a:off x="8446124" y="2015731"/>
+            <a:ext cx="2608730" cy="2673716"/>
+          </a:xfrm>
+          <a:prstGeom prst="rect">
+            <a:avLst/>
+          </a:prstGeom>
+          <a:ln/>
+        </p:spPr>
+        <p:style>
+          <a:lnRef idx="2">
+            <a:schemeClr val="dk1"/>
+          </a:lnRef>
+          <a:fillRef idx="1">
+            <a:schemeClr val="lt1"/>
+          </a:fillRef>
+          <a:effectRef idx="0">
+            <a:schemeClr val="dk1"/>
+          </a:effectRef>
+          <a:fontRef idx="minor">
+            <a:schemeClr val="dk1"/>
+          </a:fontRef>
+        </p:style>
+        <p:txBody>
+          <a:bodyPr rtlCol="0" anchor="ctr"/>
           <a:lstStyle/>
           <a:p>
-            <a:endParaRPr lang="pt-PT" dirty="0"/>
+            <a:r>
+              <a:rPr lang="pt-PT" dirty="0" err="1"/>
+              <a:t>Shared</a:t>
+            </a:r>
+            <a:r>
+              <a:rPr lang="pt-PT" dirty="0"/>
+              <a:t> </a:t>
+            </a:r>
+            <a:r>
+              <a:rPr lang="pt-PT" dirty="0" err="1"/>
+              <a:t>Region</a:t>
+            </a:r>
+            <a:endParaRPr lang="pt-PT" sz="1400" dirty="0"/>
+          </a:p>
+          <a:p>
+            <a:pPr marL="285750" indent="-285750">
+              <a:buFont typeface="Arial" panose="020B0604020202020204" pitchFamily="34" charset="0"/>
+              <a:buChar char="•"/>
+            </a:pPr>
+            <a:r>
+              <a:rPr lang="pt-PT" sz="1400" dirty="0" err="1"/>
+              <a:t>char</a:t>
+            </a:r>
+            <a:r>
+              <a:rPr lang="pt-PT" sz="1400" dirty="0"/>
+              <a:t>* </a:t>
+            </a:r>
+            <a:r>
+              <a:rPr lang="pt-PT" sz="1400" dirty="0" err="1"/>
+              <a:t>fileName</a:t>
+            </a:r>
+            <a:endParaRPr lang="pt-PT" sz="1400" dirty="0"/>
+          </a:p>
+          <a:p>
+            <a:pPr marL="285750" indent="-285750">
+              <a:buFont typeface="Arial" panose="020B0604020202020204" pitchFamily="34" charset="0"/>
+              <a:buChar char="•"/>
+            </a:pPr>
+            <a:r>
+              <a:rPr lang="en-US" sz="1400" dirty="0"/>
+              <a:t>int* </a:t>
+            </a:r>
+            <a:r>
+              <a:rPr lang="en-US" sz="1400" dirty="0" err="1"/>
+              <a:t>integerSequence</a:t>
+            </a:r>
+            <a:endParaRPr lang="en-US" sz="1400" dirty="0"/>
+          </a:p>
+          <a:p>
+            <a:pPr marL="285750" indent="-285750">
+              <a:buFont typeface="Arial" panose="020B0604020202020204" pitchFamily="34" charset="0"/>
+              <a:buChar char="•"/>
+            </a:pPr>
+            <a:r>
+              <a:rPr lang="en-US" sz="1400" dirty="0"/>
+              <a:t>FILE* </a:t>
+            </a:r>
+            <a:r>
+              <a:rPr lang="en-US" sz="1400" dirty="0" err="1"/>
+              <a:t>filePointer</a:t>
+            </a:r>
+            <a:endParaRPr lang="en-US" sz="1400" dirty="0"/>
+          </a:p>
+          <a:p>
+            <a:pPr marL="285750" indent="-285750">
+              <a:buFont typeface="Arial" panose="020B0604020202020204" pitchFamily="34" charset="0"/>
+              <a:buChar char="•"/>
+            </a:pPr>
+            <a:r>
+              <a:rPr lang="en-US" sz="1400" dirty="0"/>
+              <a:t>int </a:t>
+            </a:r>
+            <a:r>
+              <a:rPr lang="en-US" sz="1400" dirty="0" err="1"/>
+              <a:t>sequenceLen</a:t>
+            </a:r>
+            <a:endParaRPr lang="en-US" sz="1400" dirty="0"/>
+          </a:p>
+          <a:p>
+            <a:pPr marL="285750" indent="-285750">
+              <a:buFont typeface="Arial" panose="020B0604020202020204" pitchFamily="34" charset="0"/>
+              <a:buChar char="•"/>
+            </a:pPr>
+            <a:r>
+              <a:rPr lang="en-US" sz="1400" dirty="0"/>
+              <a:t>int </a:t>
+            </a:r>
+            <a:r>
+              <a:rPr lang="en-US" sz="1400" dirty="0" err="1"/>
+              <a:t>maxRequests</a:t>
+            </a:r>
+            <a:endParaRPr lang="en-US" sz="1400" dirty="0"/>
+          </a:p>
+          <a:p>
+            <a:pPr marL="285750" indent="-285750">
+              <a:buFont typeface="Arial" panose="020B0604020202020204" pitchFamily="34" charset="0"/>
+              <a:buChar char="•"/>
+            </a:pPr>
+            <a:r>
+              <a:rPr lang="en-US" sz="1400" dirty="0"/>
+              <a:t>int </a:t>
+            </a:r>
+            <a:r>
+              <a:rPr lang="en-US" sz="1400" dirty="0" err="1"/>
+              <a:t>curRequests</a:t>
+            </a:r>
+            <a:endParaRPr lang="en-US" sz="1400" dirty="0"/>
+          </a:p>
+          <a:p>
+            <a:pPr marL="285750" indent="-285750">
+              <a:buFont typeface="Arial" panose="020B0604020202020204" pitchFamily="34" charset="0"/>
+              <a:buChar char="•"/>
+            </a:pPr>
+            <a:r>
+              <a:rPr lang="en-US" sz="1400" dirty="0"/>
+              <a:t>int </a:t>
+            </a:r>
+            <a:r>
+              <a:rPr lang="en-US" sz="1400" dirty="0" err="1"/>
+              <a:t>totalRequests</a:t>
+            </a:r>
+            <a:endParaRPr lang="en-US" sz="1400" dirty="0"/>
+          </a:p>
+          <a:p>
+            <a:pPr marL="285750" indent="-285750">
+              <a:buFont typeface="Arial" panose="020B0604020202020204" pitchFamily="34" charset="0"/>
+              <a:buChar char="•"/>
+            </a:pPr>
+            <a:r>
+              <a:rPr lang="en-US" sz="1400" dirty="0"/>
+              <a:t>int </a:t>
+            </a:r>
+            <a:r>
+              <a:rPr lang="en-US" sz="1400" dirty="0" err="1"/>
+              <a:t>completeRequests</a:t>
+            </a:r>
+            <a:endParaRPr lang="en-US" sz="1400" dirty="0"/>
+          </a:p>
+          <a:p>
+            <a:pPr marL="285750" indent="-285750">
+              <a:buFont typeface="Arial" panose="020B0604020202020204" pitchFamily="34" charset="0"/>
+              <a:buChar char="•"/>
+            </a:pPr>
+            <a:r>
+              <a:rPr lang="en-US" sz="1400" dirty="0"/>
+              <a:t>bool </a:t>
+            </a:r>
+            <a:r>
+              <a:rPr lang="en-US" sz="1400" dirty="0" err="1"/>
+              <a:t>workAvailable</a:t>
+            </a:r>
+            <a:endParaRPr lang="en-US" sz="1400" dirty="0"/>
+          </a:p>
+          <a:p>
+            <a:pPr marL="285750" indent="-285750">
+              <a:buFont typeface="Arial" panose="020B0604020202020204" pitchFamily="34" charset="0"/>
+              <a:buChar char="•"/>
+            </a:pPr>
+            <a:r>
+              <a:rPr lang="en-US" sz="1400" dirty="0"/>
+              <a:t>bool </a:t>
+            </a:r>
+            <a:r>
+              <a:rPr lang="en-US" sz="1400" dirty="0" err="1"/>
+              <a:t>workNeeded</a:t>
+            </a:r>
+            <a:endParaRPr lang="en-US" sz="1400" dirty="0"/>
+          </a:p>
+        </p:txBody>
+      </p:sp>
+      <p:sp>
+        <p:nvSpPr>
+          <p:cNvPr id="7" name="Oval 6">
+            <a:extLst>
+              <a:ext uri="{FF2B5EF4-FFF2-40B4-BE49-F238E27FC236}">
+                <a16:creationId xmlns:a16="http://schemas.microsoft.com/office/drawing/2014/main" id="{10E4C981-17A8-8A11-0C4C-E077BEF3569A}"/>
+              </a:ext>
+            </a:extLst>
+          </p:cNvPr>
+          <p:cNvSpPr/>
+          <p:nvPr/>
+        </p:nvSpPr>
+        <p:spPr>
+          <a:xfrm>
+            <a:off x="1988474" y="2019521"/>
+            <a:ext cx="1090569" cy="1090569"/>
+          </a:xfrm>
+          <a:prstGeom prst="ellipse">
+            <a:avLst/>
+          </a:prstGeom>
+          <a:ln>
+            <a:headEnd type="none" w="med" len="med"/>
+            <a:tailEnd type="none" w="med" len="med"/>
+          </a:ln>
+        </p:spPr>
+        <p:style>
+          <a:lnRef idx="2">
+            <a:schemeClr val="dk1"/>
+          </a:lnRef>
+          <a:fillRef idx="1">
+            <a:schemeClr val="lt1"/>
+          </a:fillRef>
+          <a:effectRef idx="0">
+            <a:schemeClr val="dk1"/>
+          </a:effectRef>
+          <a:fontRef idx="minor">
+            <a:schemeClr val="dk1"/>
+          </a:fontRef>
+        </p:style>
+        <p:txBody>
+          <a:bodyPr rtlCol="0" anchor="ctr"/>
+          <a:lstStyle/>
+          <a:p>
+            <a:pPr algn="ctr"/>
+            <a:r>
+              <a:rPr lang="pt-PT" dirty="0"/>
+              <a:t>Main</a:t>
+            </a:r>
+          </a:p>
+        </p:txBody>
+      </p:sp>
+      <p:cxnSp>
+        <p:nvCxnSpPr>
+          <p:cNvPr id="8" name="Conexão reta unidirecional 7">
+            <a:extLst>
+              <a:ext uri="{FF2B5EF4-FFF2-40B4-BE49-F238E27FC236}">
+                <a16:creationId xmlns:a16="http://schemas.microsoft.com/office/drawing/2014/main" id="{78786D92-D2F0-5038-248A-5B5890F1D9D5}"/>
+              </a:ext>
+            </a:extLst>
+          </p:cNvPr>
+          <p:cNvCxnSpPr/>
+          <p:nvPr/>
+        </p:nvCxnSpPr>
+        <p:spPr>
+          <a:xfrm>
+            <a:off x="3079043" y="2564806"/>
+            <a:ext cx="5367080" cy="10614"/>
+          </a:xfrm>
+          <a:prstGeom prst="straightConnector1">
+            <a:avLst/>
+          </a:prstGeom>
+          <a:ln>
+            <a:tailEnd type="triangle"/>
+          </a:ln>
+        </p:spPr>
+        <p:style>
+          <a:lnRef idx="1">
+            <a:schemeClr val="dk1"/>
+          </a:lnRef>
+          <a:fillRef idx="0">
+            <a:schemeClr val="dk1"/>
+          </a:fillRef>
+          <a:effectRef idx="0">
+            <a:schemeClr val="dk1"/>
+          </a:effectRef>
+          <a:fontRef idx="minor">
+            <a:schemeClr val="tx1"/>
+          </a:fontRef>
+        </p:style>
+      </p:cxnSp>
+      <p:sp>
+        <p:nvSpPr>
+          <p:cNvPr id="9" name="CaixaDeTexto 8">
+            <a:extLst>
+              <a:ext uri="{FF2B5EF4-FFF2-40B4-BE49-F238E27FC236}">
+                <a16:creationId xmlns:a16="http://schemas.microsoft.com/office/drawing/2014/main" id="{50D9E3F0-E74B-BE15-E15A-AD23D6770651}"/>
+              </a:ext>
+            </a:extLst>
+          </p:cNvPr>
+          <p:cNvSpPr txBox="1"/>
+          <p:nvPr/>
+        </p:nvSpPr>
+        <p:spPr>
+          <a:xfrm>
+            <a:off x="5620253" y="2235539"/>
+            <a:ext cx="142329" cy="369332"/>
+          </a:xfrm>
+          <a:prstGeom prst="rect">
+            <a:avLst/>
+          </a:prstGeom>
+          <a:noFill/>
+        </p:spPr>
+        <p:txBody>
+          <a:bodyPr wrap="square" rtlCol="0">
+            <a:spAutoFit/>
+          </a:bodyPr>
+          <a:lstStyle/>
+          <a:p>
+            <a:r>
+              <a:rPr lang="pt-PT" dirty="0"/>
+              <a:t>2</a:t>
+            </a:r>
+          </a:p>
+        </p:txBody>
+      </p:sp>
+      <p:sp>
+        <p:nvSpPr>
+          <p:cNvPr id="10" name="Oval 9">
+            <a:extLst>
+              <a:ext uri="{FF2B5EF4-FFF2-40B4-BE49-F238E27FC236}">
+                <a16:creationId xmlns:a16="http://schemas.microsoft.com/office/drawing/2014/main" id="{14ACCFC4-C089-3939-CA0E-00B226725782}"/>
+              </a:ext>
+            </a:extLst>
+          </p:cNvPr>
+          <p:cNvSpPr/>
+          <p:nvPr/>
+        </p:nvSpPr>
+        <p:spPr>
+          <a:xfrm>
+            <a:off x="4032370" y="2810312"/>
+            <a:ext cx="1090569" cy="1090569"/>
+          </a:xfrm>
+          <a:prstGeom prst="ellipse">
+            <a:avLst/>
+          </a:prstGeom>
+          <a:ln>
+            <a:headEnd type="none" w="med" len="med"/>
+            <a:tailEnd type="none" w="med" len="med"/>
+          </a:ln>
+        </p:spPr>
+        <p:style>
+          <a:lnRef idx="2">
+            <a:schemeClr val="dk1"/>
+          </a:lnRef>
+          <a:fillRef idx="1">
+            <a:schemeClr val="lt1"/>
+          </a:fillRef>
+          <a:effectRef idx="0">
+            <a:schemeClr val="dk1"/>
+          </a:effectRef>
+          <a:fontRef idx="minor">
+            <a:schemeClr val="dk1"/>
+          </a:fontRef>
+        </p:style>
+        <p:txBody>
+          <a:bodyPr rtlCol="0" anchor="ctr"/>
+          <a:lstStyle/>
+          <a:p>
+            <a:pPr algn="ctr"/>
+            <a:r>
+              <a:rPr lang="pt-PT" sz="1400" dirty="0" err="1"/>
+              <a:t>Distributor</a:t>
+            </a:r>
+            <a:endParaRPr lang="pt-PT" sz="1400" dirty="0"/>
+          </a:p>
+        </p:txBody>
+      </p:sp>
+      <p:cxnSp>
+        <p:nvCxnSpPr>
+          <p:cNvPr id="11" name="Conexão reta unidirecional 10">
+            <a:extLst>
+              <a:ext uri="{FF2B5EF4-FFF2-40B4-BE49-F238E27FC236}">
+                <a16:creationId xmlns:a16="http://schemas.microsoft.com/office/drawing/2014/main" id="{7D0B105D-14D0-7E68-F0E8-3FABE6D2FB5B}"/>
+              </a:ext>
+            </a:extLst>
+          </p:cNvPr>
+          <p:cNvCxnSpPr>
+            <a:cxnSpLocks/>
+            <a:endCxn id="10" idx="2"/>
+          </p:cNvCxnSpPr>
+          <p:nvPr/>
+        </p:nvCxnSpPr>
+        <p:spPr>
+          <a:xfrm>
+            <a:off x="3020037" y="2810312"/>
+            <a:ext cx="1012333" cy="545285"/>
+          </a:xfrm>
+          <a:prstGeom prst="straightConnector1">
+            <a:avLst/>
+          </a:prstGeom>
+          <a:ln>
+            <a:tailEnd type="triangle"/>
+          </a:ln>
+        </p:spPr>
+        <p:style>
+          <a:lnRef idx="1">
+            <a:schemeClr val="dk1"/>
+          </a:lnRef>
+          <a:fillRef idx="0">
+            <a:schemeClr val="dk1"/>
+          </a:fillRef>
+          <a:effectRef idx="0">
+            <a:schemeClr val="dk1"/>
+          </a:effectRef>
+          <a:fontRef idx="minor">
+            <a:schemeClr val="tx1"/>
+          </a:fontRef>
+        </p:style>
+      </p:cxnSp>
+      <p:sp>
+        <p:nvSpPr>
+          <p:cNvPr id="12" name="CaixaDeTexto 11">
+            <a:extLst>
+              <a:ext uri="{FF2B5EF4-FFF2-40B4-BE49-F238E27FC236}">
+                <a16:creationId xmlns:a16="http://schemas.microsoft.com/office/drawing/2014/main" id="{718A75EE-1C76-3A78-BC21-0FFB48FC3F01}"/>
+              </a:ext>
+            </a:extLst>
+          </p:cNvPr>
+          <p:cNvSpPr txBox="1"/>
+          <p:nvPr/>
+        </p:nvSpPr>
+        <p:spPr>
+          <a:xfrm>
+            <a:off x="3484542" y="2751373"/>
+            <a:ext cx="142329" cy="369332"/>
+          </a:xfrm>
+          <a:prstGeom prst="rect">
+            <a:avLst/>
+          </a:prstGeom>
+          <a:noFill/>
+        </p:spPr>
+        <p:txBody>
+          <a:bodyPr wrap="square" rtlCol="0">
+            <a:spAutoFit/>
+          </a:bodyPr>
+          <a:lstStyle/>
+          <a:p>
+            <a:r>
+              <a:rPr lang="pt-PT" dirty="0"/>
+              <a:t>1</a:t>
+            </a:r>
+          </a:p>
+        </p:txBody>
+      </p:sp>
+      <p:sp>
+        <p:nvSpPr>
+          <p:cNvPr id="13" name="Oval 12">
+            <a:extLst>
+              <a:ext uri="{FF2B5EF4-FFF2-40B4-BE49-F238E27FC236}">
+                <a16:creationId xmlns:a16="http://schemas.microsoft.com/office/drawing/2014/main" id="{689C136D-A5D0-CF67-FE76-881DC7073B64}"/>
+              </a:ext>
+            </a:extLst>
+          </p:cNvPr>
+          <p:cNvSpPr/>
+          <p:nvPr/>
+        </p:nvSpPr>
+        <p:spPr>
+          <a:xfrm>
+            <a:off x="1988474" y="3609492"/>
+            <a:ext cx="1090569" cy="1090569"/>
+          </a:xfrm>
+          <a:prstGeom prst="ellipse">
+            <a:avLst/>
+          </a:prstGeom>
+          <a:ln>
+            <a:headEnd type="none" w="med" len="med"/>
+            <a:tailEnd type="none" w="med" len="med"/>
+          </a:ln>
+        </p:spPr>
+        <p:style>
+          <a:lnRef idx="2">
+            <a:schemeClr val="dk1"/>
+          </a:lnRef>
+          <a:fillRef idx="1">
+            <a:schemeClr val="lt1"/>
+          </a:fillRef>
+          <a:effectRef idx="0">
+            <a:schemeClr val="dk1"/>
+          </a:effectRef>
+          <a:fontRef idx="minor">
+            <a:schemeClr val="dk1"/>
+          </a:fontRef>
+        </p:style>
+        <p:txBody>
+          <a:bodyPr rtlCol="0" anchor="ctr"/>
+          <a:lstStyle/>
+          <a:p>
+            <a:pPr algn="ctr"/>
+            <a:r>
+              <a:rPr lang="pt-PT" sz="1400" dirty="0" err="1"/>
+              <a:t>Worker</a:t>
+            </a:r>
+            <a:r>
+              <a:rPr lang="pt-PT" sz="1400" dirty="0"/>
+              <a:t>[n]</a:t>
+            </a:r>
+          </a:p>
+        </p:txBody>
+      </p:sp>
+      <p:cxnSp>
+        <p:nvCxnSpPr>
+          <p:cNvPr id="14" name="Conexão reta unidirecional 13">
+            <a:extLst>
+              <a:ext uri="{FF2B5EF4-FFF2-40B4-BE49-F238E27FC236}">
+                <a16:creationId xmlns:a16="http://schemas.microsoft.com/office/drawing/2014/main" id="{2E42F483-E2B2-AB58-D648-EEAA86EEB4B3}"/>
+              </a:ext>
+            </a:extLst>
+          </p:cNvPr>
+          <p:cNvCxnSpPr>
+            <a:cxnSpLocks/>
+            <a:stCxn id="13" idx="6"/>
+          </p:cNvCxnSpPr>
+          <p:nvPr/>
+        </p:nvCxnSpPr>
+        <p:spPr>
+          <a:xfrm flipV="1">
+            <a:off x="3079043" y="4144163"/>
+            <a:ext cx="5367080" cy="10614"/>
+          </a:xfrm>
+          <a:prstGeom prst="straightConnector1">
+            <a:avLst/>
+          </a:prstGeom>
+          <a:ln>
+            <a:tailEnd type="triangle"/>
+          </a:ln>
+        </p:spPr>
+        <p:style>
+          <a:lnRef idx="1">
+            <a:schemeClr val="dk1"/>
+          </a:lnRef>
+          <a:fillRef idx="0">
+            <a:schemeClr val="dk1"/>
+          </a:fillRef>
+          <a:effectRef idx="0">
+            <a:schemeClr val="dk1"/>
+          </a:effectRef>
+          <a:fontRef idx="minor">
+            <a:schemeClr val="tx1"/>
+          </a:fontRef>
+        </p:style>
+      </p:cxnSp>
+      <p:sp>
+        <p:nvSpPr>
+          <p:cNvPr id="15" name="CaixaDeTexto 14">
+            <a:extLst>
+              <a:ext uri="{FF2B5EF4-FFF2-40B4-BE49-F238E27FC236}">
+                <a16:creationId xmlns:a16="http://schemas.microsoft.com/office/drawing/2014/main" id="{C299B71D-8714-81F5-8EED-8AE86C881E2D}"/>
+              </a:ext>
+            </a:extLst>
+          </p:cNvPr>
+          <p:cNvSpPr txBox="1"/>
+          <p:nvPr/>
+        </p:nvSpPr>
+        <p:spPr>
+          <a:xfrm>
+            <a:off x="5477924" y="3810397"/>
+            <a:ext cx="142329" cy="369332"/>
+          </a:xfrm>
+          <a:prstGeom prst="rect">
+            <a:avLst/>
+          </a:prstGeom>
+          <a:noFill/>
+        </p:spPr>
+        <p:txBody>
+          <a:bodyPr wrap="square" rtlCol="0">
+            <a:spAutoFit/>
+          </a:bodyPr>
+          <a:lstStyle/>
+          <a:p>
+            <a:r>
+              <a:rPr lang="pt-PT" dirty="0"/>
+              <a:t>4</a:t>
+            </a:r>
+          </a:p>
+        </p:txBody>
+      </p:sp>
+      <p:cxnSp>
+        <p:nvCxnSpPr>
+          <p:cNvPr id="17" name="Conexão reta unidirecional 16">
+            <a:extLst>
+              <a:ext uri="{FF2B5EF4-FFF2-40B4-BE49-F238E27FC236}">
+                <a16:creationId xmlns:a16="http://schemas.microsoft.com/office/drawing/2014/main" id="{9065879C-FEF2-096B-C111-93355DB21285}"/>
+              </a:ext>
+            </a:extLst>
+          </p:cNvPr>
+          <p:cNvCxnSpPr>
+            <a:cxnSpLocks/>
+            <a:stCxn id="7" idx="4"/>
+            <a:endCxn id="13" idx="0"/>
+          </p:cNvCxnSpPr>
+          <p:nvPr/>
+        </p:nvCxnSpPr>
+        <p:spPr>
+          <a:xfrm>
+            <a:off x="2533759" y="3110090"/>
+            <a:ext cx="0" cy="499402"/>
+          </a:xfrm>
+          <a:prstGeom prst="straightConnector1">
+            <a:avLst/>
+          </a:prstGeom>
+          <a:ln>
+            <a:tailEnd type="triangle"/>
+          </a:ln>
+        </p:spPr>
+        <p:style>
+          <a:lnRef idx="1">
+            <a:schemeClr val="dk1"/>
+          </a:lnRef>
+          <a:fillRef idx="0">
+            <a:schemeClr val="dk1"/>
+          </a:fillRef>
+          <a:effectRef idx="0">
+            <a:schemeClr val="dk1"/>
+          </a:effectRef>
+          <a:fontRef idx="minor">
+            <a:schemeClr val="tx1"/>
+          </a:fontRef>
+        </p:style>
+      </p:cxnSp>
+      <p:cxnSp>
+        <p:nvCxnSpPr>
+          <p:cNvPr id="27" name="Conexão reta unidirecional 26">
+            <a:extLst>
+              <a:ext uri="{FF2B5EF4-FFF2-40B4-BE49-F238E27FC236}">
+                <a16:creationId xmlns:a16="http://schemas.microsoft.com/office/drawing/2014/main" id="{919C4D4C-CCB8-3064-D7DD-4B0AB9D462F8}"/>
+              </a:ext>
+            </a:extLst>
+          </p:cNvPr>
+          <p:cNvCxnSpPr>
+            <a:stCxn id="10" idx="6"/>
+          </p:cNvCxnSpPr>
+          <p:nvPr/>
+        </p:nvCxnSpPr>
+        <p:spPr>
+          <a:xfrm>
+            <a:off x="5122939" y="3355597"/>
+            <a:ext cx="3323184" cy="0"/>
+          </a:xfrm>
+          <a:prstGeom prst="straightConnector1">
+            <a:avLst/>
+          </a:prstGeom>
+          <a:ln>
+            <a:tailEnd type="triangle"/>
+          </a:ln>
+        </p:spPr>
+        <p:style>
+          <a:lnRef idx="1">
+            <a:schemeClr val="dk1"/>
+          </a:lnRef>
+          <a:fillRef idx="0">
+            <a:schemeClr val="dk1"/>
+          </a:fillRef>
+          <a:effectRef idx="0">
+            <a:schemeClr val="dk1"/>
+          </a:effectRef>
+          <a:fontRef idx="minor">
+            <a:schemeClr val="tx1"/>
+          </a:fontRef>
+        </p:style>
+      </p:cxnSp>
+      <p:sp>
+        <p:nvSpPr>
+          <p:cNvPr id="32" name="CaixaDeTexto 31">
+            <a:extLst>
+              <a:ext uri="{FF2B5EF4-FFF2-40B4-BE49-F238E27FC236}">
+                <a16:creationId xmlns:a16="http://schemas.microsoft.com/office/drawing/2014/main" id="{76E4BB0F-F9A3-D615-C110-6FBACDC7F6A4}"/>
+              </a:ext>
+            </a:extLst>
+          </p:cNvPr>
+          <p:cNvSpPr txBox="1"/>
+          <p:nvPr/>
+        </p:nvSpPr>
+        <p:spPr>
+          <a:xfrm>
+            <a:off x="6641286" y="3028899"/>
+            <a:ext cx="306228" cy="369332"/>
+          </a:xfrm>
+          <a:prstGeom prst="rect">
+            <a:avLst/>
+          </a:prstGeom>
+          <a:noFill/>
+        </p:spPr>
+        <p:txBody>
+          <a:bodyPr wrap="square" rtlCol="0">
+            <a:spAutoFit/>
+          </a:bodyPr>
+          <a:lstStyle/>
+          <a:p>
+            <a:r>
+              <a:rPr lang="pt-PT" dirty="0"/>
+              <a:t>3</a:t>
+            </a:r>
+          </a:p>
+        </p:txBody>
+      </p:sp>
+      <p:sp>
+        <p:nvSpPr>
+          <p:cNvPr id="39" name="CaixaDeTexto 38">
+            <a:extLst>
+              <a:ext uri="{FF2B5EF4-FFF2-40B4-BE49-F238E27FC236}">
+                <a16:creationId xmlns:a16="http://schemas.microsoft.com/office/drawing/2014/main" id="{F3A91E18-A115-461E-8E54-2F02DF640087}"/>
+              </a:ext>
+            </a:extLst>
+          </p:cNvPr>
+          <p:cNvSpPr txBox="1"/>
+          <p:nvPr/>
+        </p:nvSpPr>
+        <p:spPr>
+          <a:xfrm>
+            <a:off x="314729" y="4588779"/>
+            <a:ext cx="5326638" cy="1415772"/>
+          </a:xfrm>
+          <a:prstGeom prst="rect">
+            <a:avLst/>
+          </a:prstGeom>
+          <a:noFill/>
+        </p:spPr>
+        <p:txBody>
+          <a:bodyPr wrap="square" rtlCol="0">
+            <a:spAutoFit/>
+          </a:bodyPr>
+          <a:lstStyle/>
+          <a:p>
+            <a:r>
+              <a:rPr lang="pt-PT" sz="1400" b="1" dirty="0" err="1"/>
+              <a:t>Legend</a:t>
+            </a:r>
+            <a:endParaRPr lang="pt-PT" sz="1400" b="1" dirty="0"/>
+          </a:p>
+          <a:p>
+            <a:r>
+              <a:rPr lang="pt-PT" sz="1200" dirty="0"/>
+              <a:t>1</a:t>
+            </a:r>
+          </a:p>
+          <a:p>
+            <a:pPr marL="171450" indent="-171450">
+              <a:buFont typeface="Arial" panose="020B0604020202020204" pitchFamily="34" charset="0"/>
+              <a:buChar char="•"/>
+            </a:pPr>
+            <a:r>
+              <a:rPr lang="pt-PT" sz="1200" dirty="0" err="1"/>
+              <a:t>init</a:t>
+            </a:r>
+            <a:r>
+              <a:rPr lang="pt-PT" sz="1200" dirty="0"/>
+              <a:t> and </a:t>
+            </a:r>
+            <a:r>
+              <a:rPr lang="pt-PT" sz="1200" dirty="0" err="1"/>
+              <a:t>start</a:t>
+            </a:r>
+            <a:r>
+              <a:rPr lang="pt-PT" sz="1200" dirty="0"/>
+              <a:t> </a:t>
+            </a:r>
+            <a:r>
+              <a:rPr lang="pt-PT" sz="1200" dirty="0" err="1"/>
+              <a:t>thread</a:t>
+            </a:r>
+            <a:endParaRPr lang="pt-PT" sz="1200" dirty="0"/>
+          </a:p>
+          <a:p>
+            <a:r>
+              <a:rPr lang="pt-PT" sz="1200" dirty="0"/>
+              <a:t>2</a:t>
+            </a:r>
+          </a:p>
+          <a:p>
+            <a:pPr marL="171450" indent="-171450">
+              <a:buFont typeface="Arial" panose="020B0604020202020204" pitchFamily="34" charset="0"/>
+              <a:buChar char="•"/>
+            </a:pPr>
+            <a:r>
+              <a:rPr lang="pt-PT" sz="1200" dirty="0" err="1"/>
+              <a:t>fillFileName</a:t>
+            </a:r>
+            <a:r>
+              <a:rPr lang="pt-PT" sz="1200" dirty="0"/>
+              <a:t> – </a:t>
+            </a:r>
+            <a:r>
+              <a:rPr lang="pt-PT" sz="1200" dirty="0" err="1"/>
+              <a:t>fill</a:t>
+            </a:r>
+            <a:r>
+              <a:rPr lang="pt-PT" sz="1200" dirty="0"/>
+              <a:t> </a:t>
+            </a:r>
+            <a:r>
+              <a:rPr lang="pt-PT" sz="1200" dirty="0" err="1"/>
+              <a:t>shared</a:t>
+            </a:r>
+            <a:r>
+              <a:rPr lang="pt-PT" sz="1200" dirty="0"/>
+              <a:t> </a:t>
+            </a:r>
+            <a:r>
+              <a:rPr lang="pt-PT" sz="1200" dirty="0" err="1"/>
+              <a:t>memory</a:t>
+            </a:r>
+            <a:r>
+              <a:rPr lang="pt-PT" sz="1200" dirty="0"/>
+              <a:t> </a:t>
+            </a:r>
+            <a:r>
+              <a:rPr lang="pt-PT" sz="1200" dirty="0" err="1"/>
+              <a:t>with</a:t>
+            </a:r>
+            <a:r>
+              <a:rPr lang="pt-PT" sz="1200" dirty="0"/>
+              <a:t> file </a:t>
+            </a:r>
+            <a:r>
+              <a:rPr lang="pt-PT" sz="1200" dirty="0" err="1"/>
+              <a:t>name</a:t>
+            </a:r>
+            <a:r>
+              <a:rPr lang="pt-PT" sz="1200" dirty="0"/>
+              <a:t> </a:t>
+            </a:r>
+            <a:r>
+              <a:rPr lang="pt-PT" sz="1200" dirty="0" err="1"/>
+              <a:t>containing</a:t>
+            </a:r>
+            <a:r>
+              <a:rPr lang="pt-PT" sz="1200" dirty="0"/>
+              <a:t> the </a:t>
+            </a:r>
+            <a:r>
+              <a:rPr lang="pt-PT" sz="1200" dirty="0" err="1"/>
+              <a:t>integer</a:t>
+            </a:r>
+            <a:r>
+              <a:rPr lang="pt-PT" sz="1200" dirty="0"/>
+              <a:t> </a:t>
+            </a:r>
+            <a:r>
+              <a:rPr lang="pt-PT" sz="1200" dirty="0" err="1"/>
+              <a:t>sequence</a:t>
+            </a:r>
+            <a:endParaRPr lang="pt-PT" sz="1200" dirty="0"/>
+          </a:p>
+          <a:p>
+            <a:pPr marL="171450" indent="-171450">
+              <a:buFont typeface="Arial" panose="020B0604020202020204" pitchFamily="34" charset="0"/>
+              <a:buChar char="•"/>
+            </a:pPr>
+            <a:r>
+              <a:rPr lang="pt-PT" sz="1200" dirty="0" err="1"/>
+              <a:t>validateArray</a:t>
+            </a:r>
+            <a:r>
+              <a:rPr lang="pt-PT" sz="1200" dirty="0"/>
+              <a:t> – </a:t>
+            </a:r>
+            <a:r>
+              <a:rPr lang="pt-PT" sz="1200" dirty="0" err="1"/>
+              <a:t>validate</a:t>
+            </a:r>
+            <a:r>
+              <a:rPr lang="pt-PT" sz="1200" dirty="0"/>
+              <a:t> </a:t>
+            </a:r>
+            <a:r>
+              <a:rPr lang="pt-PT" sz="1200" dirty="0" err="1"/>
+              <a:t>if</a:t>
+            </a:r>
+            <a:r>
+              <a:rPr lang="pt-PT" sz="1200" dirty="0"/>
+              <a:t> the </a:t>
+            </a:r>
+            <a:r>
+              <a:rPr lang="pt-PT" sz="1200" dirty="0" err="1"/>
+              <a:t>obtained</a:t>
+            </a:r>
+            <a:r>
+              <a:rPr lang="pt-PT" sz="1200" dirty="0"/>
+              <a:t> </a:t>
+            </a:r>
+            <a:r>
+              <a:rPr lang="pt-PT" sz="1200" dirty="0" err="1"/>
+              <a:t>array</a:t>
+            </a:r>
+            <a:r>
+              <a:rPr lang="pt-PT" sz="1200" dirty="0"/>
+              <a:t> </a:t>
+            </a:r>
+            <a:r>
+              <a:rPr lang="pt-PT" sz="1200" dirty="0" err="1"/>
+              <a:t>is</a:t>
+            </a:r>
+            <a:r>
+              <a:rPr lang="pt-PT" sz="1200" dirty="0"/>
+              <a:t> </a:t>
+            </a:r>
+            <a:r>
+              <a:rPr lang="pt-PT" sz="1200" dirty="0" err="1"/>
+              <a:t>sorted</a:t>
+            </a:r>
+            <a:endParaRPr lang="pt-PT" sz="1200" dirty="0"/>
+          </a:p>
+          <a:p>
+            <a:endParaRPr lang="pt-PT" sz="1200" dirty="0"/>
+          </a:p>
+        </p:txBody>
+      </p:sp>
+      <p:sp>
+        <p:nvSpPr>
+          <p:cNvPr id="40" name="CaixaDeTexto 39">
+            <a:extLst>
+              <a:ext uri="{FF2B5EF4-FFF2-40B4-BE49-F238E27FC236}">
+                <a16:creationId xmlns:a16="http://schemas.microsoft.com/office/drawing/2014/main" id="{795EE621-B0DA-1864-3810-F00F8AE12751}"/>
+              </a:ext>
+            </a:extLst>
+          </p:cNvPr>
+          <p:cNvSpPr txBox="1"/>
+          <p:nvPr/>
+        </p:nvSpPr>
+        <p:spPr>
+          <a:xfrm>
+            <a:off x="2280576" y="3170930"/>
+            <a:ext cx="142329" cy="369332"/>
+          </a:xfrm>
+          <a:prstGeom prst="rect">
+            <a:avLst/>
+          </a:prstGeom>
+          <a:noFill/>
+        </p:spPr>
+        <p:txBody>
+          <a:bodyPr wrap="square" rtlCol="0">
+            <a:spAutoFit/>
+          </a:bodyPr>
+          <a:lstStyle/>
+          <a:p>
+            <a:r>
+              <a:rPr lang="pt-PT" dirty="0"/>
+              <a:t>1</a:t>
+            </a:r>
+          </a:p>
+        </p:txBody>
+      </p:sp>
+      <p:sp>
+        <p:nvSpPr>
+          <p:cNvPr id="43" name="CaixaDeTexto 42">
+            <a:extLst>
+              <a:ext uri="{FF2B5EF4-FFF2-40B4-BE49-F238E27FC236}">
+                <a16:creationId xmlns:a16="http://schemas.microsoft.com/office/drawing/2014/main" id="{A0129DEF-BC5F-3570-248C-53E0A04991F7}"/>
+              </a:ext>
+            </a:extLst>
+          </p:cNvPr>
+          <p:cNvSpPr txBox="1"/>
+          <p:nvPr/>
+        </p:nvSpPr>
+        <p:spPr>
+          <a:xfrm>
+            <a:off x="5620253" y="4706844"/>
+            <a:ext cx="5326638" cy="1200329"/>
+          </a:xfrm>
+          <a:prstGeom prst="rect">
+            <a:avLst/>
+          </a:prstGeom>
+          <a:noFill/>
+        </p:spPr>
+        <p:txBody>
+          <a:bodyPr wrap="square" rtlCol="0">
+            <a:spAutoFit/>
+          </a:bodyPr>
+          <a:lstStyle/>
+          <a:p>
+            <a:r>
+              <a:rPr lang="pt-PT" sz="1200" dirty="0"/>
+              <a:t>3</a:t>
+            </a:r>
+          </a:p>
+          <a:p>
+            <a:pPr marL="171450" indent="-171450">
+              <a:buFont typeface="Arial" panose="020B0604020202020204" pitchFamily="34" charset="0"/>
+              <a:buChar char="•"/>
+            </a:pPr>
+            <a:r>
+              <a:rPr lang="pt-PT" sz="1200" dirty="0" err="1"/>
+              <a:t>readIntegerSequence</a:t>
+            </a:r>
+            <a:r>
+              <a:rPr lang="pt-PT" sz="1200" dirty="0"/>
+              <a:t> – </a:t>
+            </a:r>
+            <a:r>
+              <a:rPr lang="pt-PT" sz="1200" dirty="0" err="1"/>
+              <a:t>fill</a:t>
+            </a:r>
+            <a:r>
+              <a:rPr lang="pt-PT" sz="1200" dirty="0"/>
+              <a:t> </a:t>
+            </a:r>
+            <a:r>
+              <a:rPr lang="pt-PT" sz="1200" dirty="0" err="1"/>
+              <a:t>shared</a:t>
+            </a:r>
+            <a:r>
+              <a:rPr lang="pt-PT" sz="1200" dirty="0"/>
+              <a:t> </a:t>
+            </a:r>
+            <a:r>
+              <a:rPr lang="pt-PT" sz="1200" dirty="0" err="1"/>
+              <a:t>memory</a:t>
+            </a:r>
+            <a:r>
+              <a:rPr lang="pt-PT" sz="1200" dirty="0"/>
+              <a:t> </a:t>
+            </a:r>
+            <a:r>
+              <a:rPr lang="pt-PT" sz="1200" dirty="0" err="1"/>
+              <a:t>with</a:t>
+            </a:r>
+            <a:r>
+              <a:rPr lang="pt-PT" sz="1200" dirty="0"/>
+              <a:t> the </a:t>
+            </a:r>
+            <a:r>
+              <a:rPr lang="pt-PT" sz="1200" dirty="0" err="1"/>
+              <a:t>integer</a:t>
+            </a:r>
+            <a:r>
+              <a:rPr lang="pt-PT" sz="1200" dirty="0"/>
+              <a:t> </a:t>
+            </a:r>
+            <a:r>
+              <a:rPr lang="pt-PT" sz="1200" dirty="0" err="1"/>
+              <a:t>array</a:t>
+            </a:r>
+            <a:endParaRPr lang="pt-PT" sz="1200" dirty="0"/>
+          </a:p>
+          <a:p>
+            <a:pPr marL="171450" indent="-171450">
+              <a:buFont typeface="Arial" panose="020B0604020202020204" pitchFamily="34" charset="0"/>
+              <a:buChar char="•"/>
+            </a:pPr>
+            <a:r>
+              <a:rPr lang="pt-PT" sz="1200" dirty="0" err="1"/>
+              <a:t>assignWork</a:t>
+            </a:r>
+            <a:r>
+              <a:rPr lang="pt-PT" sz="1200" dirty="0"/>
+              <a:t> – </a:t>
+            </a:r>
+            <a:r>
+              <a:rPr lang="pt-PT" sz="1200" dirty="0" err="1"/>
+              <a:t>assign</a:t>
+            </a:r>
+            <a:r>
+              <a:rPr lang="pt-PT" sz="1200" dirty="0"/>
+              <a:t> </a:t>
+            </a:r>
+            <a:r>
+              <a:rPr lang="pt-PT" sz="1200" dirty="0" err="1"/>
+              <a:t>work</a:t>
+            </a:r>
+            <a:r>
+              <a:rPr lang="pt-PT" sz="1200" dirty="0"/>
+              <a:t> to the </a:t>
+            </a:r>
+            <a:r>
+              <a:rPr lang="pt-PT" sz="1200" dirty="0" err="1"/>
+              <a:t>worker</a:t>
+            </a:r>
+            <a:r>
+              <a:rPr lang="pt-PT" sz="1200" dirty="0"/>
+              <a:t> </a:t>
+            </a:r>
+            <a:r>
+              <a:rPr lang="pt-PT" sz="1200" dirty="0" err="1"/>
+              <a:t>threads</a:t>
+            </a:r>
+            <a:endParaRPr lang="pt-PT" sz="1200" dirty="0"/>
+          </a:p>
+          <a:p>
+            <a:r>
+              <a:rPr lang="pt-PT" sz="1200" dirty="0"/>
+              <a:t>4</a:t>
+            </a:r>
+          </a:p>
+          <a:p>
+            <a:pPr marL="171450" indent="-171450">
+              <a:buFont typeface="Arial" panose="020B0604020202020204" pitchFamily="34" charset="0"/>
+              <a:buChar char="•"/>
+            </a:pPr>
+            <a:r>
+              <a:rPr lang="pt-PT" sz="1200" dirty="0" err="1"/>
+              <a:t>requestWork</a:t>
+            </a:r>
+            <a:r>
+              <a:rPr lang="pt-PT" sz="1200" dirty="0"/>
+              <a:t> – </a:t>
+            </a:r>
+            <a:r>
+              <a:rPr lang="pt-PT" sz="1200" dirty="0" err="1"/>
+              <a:t>request</a:t>
+            </a:r>
+            <a:r>
+              <a:rPr lang="pt-PT" sz="1200" dirty="0"/>
+              <a:t> </a:t>
+            </a:r>
+            <a:r>
+              <a:rPr lang="pt-PT" sz="1200" dirty="0" err="1"/>
+              <a:t>integer</a:t>
+            </a:r>
+            <a:r>
+              <a:rPr lang="pt-PT" sz="1200" dirty="0"/>
+              <a:t> </a:t>
+            </a:r>
+            <a:r>
+              <a:rPr lang="pt-PT" sz="1200" dirty="0" err="1"/>
+              <a:t>sequence</a:t>
+            </a:r>
+            <a:r>
+              <a:rPr lang="pt-PT" sz="1200" dirty="0"/>
+              <a:t> to </a:t>
+            </a:r>
+            <a:r>
+              <a:rPr lang="pt-PT" sz="1200" dirty="0" err="1"/>
+              <a:t>sort</a:t>
+            </a:r>
+            <a:endParaRPr lang="pt-PT" sz="1200" dirty="0"/>
+          </a:p>
+          <a:p>
+            <a:pPr marL="171450" indent="-171450">
+              <a:buFont typeface="Arial" panose="020B0604020202020204" pitchFamily="34" charset="0"/>
+              <a:buChar char="•"/>
+            </a:pPr>
+            <a:r>
+              <a:rPr lang="pt-PT" sz="1200" dirty="0" err="1"/>
+              <a:t>informWork</a:t>
+            </a:r>
+            <a:r>
+              <a:rPr lang="pt-PT" sz="1200" dirty="0"/>
+              <a:t> – </a:t>
+            </a:r>
+            <a:r>
+              <a:rPr lang="pt-PT" sz="1200" dirty="0" err="1"/>
+              <a:t>inform</a:t>
+            </a:r>
+            <a:r>
+              <a:rPr lang="pt-PT" sz="1200" dirty="0"/>
+              <a:t> </a:t>
+            </a:r>
+            <a:r>
+              <a:rPr lang="pt-PT" sz="1200" dirty="0" err="1"/>
+              <a:t>that</a:t>
+            </a:r>
+            <a:r>
+              <a:rPr lang="pt-PT" sz="1200" dirty="0"/>
+              <a:t> the </a:t>
+            </a:r>
+            <a:r>
+              <a:rPr lang="pt-PT" sz="1200" dirty="0" err="1"/>
+              <a:t>assigned</a:t>
+            </a:r>
+            <a:r>
+              <a:rPr lang="pt-PT" sz="1200" dirty="0"/>
+              <a:t> </a:t>
+            </a:r>
+            <a:r>
+              <a:rPr lang="pt-PT" sz="1200" dirty="0" err="1"/>
+              <a:t>sequence</a:t>
+            </a:r>
+            <a:r>
+              <a:rPr lang="pt-PT" sz="1200" dirty="0"/>
+              <a:t> </a:t>
+            </a:r>
+            <a:r>
+              <a:rPr lang="pt-PT" sz="1200" dirty="0" err="1"/>
+              <a:t>was</a:t>
+            </a:r>
+            <a:r>
+              <a:rPr lang="pt-PT" sz="1200" dirty="0"/>
+              <a:t> </a:t>
+            </a:r>
+            <a:r>
+              <a:rPr lang="pt-PT" sz="1200" dirty="0" err="1"/>
+              <a:t>sorted</a:t>
+            </a:r>
+            <a:endParaRPr lang="pt-PT" sz="1200" dirty="0"/>
           </a:p>
         </p:txBody>
       </p:sp>
@@ -5478,144 +6681,6 @@
 </file>
 
 <file path=ppt/slides/slide6.xml><?xml version="1.0" encoding="utf-8"?>
-<p:sld xmlns:a="http://schemas.openxmlformats.org/drawingml/2006/main" xmlns:r="http://schemas.openxmlformats.org/officeDocument/2006/relationships" xmlns:p="http://schemas.openxmlformats.org/presentationml/2006/main">
-  <p:cSld>
-    <p:spTree>
-      <p:nvGrpSpPr>
-        <p:cNvPr id="1" name=""/>
-        <p:cNvGrpSpPr/>
-        <p:nvPr/>
-      </p:nvGrpSpPr>
-      <p:grpSpPr>
-        <a:xfrm>
-          <a:off x="0" y="0"/>
-          <a:ext cx="0" cy="0"/>
-          <a:chOff x="0" y="0"/>
-          <a:chExt cx="0" cy="0"/>
-        </a:xfrm>
-      </p:grpSpPr>
-      <p:sp>
-        <p:nvSpPr>
-          <p:cNvPr id="2" name="Título 1">
-            <a:extLst>
-              <a:ext uri="{FF2B5EF4-FFF2-40B4-BE49-F238E27FC236}">
-                <a16:creationId xmlns:a16="http://schemas.microsoft.com/office/drawing/2014/main" id="{C7D52C90-E3ED-4F3F-A8E5-D53ABE83C150}"/>
-              </a:ext>
-            </a:extLst>
-          </p:cNvPr>
-          <p:cNvSpPr>
-            <a:spLocks noGrp="1"/>
-          </p:cNvSpPr>
-          <p:nvPr>
-            <p:ph type="title"/>
-          </p:nvPr>
-        </p:nvSpPr>
-        <p:spPr>
-          <a:xfrm>
-            <a:off x="1451579" y="1039907"/>
-            <a:ext cx="9603275" cy="813848"/>
-          </a:xfrm>
-        </p:spPr>
-        <p:txBody>
-          <a:bodyPr>
-            <a:normAutofit fontScale="90000"/>
-          </a:bodyPr>
-          <a:lstStyle/>
-          <a:p>
-            <a:r>
-              <a:rPr lang="pt-PT" sz="3600" b="1" dirty="0" err="1">
-                <a:latin typeface="Calibri" panose="020F0502020204030204" pitchFamily="34" charset="0"/>
-                <a:ea typeface="Calibri" panose="020F0502020204030204" pitchFamily="34" charset="0"/>
-                <a:cs typeface="Calibri" panose="020F0502020204030204" pitchFamily="34" charset="0"/>
-              </a:rPr>
-              <a:t>Problem</a:t>
-            </a:r>
-            <a:r>
-              <a:rPr lang="pt-PT" sz="3600" b="1" dirty="0">
-                <a:latin typeface="Calibri" panose="020F0502020204030204" pitchFamily="34" charset="0"/>
-                <a:ea typeface="Calibri" panose="020F0502020204030204" pitchFamily="34" charset="0"/>
-                <a:cs typeface="Calibri" panose="020F0502020204030204" pitchFamily="34" charset="0"/>
-              </a:rPr>
-              <a:t> 2</a:t>
-            </a:r>
-            <a:br>
-              <a:rPr lang="pt-PT" dirty="0">
-                <a:latin typeface="Calibri" panose="020F0502020204030204" pitchFamily="34" charset="0"/>
-                <a:ea typeface="Calibri" panose="020F0502020204030204" pitchFamily="34" charset="0"/>
-                <a:cs typeface="Calibri" panose="020F0502020204030204" pitchFamily="34" charset="0"/>
-              </a:rPr>
-            </a:br>
-            <a:r>
-              <a:rPr lang="pt-PT" sz="2200" dirty="0" err="1">
-                <a:latin typeface="Calibri" panose="020F0502020204030204" pitchFamily="34" charset="0"/>
-                <a:ea typeface="Calibri" panose="020F0502020204030204" pitchFamily="34" charset="0"/>
-                <a:cs typeface="Calibri" panose="020F0502020204030204" pitchFamily="34" charset="0"/>
-              </a:rPr>
-              <a:t>Workers</a:t>
-            </a:r>
-            <a:r>
-              <a:rPr lang="pt-PT" sz="2200" dirty="0">
-                <a:latin typeface="Calibri" panose="020F0502020204030204" pitchFamily="34" charset="0"/>
-                <a:ea typeface="Calibri" panose="020F0502020204030204" pitchFamily="34" charset="0"/>
-                <a:cs typeface="Calibri" panose="020F0502020204030204" pitchFamily="34" charset="0"/>
-              </a:rPr>
-              <a:t> / </a:t>
-            </a:r>
-            <a:r>
-              <a:rPr lang="pt-PT" sz="2200" dirty="0" err="1">
-                <a:latin typeface="Calibri" panose="020F0502020204030204" pitchFamily="34" charset="0"/>
-                <a:ea typeface="Calibri" panose="020F0502020204030204" pitchFamily="34" charset="0"/>
-                <a:cs typeface="Calibri" panose="020F0502020204030204" pitchFamily="34" charset="0"/>
-              </a:rPr>
-              <a:t>Distributor</a:t>
-            </a:r>
-            <a:endParaRPr lang="pt-PT" dirty="0">
-              <a:latin typeface="Calibri" panose="020F0502020204030204" pitchFamily="34" charset="0"/>
-              <a:ea typeface="Calibri" panose="020F0502020204030204" pitchFamily="34" charset="0"/>
-              <a:cs typeface="Calibri" panose="020F0502020204030204" pitchFamily="34" charset="0"/>
-            </a:endParaRPr>
-          </a:p>
-        </p:txBody>
-      </p:sp>
-      <p:sp>
-        <p:nvSpPr>
-          <p:cNvPr id="3" name="Marcador de Posição de Conteúdo 2">
-            <a:extLst>
-              <a:ext uri="{FF2B5EF4-FFF2-40B4-BE49-F238E27FC236}">
-                <a16:creationId xmlns:a16="http://schemas.microsoft.com/office/drawing/2014/main" id="{2D745695-6161-41A4-A2E0-37169F11F70A}"/>
-              </a:ext>
-            </a:extLst>
-          </p:cNvPr>
-          <p:cNvSpPr>
-            <a:spLocks noGrp="1"/>
-          </p:cNvSpPr>
-          <p:nvPr>
-            <p:ph idx="1"/>
-          </p:nvPr>
-        </p:nvSpPr>
-        <p:spPr/>
-        <p:txBody>
-          <a:bodyPr/>
-          <a:lstStyle/>
-          <a:p>
-            <a:endParaRPr lang="pt-PT" dirty="0"/>
-          </a:p>
-        </p:txBody>
-      </p:sp>
-    </p:spTree>
-    <p:extLst>
-      <p:ext uri="{BB962C8B-B14F-4D97-AF65-F5344CB8AC3E}">
-        <p14:creationId xmlns:p14="http://schemas.microsoft.com/office/powerpoint/2010/main" val="808554269"/>
-      </p:ext>
-    </p:extLst>
-  </p:cSld>
-  <p:clrMapOvr>
-    <a:masterClrMapping/>
-  </p:clrMapOvr>
-</p:sld>
-</file>
-
-<file path=ppt/slides/slide7.xml><?xml version="1.0" encoding="utf-8"?>
 <p:sld xmlns:a="http://schemas.openxmlformats.org/drawingml/2006/main" xmlns:r="http://schemas.openxmlformats.org/officeDocument/2006/relationships" xmlns:p="http://schemas.openxmlformats.org/presentationml/2006/main">
   <p:cSld>
     <p:spTree>
@@ -6302,6 +7367,128 @@
 </p:sld>
 </file>
 
+<file path=ppt/slides/slide7.xml><?xml version="1.0" encoding="utf-8"?>
+<p:sld xmlns:a="http://schemas.openxmlformats.org/drawingml/2006/main" xmlns:r="http://schemas.openxmlformats.org/officeDocument/2006/relationships" xmlns:p="http://schemas.openxmlformats.org/presentationml/2006/main">
+  <p:cSld>
+    <p:spTree>
+      <p:nvGrpSpPr>
+        <p:cNvPr id="1" name=""/>
+        <p:cNvGrpSpPr/>
+        <p:nvPr/>
+      </p:nvGrpSpPr>
+      <p:grpSpPr>
+        <a:xfrm>
+          <a:off x="0" y="0"/>
+          <a:ext cx="0" cy="0"/>
+          <a:chOff x="0" y="0"/>
+          <a:chExt cx="0" cy="0"/>
+        </a:xfrm>
+      </p:grpSpPr>
+      <p:sp>
+        <p:nvSpPr>
+          <p:cNvPr id="2" name="Título 1">
+            <a:extLst>
+              <a:ext uri="{FF2B5EF4-FFF2-40B4-BE49-F238E27FC236}">
+                <a16:creationId xmlns:a16="http://schemas.microsoft.com/office/drawing/2014/main" id="{C7D52C90-E3ED-4F3F-A8E5-D53ABE83C150}"/>
+              </a:ext>
+            </a:extLst>
+          </p:cNvPr>
+          <p:cNvSpPr>
+            <a:spLocks noGrp="1"/>
+          </p:cNvSpPr>
+          <p:nvPr>
+            <p:ph type="title"/>
+          </p:nvPr>
+        </p:nvSpPr>
+        <p:spPr>
+          <a:xfrm>
+            <a:off x="1451579" y="1039907"/>
+            <a:ext cx="9603275" cy="813848"/>
+          </a:xfrm>
+        </p:spPr>
+        <p:txBody>
+          <a:bodyPr>
+            <a:normAutofit fontScale="90000"/>
+          </a:bodyPr>
+          <a:lstStyle/>
+          <a:p>
+            <a:r>
+              <a:rPr lang="pt-PT" sz="3600" b="1" dirty="0" err="1">
+                <a:latin typeface="Calibri" panose="020F0502020204030204" pitchFamily="34" charset="0"/>
+                <a:ea typeface="Calibri" panose="020F0502020204030204" pitchFamily="34" charset="0"/>
+                <a:cs typeface="Calibri" panose="020F0502020204030204" pitchFamily="34" charset="0"/>
+              </a:rPr>
+              <a:t>Problem</a:t>
+            </a:r>
+            <a:r>
+              <a:rPr lang="pt-PT" sz="3600" b="1" dirty="0">
+                <a:latin typeface="Calibri" panose="020F0502020204030204" pitchFamily="34" charset="0"/>
+                <a:ea typeface="Calibri" panose="020F0502020204030204" pitchFamily="34" charset="0"/>
+                <a:cs typeface="Calibri" panose="020F0502020204030204" pitchFamily="34" charset="0"/>
+              </a:rPr>
+              <a:t> 2</a:t>
+            </a:r>
+            <a:br>
+              <a:rPr lang="pt-PT" dirty="0">
+                <a:latin typeface="Calibri" panose="020F0502020204030204" pitchFamily="34" charset="0"/>
+                <a:ea typeface="Calibri" panose="020F0502020204030204" pitchFamily="34" charset="0"/>
+                <a:cs typeface="Calibri" panose="020F0502020204030204" pitchFamily="34" charset="0"/>
+              </a:rPr>
+            </a:br>
+            <a:r>
+              <a:rPr lang="pt-PT" sz="2200" dirty="0" err="1">
+                <a:latin typeface="Calibri" panose="020F0502020204030204" pitchFamily="34" charset="0"/>
+                <a:ea typeface="Calibri" panose="020F0502020204030204" pitchFamily="34" charset="0"/>
+                <a:cs typeface="Calibri" panose="020F0502020204030204" pitchFamily="34" charset="0"/>
+              </a:rPr>
+              <a:t>Conclusions</a:t>
+            </a:r>
+            <a:endParaRPr lang="pt-PT" dirty="0">
+              <a:latin typeface="Calibri" panose="020F0502020204030204" pitchFamily="34" charset="0"/>
+              <a:ea typeface="Calibri" panose="020F0502020204030204" pitchFamily="34" charset="0"/>
+              <a:cs typeface="Calibri" panose="020F0502020204030204" pitchFamily="34" charset="0"/>
+            </a:endParaRPr>
+          </a:p>
+        </p:txBody>
+      </p:sp>
+      <p:sp>
+        <p:nvSpPr>
+          <p:cNvPr id="3" name="Marcador de Posição de Conteúdo 2">
+            <a:extLst>
+              <a:ext uri="{FF2B5EF4-FFF2-40B4-BE49-F238E27FC236}">
+                <a16:creationId xmlns:a16="http://schemas.microsoft.com/office/drawing/2014/main" id="{2D745695-6161-41A4-A2E0-37169F11F70A}"/>
+              </a:ext>
+            </a:extLst>
+          </p:cNvPr>
+          <p:cNvSpPr>
+            <a:spLocks noGrp="1"/>
+          </p:cNvSpPr>
+          <p:nvPr>
+            <p:ph idx="1"/>
+          </p:nvPr>
+        </p:nvSpPr>
+        <p:spPr/>
+        <p:txBody>
+          <a:bodyPr/>
+          <a:lstStyle/>
+          <a:p>
+            <a:endParaRPr lang="pt-PT" dirty="0"/>
+          </a:p>
+        </p:txBody>
+      </p:sp>
+    </p:spTree>
+    <p:extLst>
+      <p:ext uri="{BB962C8B-B14F-4D97-AF65-F5344CB8AC3E}">
+        <p14:creationId xmlns:p14="http://schemas.microsoft.com/office/powerpoint/2010/main" val="808554269"/>
+      </p:ext>
+    </p:extLst>
+  </p:cSld>
+  <p:clrMapOvr>
+    <a:masterClrMapping/>
+  </p:clrMapOvr>
+</p:sld>
+</file>
+
 <file path=ppt/theme/theme1.xml><?xml version="1.0" encoding="utf-8"?>
 <a:theme xmlns:a="http://schemas.openxmlformats.org/drawingml/2006/main" name="Galeria">
   <a:themeElements>

</xml_diff>

<commit_message>
added more results to presentation
</commit_message>
<xml_diff>
--- a/CLE1_T3G5/present.pptx
+++ b/CLE1_T3G5/present.pptx
@@ -286,7 +286,7 @@
           <a:p>
             <a:fld id="{65E3D7AB-6C06-41C6-99AC-C74008AD09CE}" type="datetimeFigureOut">
               <a:rPr lang="pt-PT" smtClean="0"/>
-              <a:t>21/03/2023</a:t>
+              <a:t>22/03/2023</a:t>
             </a:fld>
             <a:endParaRPr lang="pt-PT"/>
           </a:p>
@@ -514,7 +514,7 @@
           <a:p>
             <a:fld id="{65E3D7AB-6C06-41C6-99AC-C74008AD09CE}" type="datetimeFigureOut">
               <a:rPr lang="pt-PT" smtClean="0"/>
-              <a:t>21/03/2023</a:t>
+              <a:t>22/03/2023</a:t>
             </a:fld>
             <a:endParaRPr lang="pt-PT"/>
           </a:p>
@@ -694,7 +694,7 @@
           <a:p>
             <a:fld id="{65E3D7AB-6C06-41C6-99AC-C74008AD09CE}" type="datetimeFigureOut">
               <a:rPr lang="pt-PT" smtClean="0"/>
-              <a:t>21/03/2023</a:t>
+              <a:t>22/03/2023</a:t>
             </a:fld>
             <a:endParaRPr lang="pt-PT"/>
           </a:p>
@@ -864,7 +864,7 @@
           <a:p>
             <a:fld id="{65E3D7AB-6C06-41C6-99AC-C74008AD09CE}" type="datetimeFigureOut">
               <a:rPr lang="pt-PT" smtClean="0"/>
-              <a:t>21/03/2023</a:t>
+              <a:t>22/03/2023</a:t>
             </a:fld>
             <a:endParaRPr lang="pt-PT"/>
           </a:p>
@@ -1118,7 +1118,7 @@
           <a:p>
             <a:fld id="{65E3D7AB-6C06-41C6-99AC-C74008AD09CE}" type="datetimeFigureOut">
               <a:rPr lang="pt-PT" smtClean="0"/>
-              <a:t>21/03/2023</a:t>
+              <a:t>22/03/2023</a:t>
             </a:fld>
             <a:endParaRPr lang="pt-PT"/>
           </a:p>
@@ -1444,7 +1444,7 @@
           <a:p>
             <a:fld id="{65E3D7AB-6C06-41C6-99AC-C74008AD09CE}" type="datetimeFigureOut">
               <a:rPr lang="pt-PT" smtClean="0"/>
-              <a:t>21/03/2023</a:t>
+              <a:t>22/03/2023</a:t>
             </a:fld>
             <a:endParaRPr lang="pt-PT"/>
           </a:p>
@@ -1895,7 +1895,7 @@
           <a:p>
             <a:fld id="{65E3D7AB-6C06-41C6-99AC-C74008AD09CE}" type="datetimeFigureOut">
               <a:rPr lang="pt-PT" smtClean="0"/>
-              <a:t>21/03/2023</a:t>
+              <a:t>22/03/2023</a:t>
             </a:fld>
             <a:endParaRPr lang="pt-PT"/>
           </a:p>
@@ -2013,7 +2013,7 @@
           <a:p>
             <a:fld id="{65E3D7AB-6C06-41C6-99AC-C74008AD09CE}" type="datetimeFigureOut">
               <a:rPr lang="pt-PT" smtClean="0"/>
-              <a:t>21/03/2023</a:t>
+              <a:t>22/03/2023</a:t>
             </a:fld>
             <a:endParaRPr lang="pt-PT"/>
           </a:p>
@@ -2108,7 +2108,7 @@
           <a:p>
             <a:fld id="{65E3D7AB-6C06-41C6-99AC-C74008AD09CE}" type="datetimeFigureOut">
               <a:rPr lang="pt-PT" smtClean="0"/>
-              <a:t>21/03/2023</a:t>
+              <a:t>22/03/2023</a:t>
             </a:fld>
             <a:endParaRPr lang="pt-PT"/>
           </a:p>
@@ -2395,7 +2395,7 @@
           <a:p>
             <a:fld id="{65E3D7AB-6C06-41C6-99AC-C74008AD09CE}" type="datetimeFigureOut">
               <a:rPr lang="pt-PT" smtClean="0"/>
-              <a:t>21/03/2023</a:t>
+              <a:t>22/03/2023</a:t>
             </a:fld>
             <a:endParaRPr lang="pt-PT"/>
           </a:p>
@@ -2717,7 +2717,7 @@
           <a:p>
             <a:fld id="{65E3D7AB-6C06-41C6-99AC-C74008AD09CE}" type="datetimeFigureOut">
               <a:rPr lang="pt-PT" smtClean="0"/>
-              <a:t>21/03/2023</a:t>
+              <a:t>22/03/2023</a:t>
             </a:fld>
             <a:endParaRPr lang="pt-PT"/>
           </a:p>
@@ -2971,7 +2971,7 @@
           <a:p>
             <a:fld id="{65E3D7AB-6C06-41C6-99AC-C74008AD09CE}" type="datetimeFigureOut">
               <a:rPr lang="pt-PT" smtClean="0"/>
-              <a:t>21/03/2023</a:t>
+              <a:t>22/03/2023</a:t>
             </a:fld>
             <a:endParaRPr lang="pt-PT"/>
           </a:p>
@@ -3591,7 +3591,7 @@
         </p:nvSpPr>
         <p:spPr>
           <a:xfrm>
-            <a:off x="1451579" y="1039907"/>
+            <a:off x="960944" y="700831"/>
             <a:ext cx="9603275" cy="813848"/>
           </a:xfrm>
         </p:spPr>
@@ -3698,15 +3698,7 @@
           <a:p>
             <a:r>
               <a:rPr lang="pt-PT" dirty="0" err="1"/>
-              <a:t>Shared</a:t>
-            </a:r>
-            <a:r>
-              <a:rPr lang="pt-PT" dirty="0"/>
-              <a:t> </a:t>
-            </a:r>
-            <a:r>
-              <a:rPr lang="pt-PT" dirty="0" err="1"/>
-              <a:t>Region</a:t>
+              <a:t>SharedRegion</a:t>
             </a:r>
             <a:endParaRPr lang="pt-PT" sz="1400" dirty="0"/>
           </a:p>
@@ -3900,47 +3892,13 @@
           <a:bodyPr rtlCol="0" anchor="ctr"/>
           <a:lstStyle/>
           <a:p>
-            <a:pPr algn="ctr"/>
-            <a:endParaRPr lang="pt-PT" dirty="0"/>
-          </a:p>
-        </p:txBody>
-      </p:sp>
-      <p:sp>
-        <p:nvSpPr>
-          <p:cNvPr id="13" name="CaixaDeTexto 12">
-            <a:extLst>
-              <a:ext uri="{FF2B5EF4-FFF2-40B4-BE49-F238E27FC236}">
-                <a16:creationId xmlns:a16="http://schemas.microsoft.com/office/drawing/2014/main" id="{902ED50C-BB19-4988-A429-E5917976072E}"/>
-              </a:ext>
-            </a:extLst>
-          </p:cNvPr>
-          <p:cNvSpPr txBox="1"/>
-          <p:nvPr/>
-        </p:nvSpPr>
-        <p:spPr>
-          <a:xfrm>
-            <a:off x="8446123" y="4579636"/>
-            <a:ext cx="2608729" cy="369332"/>
-          </a:xfrm>
-          <a:prstGeom prst="rect">
-            <a:avLst/>
-          </a:prstGeom>
-          <a:noFill/>
-        </p:spPr>
-        <p:txBody>
-          <a:bodyPr wrap="square" rtlCol="0">
-            <a:spAutoFit/>
-          </a:bodyPr>
-          <a:lstStyle/>
-          <a:p>
-            <a:pPr algn="ctr"/>
             <a:r>
               <a:rPr lang="pt-PT" dirty="0" err="1">
                 <a:solidFill>
                   <a:schemeClr val="bg1"/>
                 </a:solidFill>
               </a:rPr>
-              <a:t>FileResults</a:t>
+              <a:t>FileResult</a:t>
             </a:r>
             <a:endParaRPr lang="pt-PT" dirty="0">
               <a:solidFill>
@@ -3948,35 +3906,6 @@
               </a:solidFill>
             </a:endParaRPr>
           </a:p>
-        </p:txBody>
-      </p:sp>
-      <p:sp>
-        <p:nvSpPr>
-          <p:cNvPr id="14" name="CaixaDeTexto 13">
-            <a:extLst>
-              <a:ext uri="{FF2B5EF4-FFF2-40B4-BE49-F238E27FC236}">
-                <a16:creationId xmlns:a16="http://schemas.microsoft.com/office/drawing/2014/main" id="{9305E7AD-A7AC-4270-B857-86C147BDBCF8}"/>
-              </a:ext>
-            </a:extLst>
-          </p:cNvPr>
-          <p:cNvSpPr txBox="1"/>
-          <p:nvPr/>
-        </p:nvSpPr>
-        <p:spPr>
-          <a:xfrm>
-            <a:off x="8446124" y="5079761"/>
-            <a:ext cx="2608728" cy="738664"/>
-          </a:xfrm>
-          <a:prstGeom prst="rect">
-            <a:avLst/>
-          </a:prstGeom>
-          <a:noFill/>
-        </p:spPr>
-        <p:txBody>
-          <a:bodyPr wrap="square" rtlCol="0">
-            <a:spAutoFit/>
-          </a:bodyPr>
-          <a:lstStyle/>
           <a:p>
             <a:pPr marL="285750" indent="-285750">
               <a:buFont typeface="Arial" panose="020B0604020202020204" pitchFamily="34" charset="0"/>
@@ -4084,6 +4013,10 @@
                 <a:schemeClr val="bg1"/>
               </a:solidFill>
             </a:endParaRPr>
+          </a:p>
+          <a:p>
+            <a:pPr algn="ctr"/>
+            <a:endParaRPr lang="pt-PT" sz="1400" dirty="0"/>
           </a:p>
         </p:txBody>
       </p:sp>
@@ -4784,14 +4717,14 @@
             <p:ph idx="1"/>
             <p:extLst>
               <p:ext uri="{D42A27DB-BD31-4B8C-83A1-F6EECF244321}">
-                <p14:modId xmlns:p14="http://schemas.microsoft.com/office/powerpoint/2010/main" val="2032687290"/>
+                <p14:modId xmlns:p14="http://schemas.microsoft.com/office/powerpoint/2010/main" val="2297716517"/>
               </p:ext>
             </p:extLst>
           </p:nvPr>
         </p:nvGraphicFramePr>
         <p:xfrm>
           <a:off x="1450977" y="1631577"/>
-          <a:ext cx="8594720" cy="1381760"/>
+          <a:ext cx="8594720" cy="1259840"/>
         </p:xfrm>
         <a:graphic>
           <a:graphicData uri="http://schemas.openxmlformats.org/drawingml/2006/table">
@@ -5004,21 +4937,24 @@
                     <a:p>
                       <a:pPr algn="ctr"/>
                       <a:r>
-                        <a:rPr lang="pt-PT" b="0" dirty="0" err="1">
+                        <a:rPr lang="pt-PT" sz="1400" b="0" dirty="0" err="1">
                           <a:latin typeface="Calibri" panose="020F0502020204030204" pitchFamily="34" charset="0"/>
                           <a:ea typeface="Calibri" panose="020F0502020204030204" pitchFamily="34" charset="0"/>
                           <a:cs typeface="Calibri" panose="020F0502020204030204" pitchFamily="34" charset="0"/>
                         </a:rPr>
                         <a:t>Median</a:t>
                       </a:r>
-                      <a:endParaRPr lang="pt-PT" b="0" dirty="0">
-                        <a:latin typeface="Calibri" panose="020F0502020204030204" pitchFamily="34" charset="0"/>
-                        <a:ea typeface="Calibri" panose="020F0502020204030204" pitchFamily="34" charset="0"/>
-                        <a:cs typeface="Calibri" panose="020F0502020204030204" pitchFamily="34" charset="0"/>
-                      </a:endParaRPr>
-                    </a:p>
-                  </a:txBody>
-                  <a:tcPr marL="81828" marR="81828">
+                      <a:r>
+                        <a:rPr lang="pt-PT" sz="1400" b="0" dirty="0">
+                          <a:latin typeface="Calibri" panose="020F0502020204030204" pitchFamily="34" charset="0"/>
+                          <a:ea typeface="Calibri" panose="020F0502020204030204" pitchFamily="34" charset="0"/>
+                          <a:cs typeface="Calibri" panose="020F0502020204030204" pitchFamily="34" charset="0"/>
+                        </a:rPr>
+                        <a:t> (s)</a:t>
+                      </a:r>
+                    </a:p>
+                  </a:txBody>
+                  <a:tcPr marL="81828" marR="81828" anchor="ctr">
                     <a:solidFill>
                       <a:schemeClr val="bg2">
                         <a:lumMod val="75000"/>
@@ -5033,7 +4969,7 @@
                     <a:p>
                       <a:pPr algn="ctr"/>
                       <a:r>
-                        <a:rPr lang="pt-PT" b="0" dirty="0">
+                        <a:rPr lang="pt-PT" sz="1400" b="0" dirty="0">
                           <a:latin typeface="Calibri" panose="020F0502020204030204" pitchFamily="34" charset="0"/>
                           <a:ea typeface="Calibri" panose="020F0502020204030204" pitchFamily="34" charset="0"/>
                           <a:cs typeface="Calibri" panose="020F0502020204030204" pitchFamily="34" charset="0"/>
@@ -5041,21 +4977,24 @@
                         <a:t>Standard </a:t>
                       </a:r>
                       <a:r>
-                        <a:rPr lang="pt-PT" b="0" dirty="0" err="1">
+                        <a:rPr lang="pt-PT" sz="1400" b="0" dirty="0" err="1">
                           <a:latin typeface="Calibri" panose="020F0502020204030204" pitchFamily="34" charset="0"/>
                           <a:ea typeface="Calibri" panose="020F0502020204030204" pitchFamily="34" charset="0"/>
                           <a:cs typeface="Calibri" panose="020F0502020204030204" pitchFamily="34" charset="0"/>
                         </a:rPr>
                         <a:t>deviation</a:t>
                       </a:r>
-                      <a:endParaRPr lang="pt-PT" b="0" dirty="0">
-                        <a:latin typeface="Calibri" panose="020F0502020204030204" pitchFamily="34" charset="0"/>
-                        <a:ea typeface="Calibri" panose="020F0502020204030204" pitchFamily="34" charset="0"/>
-                        <a:cs typeface="Calibri" panose="020F0502020204030204" pitchFamily="34" charset="0"/>
-                      </a:endParaRPr>
-                    </a:p>
-                  </a:txBody>
-                  <a:tcPr marL="81828" marR="81828">
+                      <a:r>
+                        <a:rPr lang="pt-PT" sz="1400" b="0" dirty="0">
+                          <a:latin typeface="Calibri" panose="020F0502020204030204" pitchFamily="34" charset="0"/>
+                          <a:ea typeface="Calibri" panose="020F0502020204030204" pitchFamily="34" charset="0"/>
+                          <a:cs typeface="Calibri" panose="020F0502020204030204" pitchFamily="34" charset="0"/>
+                        </a:rPr>
+                        <a:t> (s)</a:t>
+                      </a:r>
+                    </a:p>
+                  </a:txBody>
+                  <a:tcPr marL="81828" marR="81828" anchor="ctr">
                     <a:solidFill>
                       <a:schemeClr val="bg2">
                         <a:lumMod val="75000"/>
@@ -5070,21 +5009,24 @@
                     <a:p>
                       <a:pPr algn="ctr"/>
                       <a:r>
-                        <a:rPr lang="pt-PT" b="0" dirty="0" err="1">
+                        <a:rPr lang="pt-PT" sz="1400" b="0" dirty="0" err="1">
                           <a:latin typeface="Calibri" panose="020F0502020204030204" pitchFamily="34" charset="0"/>
                           <a:ea typeface="Calibri" panose="020F0502020204030204" pitchFamily="34" charset="0"/>
                           <a:cs typeface="Calibri" panose="020F0502020204030204" pitchFamily="34" charset="0"/>
                         </a:rPr>
                         <a:t>Median</a:t>
                       </a:r>
-                      <a:endParaRPr lang="pt-PT" b="0" dirty="0">
-                        <a:latin typeface="Calibri" panose="020F0502020204030204" pitchFamily="34" charset="0"/>
-                        <a:ea typeface="Calibri" panose="020F0502020204030204" pitchFamily="34" charset="0"/>
-                        <a:cs typeface="Calibri" panose="020F0502020204030204" pitchFamily="34" charset="0"/>
-                      </a:endParaRPr>
-                    </a:p>
-                  </a:txBody>
-                  <a:tcPr marL="81828" marR="81828">
+                      <a:r>
+                        <a:rPr lang="pt-PT" sz="1400" b="0" dirty="0">
+                          <a:latin typeface="Calibri" panose="020F0502020204030204" pitchFamily="34" charset="0"/>
+                          <a:ea typeface="Calibri" panose="020F0502020204030204" pitchFamily="34" charset="0"/>
+                          <a:cs typeface="Calibri" panose="020F0502020204030204" pitchFamily="34" charset="0"/>
+                        </a:rPr>
+                        <a:t> (s)</a:t>
+                      </a:r>
+                    </a:p>
+                  </a:txBody>
+                  <a:tcPr marL="81828" marR="81828" anchor="ctr">
                     <a:solidFill>
                       <a:schemeClr val="bg2">
                         <a:lumMod val="75000"/>
@@ -5099,7 +5041,7 @@
                     <a:p>
                       <a:pPr algn="ctr"/>
                       <a:r>
-                        <a:rPr lang="pt-PT" b="0" dirty="0">
+                        <a:rPr lang="pt-PT" sz="1400" b="0" dirty="0">
                           <a:latin typeface="Calibri" panose="020F0502020204030204" pitchFamily="34" charset="0"/>
                           <a:ea typeface="Calibri" panose="020F0502020204030204" pitchFamily="34" charset="0"/>
                           <a:cs typeface="Calibri" panose="020F0502020204030204" pitchFamily="34" charset="0"/>
@@ -5107,21 +5049,24 @@
                         <a:t>Standard </a:t>
                       </a:r>
                       <a:r>
-                        <a:rPr lang="pt-PT" b="0" dirty="0" err="1">
+                        <a:rPr lang="pt-PT" sz="1400" b="0" dirty="0" err="1">
                           <a:latin typeface="Calibri" panose="020F0502020204030204" pitchFamily="34" charset="0"/>
                           <a:ea typeface="Calibri" panose="020F0502020204030204" pitchFamily="34" charset="0"/>
                           <a:cs typeface="Calibri" panose="020F0502020204030204" pitchFamily="34" charset="0"/>
                         </a:rPr>
                         <a:t>deviation</a:t>
                       </a:r>
-                      <a:endParaRPr lang="pt-PT" b="0" dirty="0">
-                        <a:latin typeface="Calibri" panose="020F0502020204030204" pitchFamily="34" charset="0"/>
-                        <a:ea typeface="Calibri" panose="020F0502020204030204" pitchFamily="34" charset="0"/>
-                        <a:cs typeface="Calibri" panose="020F0502020204030204" pitchFamily="34" charset="0"/>
-                      </a:endParaRPr>
-                    </a:p>
-                  </a:txBody>
-                  <a:tcPr marL="81828" marR="81828">
+                      <a:r>
+                        <a:rPr lang="pt-PT" sz="1400" b="0" dirty="0">
+                          <a:latin typeface="Calibri" panose="020F0502020204030204" pitchFamily="34" charset="0"/>
+                          <a:ea typeface="Calibri" panose="020F0502020204030204" pitchFamily="34" charset="0"/>
+                          <a:cs typeface="Calibri" panose="020F0502020204030204" pitchFamily="34" charset="0"/>
+                        </a:rPr>
+                        <a:t> (s)</a:t>
+                      </a:r>
+                    </a:p>
+                  </a:txBody>
+                  <a:tcPr marL="81828" marR="81828" anchor="ctr">
                     <a:solidFill>
                       <a:schemeClr val="bg2">
                         <a:lumMod val="75000"/>
@@ -5136,21 +5081,24 @@
                     <a:p>
                       <a:pPr algn="ctr"/>
                       <a:r>
-                        <a:rPr lang="pt-PT" b="0" dirty="0" err="1">
+                        <a:rPr lang="pt-PT" sz="1400" b="0" dirty="0" err="1">
                           <a:latin typeface="Calibri" panose="020F0502020204030204" pitchFamily="34" charset="0"/>
                           <a:ea typeface="Calibri" panose="020F0502020204030204" pitchFamily="34" charset="0"/>
                           <a:cs typeface="Calibri" panose="020F0502020204030204" pitchFamily="34" charset="0"/>
                         </a:rPr>
                         <a:t>Median</a:t>
                       </a:r>
-                      <a:endParaRPr lang="pt-PT" b="0" dirty="0">
-                        <a:latin typeface="Calibri" panose="020F0502020204030204" pitchFamily="34" charset="0"/>
-                        <a:ea typeface="Calibri" panose="020F0502020204030204" pitchFamily="34" charset="0"/>
-                        <a:cs typeface="Calibri" panose="020F0502020204030204" pitchFamily="34" charset="0"/>
-                      </a:endParaRPr>
-                    </a:p>
-                  </a:txBody>
-                  <a:tcPr marL="81828" marR="81828">
+                      <a:r>
+                        <a:rPr lang="pt-PT" sz="1400" b="0" dirty="0">
+                          <a:latin typeface="Calibri" panose="020F0502020204030204" pitchFamily="34" charset="0"/>
+                          <a:ea typeface="Calibri" panose="020F0502020204030204" pitchFamily="34" charset="0"/>
+                          <a:cs typeface="Calibri" panose="020F0502020204030204" pitchFamily="34" charset="0"/>
+                        </a:rPr>
+                        <a:t> (s)</a:t>
+                      </a:r>
+                    </a:p>
+                  </a:txBody>
+                  <a:tcPr marL="81828" marR="81828" anchor="ctr">
                     <a:solidFill>
                       <a:schemeClr val="bg2">
                         <a:lumMod val="75000"/>
@@ -5165,7 +5113,7 @@
                     <a:p>
                       <a:pPr algn="ctr"/>
                       <a:r>
-                        <a:rPr lang="pt-PT" b="0" dirty="0">
+                        <a:rPr lang="pt-PT" sz="1400" b="0" dirty="0">
                           <a:latin typeface="Calibri" panose="020F0502020204030204" pitchFamily="34" charset="0"/>
                           <a:ea typeface="Calibri" panose="020F0502020204030204" pitchFamily="34" charset="0"/>
                           <a:cs typeface="Calibri" panose="020F0502020204030204" pitchFamily="34" charset="0"/>
@@ -5173,21 +5121,24 @@
                         <a:t>Standard </a:t>
                       </a:r>
                       <a:r>
-                        <a:rPr lang="pt-PT" b="0" dirty="0" err="1">
+                        <a:rPr lang="pt-PT" sz="1400" b="0" dirty="0" err="1">
                           <a:latin typeface="Calibri" panose="020F0502020204030204" pitchFamily="34" charset="0"/>
                           <a:ea typeface="Calibri" panose="020F0502020204030204" pitchFamily="34" charset="0"/>
                           <a:cs typeface="Calibri" panose="020F0502020204030204" pitchFamily="34" charset="0"/>
                         </a:rPr>
                         <a:t>deviation</a:t>
                       </a:r>
-                      <a:endParaRPr lang="pt-PT" b="0" dirty="0">
-                        <a:latin typeface="Calibri" panose="020F0502020204030204" pitchFamily="34" charset="0"/>
-                        <a:ea typeface="Calibri" panose="020F0502020204030204" pitchFamily="34" charset="0"/>
-                        <a:cs typeface="Calibri" panose="020F0502020204030204" pitchFamily="34" charset="0"/>
-                      </a:endParaRPr>
-                    </a:p>
-                  </a:txBody>
-                  <a:tcPr marL="81828" marR="81828">
+                      <a:r>
+                        <a:rPr lang="pt-PT" sz="1400" b="0" dirty="0">
+                          <a:latin typeface="Calibri" panose="020F0502020204030204" pitchFamily="34" charset="0"/>
+                          <a:ea typeface="Calibri" panose="020F0502020204030204" pitchFamily="34" charset="0"/>
+                          <a:cs typeface="Calibri" panose="020F0502020204030204" pitchFamily="34" charset="0"/>
+                        </a:rPr>
+                        <a:t> (s)</a:t>
+                      </a:r>
+                    </a:p>
+                  </a:txBody>
+                  <a:tcPr marL="81828" marR="81828" anchor="ctr">
                     <a:solidFill>
                       <a:schemeClr val="bg2">
                         <a:lumMod val="75000"/>
@@ -5202,21 +5153,24 @@
                     <a:p>
                       <a:pPr algn="ctr"/>
                       <a:r>
-                        <a:rPr lang="pt-PT" b="0" dirty="0" err="1">
+                        <a:rPr lang="pt-PT" sz="1400" b="0" dirty="0" err="1">
                           <a:latin typeface="Calibri" panose="020F0502020204030204" pitchFamily="34" charset="0"/>
                           <a:ea typeface="Calibri" panose="020F0502020204030204" pitchFamily="34" charset="0"/>
                           <a:cs typeface="Calibri" panose="020F0502020204030204" pitchFamily="34" charset="0"/>
                         </a:rPr>
                         <a:t>Median</a:t>
                       </a:r>
-                      <a:endParaRPr lang="pt-PT" b="0" dirty="0">
-                        <a:latin typeface="Calibri" panose="020F0502020204030204" pitchFamily="34" charset="0"/>
-                        <a:ea typeface="Calibri" panose="020F0502020204030204" pitchFamily="34" charset="0"/>
-                        <a:cs typeface="Calibri" panose="020F0502020204030204" pitchFamily="34" charset="0"/>
-                      </a:endParaRPr>
-                    </a:p>
-                  </a:txBody>
-                  <a:tcPr marL="81828" marR="81828">
+                      <a:r>
+                        <a:rPr lang="pt-PT" sz="1400" b="0" dirty="0">
+                          <a:latin typeface="Calibri" panose="020F0502020204030204" pitchFamily="34" charset="0"/>
+                          <a:ea typeface="Calibri" panose="020F0502020204030204" pitchFamily="34" charset="0"/>
+                          <a:cs typeface="Calibri" panose="020F0502020204030204" pitchFamily="34" charset="0"/>
+                        </a:rPr>
+                        <a:t> (s)</a:t>
+                      </a:r>
+                    </a:p>
+                  </a:txBody>
+                  <a:tcPr marL="81828" marR="81828" anchor="ctr">
                     <a:solidFill>
                       <a:schemeClr val="bg2">
                         <a:lumMod val="75000"/>
@@ -5231,7 +5185,7 @@
                     <a:p>
                       <a:pPr algn="ctr"/>
                       <a:r>
-                        <a:rPr lang="pt-PT" b="0" dirty="0">
+                        <a:rPr lang="pt-PT" sz="1400" b="0" dirty="0">
                           <a:latin typeface="Calibri" panose="020F0502020204030204" pitchFamily="34" charset="0"/>
                           <a:ea typeface="Calibri" panose="020F0502020204030204" pitchFamily="34" charset="0"/>
                           <a:cs typeface="Calibri" panose="020F0502020204030204" pitchFamily="34" charset="0"/>
@@ -5239,21 +5193,24 @@
                         <a:t>Standard </a:t>
                       </a:r>
                       <a:r>
-                        <a:rPr lang="pt-PT" b="0" dirty="0" err="1">
+                        <a:rPr lang="pt-PT" sz="1400" b="0" dirty="0" err="1">
                           <a:latin typeface="Calibri" panose="020F0502020204030204" pitchFamily="34" charset="0"/>
                           <a:ea typeface="Calibri" panose="020F0502020204030204" pitchFamily="34" charset="0"/>
                           <a:cs typeface="Calibri" panose="020F0502020204030204" pitchFamily="34" charset="0"/>
                         </a:rPr>
                         <a:t>deviation</a:t>
                       </a:r>
-                      <a:endParaRPr lang="pt-PT" b="0" dirty="0">
-                        <a:latin typeface="Calibri" panose="020F0502020204030204" pitchFamily="34" charset="0"/>
-                        <a:ea typeface="Calibri" panose="020F0502020204030204" pitchFamily="34" charset="0"/>
-                        <a:cs typeface="Calibri" panose="020F0502020204030204" pitchFamily="34" charset="0"/>
-                      </a:endParaRPr>
-                    </a:p>
-                  </a:txBody>
-                  <a:tcPr marL="81828" marR="81828">
+                      <a:r>
+                        <a:rPr lang="pt-PT" sz="1400" b="0" dirty="0">
+                          <a:latin typeface="Calibri" panose="020F0502020204030204" pitchFamily="34" charset="0"/>
+                          <a:ea typeface="Calibri" panose="020F0502020204030204" pitchFamily="34" charset="0"/>
+                          <a:cs typeface="Calibri" panose="020F0502020204030204" pitchFamily="34" charset="0"/>
+                        </a:rPr>
+                        <a:t> (s)</a:t>
+                      </a:r>
+                    </a:p>
+                  </a:txBody>
+                  <a:tcPr marL="81828" marR="81828" anchor="ctr">
                     <a:solidFill>
                       <a:schemeClr val="bg2">
                         <a:lumMod val="75000"/>
@@ -5553,6 +5510,843 @@
           </a:p>
         </p:txBody>
       </p:sp>
+      <p:graphicFrame>
+        <p:nvGraphicFramePr>
+          <p:cNvPr id="2" name="Tabela 4">
+            <a:extLst>
+              <a:ext uri="{FF2B5EF4-FFF2-40B4-BE49-F238E27FC236}">
+                <a16:creationId xmlns:a16="http://schemas.microsoft.com/office/drawing/2014/main" id="{C888DCFE-F49C-0932-9E11-69A0DE0E6D32}"/>
+              </a:ext>
+            </a:extLst>
+          </p:cNvPr>
+          <p:cNvGraphicFramePr>
+            <a:graphicFrameLocks/>
+          </p:cNvGraphicFramePr>
+          <p:nvPr>
+            <p:extLst>
+              <p:ext uri="{D42A27DB-BD31-4B8C-83A1-F6EECF244321}">
+                <p14:modId xmlns:p14="http://schemas.microsoft.com/office/powerpoint/2010/main" val="2583431680"/>
+              </p:ext>
+            </p:extLst>
+          </p:nvPr>
+        </p:nvGraphicFramePr>
+        <p:xfrm>
+          <a:off x="1450977" y="3968377"/>
+          <a:ext cx="8594720" cy="1259840"/>
+        </p:xfrm>
+        <a:graphic>
+          <a:graphicData uri="http://schemas.openxmlformats.org/drawingml/2006/table">
+            <a:tbl>
+              <a:tblPr firstRow="1" bandRow="1">
+                <a:tableStyleId>{073A0DAA-6AF3-43AB-8588-CEC1D06C72B9}</a:tableStyleId>
+              </a:tblPr>
+              <a:tblGrid>
+                <a:gridCol w="1074340">
+                  <a:extLst>
+                    <a:ext uri="{9D8B030D-6E8A-4147-A177-3AD203B41FA5}">
+                      <a16:colId xmlns:a16="http://schemas.microsoft.com/office/drawing/2014/main" val="1694873685"/>
+                    </a:ext>
+                  </a:extLst>
+                </a:gridCol>
+                <a:gridCol w="1074340">
+                  <a:extLst>
+                    <a:ext uri="{9D8B030D-6E8A-4147-A177-3AD203B41FA5}">
+                      <a16:colId xmlns:a16="http://schemas.microsoft.com/office/drawing/2014/main" val="3817143934"/>
+                    </a:ext>
+                  </a:extLst>
+                </a:gridCol>
+                <a:gridCol w="1074340">
+                  <a:extLst>
+                    <a:ext uri="{9D8B030D-6E8A-4147-A177-3AD203B41FA5}">
+                      <a16:colId xmlns:a16="http://schemas.microsoft.com/office/drawing/2014/main" val="1516063400"/>
+                    </a:ext>
+                  </a:extLst>
+                </a:gridCol>
+                <a:gridCol w="1074340">
+                  <a:extLst>
+                    <a:ext uri="{9D8B030D-6E8A-4147-A177-3AD203B41FA5}">
+                      <a16:colId xmlns:a16="http://schemas.microsoft.com/office/drawing/2014/main" val="1986810562"/>
+                    </a:ext>
+                  </a:extLst>
+                </a:gridCol>
+                <a:gridCol w="1074340">
+                  <a:extLst>
+                    <a:ext uri="{9D8B030D-6E8A-4147-A177-3AD203B41FA5}">
+                      <a16:colId xmlns:a16="http://schemas.microsoft.com/office/drawing/2014/main" val="1935499054"/>
+                    </a:ext>
+                  </a:extLst>
+                </a:gridCol>
+                <a:gridCol w="1074340">
+                  <a:extLst>
+                    <a:ext uri="{9D8B030D-6E8A-4147-A177-3AD203B41FA5}">
+                      <a16:colId xmlns:a16="http://schemas.microsoft.com/office/drawing/2014/main" val="691534411"/>
+                    </a:ext>
+                  </a:extLst>
+                </a:gridCol>
+                <a:gridCol w="1074340">
+                  <a:extLst>
+                    <a:ext uri="{9D8B030D-6E8A-4147-A177-3AD203B41FA5}">
+                      <a16:colId xmlns:a16="http://schemas.microsoft.com/office/drawing/2014/main" val="3036198595"/>
+                    </a:ext>
+                  </a:extLst>
+                </a:gridCol>
+                <a:gridCol w="1074340">
+                  <a:extLst>
+                    <a:ext uri="{9D8B030D-6E8A-4147-A177-3AD203B41FA5}">
+                      <a16:colId xmlns:a16="http://schemas.microsoft.com/office/drawing/2014/main" val="1547783530"/>
+                    </a:ext>
+                  </a:extLst>
+                </a:gridCol>
+              </a:tblGrid>
+              <a:tr h="370840">
+                <a:tc gridSpan="2">
+                  <a:txBody>
+                    <a:bodyPr/>
+                    <a:lstStyle/>
+                    <a:p>
+                      <a:pPr algn="ctr"/>
+                      <a:r>
+                        <a:rPr lang="pt-PT" b="0" dirty="0"/>
+                        <a:t>1 </a:t>
+                      </a:r>
+                      <a:r>
+                        <a:rPr lang="pt-PT" b="0" dirty="0" err="1"/>
+                        <a:t>worker</a:t>
+                      </a:r>
+                      <a:endParaRPr lang="pt-PT" b="0" dirty="0">
+                        <a:latin typeface="Calibri" panose="020F0502020204030204" pitchFamily="34" charset="0"/>
+                        <a:ea typeface="Calibri" panose="020F0502020204030204" pitchFamily="34" charset="0"/>
+                        <a:cs typeface="Calibri" panose="020F0502020204030204" pitchFamily="34" charset="0"/>
+                      </a:endParaRPr>
+                    </a:p>
+                  </a:txBody>
+                  <a:tcPr marL="81828" marR="81828"/>
+                </a:tc>
+                <a:tc hMerge="1">
+                  <a:txBody>
+                    <a:bodyPr/>
+                    <a:lstStyle/>
+                    <a:p>
+                      <a:endParaRPr lang="pt-PT"/>
+                    </a:p>
+                  </a:txBody>
+                  <a:tcPr/>
+                </a:tc>
+                <a:tc gridSpan="2">
+                  <a:txBody>
+                    <a:bodyPr/>
+                    <a:lstStyle/>
+                    <a:p>
+                      <a:pPr algn="ctr"/>
+                      <a:r>
+                        <a:rPr lang="pt-PT" b="0" dirty="0"/>
+                        <a:t>2 </a:t>
+                      </a:r>
+                      <a:r>
+                        <a:rPr lang="pt-PT" b="0" dirty="0" err="1"/>
+                        <a:t>workers</a:t>
+                      </a:r>
+                      <a:endParaRPr lang="pt-PT" b="0" dirty="0">
+                        <a:latin typeface="Calibri" panose="020F0502020204030204" pitchFamily="34" charset="0"/>
+                        <a:ea typeface="Calibri" panose="020F0502020204030204" pitchFamily="34" charset="0"/>
+                        <a:cs typeface="Calibri" panose="020F0502020204030204" pitchFamily="34" charset="0"/>
+                      </a:endParaRPr>
+                    </a:p>
+                  </a:txBody>
+                  <a:tcPr marL="81828" marR="81828"/>
+                </a:tc>
+                <a:tc hMerge="1">
+                  <a:txBody>
+                    <a:bodyPr/>
+                    <a:lstStyle/>
+                    <a:p>
+                      <a:endParaRPr lang="pt-PT"/>
+                    </a:p>
+                  </a:txBody>
+                  <a:tcPr/>
+                </a:tc>
+                <a:tc gridSpan="2">
+                  <a:txBody>
+                    <a:bodyPr/>
+                    <a:lstStyle/>
+                    <a:p>
+                      <a:pPr algn="ctr"/>
+                      <a:r>
+                        <a:rPr lang="pt-PT" b="0" dirty="0"/>
+                        <a:t>4 </a:t>
+                      </a:r>
+                      <a:r>
+                        <a:rPr lang="pt-PT" b="0" dirty="0" err="1"/>
+                        <a:t>workers</a:t>
+                      </a:r>
+                      <a:endParaRPr lang="pt-PT" b="0" dirty="0">
+                        <a:latin typeface="Calibri" panose="020F0502020204030204" pitchFamily="34" charset="0"/>
+                        <a:ea typeface="Calibri" panose="020F0502020204030204" pitchFamily="34" charset="0"/>
+                        <a:cs typeface="Calibri" panose="020F0502020204030204" pitchFamily="34" charset="0"/>
+                      </a:endParaRPr>
+                    </a:p>
+                  </a:txBody>
+                  <a:tcPr marL="81828" marR="81828"/>
+                </a:tc>
+                <a:tc hMerge="1">
+                  <a:txBody>
+                    <a:bodyPr/>
+                    <a:lstStyle/>
+                    <a:p>
+                      <a:endParaRPr lang="pt-PT"/>
+                    </a:p>
+                  </a:txBody>
+                  <a:tcPr/>
+                </a:tc>
+                <a:tc gridSpan="2">
+                  <a:txBody>
+                    <a:bodyPr/>
+                    <a:lstStyle/>
+                    <a:p>
+                      <a:pPr algn="ctr"/>
+                      <a:r>
+                        <a:rPr lang="pt-PT" b="0" dirty="0"/>
+                        <a:t>8 </a:t>
+                      </a:r>
+                      <a:r>
+                        <a:rPr lang="pt-PT" b="0" dirty="0" err="1"/>
+                        <a:t>workers</a:t>
+                      </a:r>
+                      <a:endParaRPr lang="pt-PT" b="0" dirty="0">
+                        <a:latin typeface="Calibri" panose="020F0502020204030204" pitchFamily="34" charset="0"/>
+                        <a:ea typeface="Calibri" panose="020F0502020204030204" pitchFamily="34" charset="0"/>
+                        <a:cs typeface="Calibri" panose="020F0502020204030204" pitchFamily="34" charset="0"/>
+                      </a:endParaRPr>
+                    </a:p>
+                  </a:txBody>
+                  <a:tcPr marL="81828" marR="81828"/>
+                </a:tc>
+                <a:tc hMerge="1">
+                  <a:txBody>
+                    <a:bodyPr/>
+                    <a:lstStyle/>
+                    <a:p>
+                      <a:endParaRPr lang="pt-PT"/>
+                    </a:p>
+                  </a:txBody>
+                  <a:tcPr/>
+                </a:tc>
+                <a:extLst>
+                  <a:ext uri="{0D108BD9-81ED-4DB2-BD59-A6C34878D82A}">
+                    <a16:rowId xmlns:a16="http://schemas.microsoft.com/office/drawing/2014/main" val="3843915449"/>
+                  </a:ext>
+                </a:extLst>
+              </a:tr>
+              <a:tr h="370840">
+                <a:tc>
+                  <a:txBody>
+                    <a:bodyPr/>
+                    <a:lstStyle/>
+                    <a:p>
+                      <a:pPr algn="ctr"/>
+                      <a:r>
+                        <a:rPr lang="pt-PT" sz="1400" b="0" dirty="0" err="1">
+                          <a:latin typeface="Calibri" panose="020F0502020204030204" pitchFamily="34" charset="0"/>
+                          <a:ea typeface="Calibri" panose="020F0502020204030204" pitchFamily="34" charset="0"/>
+                          <a:cs typeface="Calibri" panose="020F0502020204030204" pitchFamily="34" charset="0"/>
+                        </a:rPr>
+                        <a:t>Median</a:t>
+                      </a:r>
+                      <a:r>
+                        <a:rPr lang="pt-PT" sz="1400" b="0" dirty="0">
+                          <a:latin typeface="Calibri" panose="020F0502020204030204" pitchFamily="34" charset="0"/>
+                          <a:ea typeface="Calibri" panose="020F0502020204030204" pitchFamily="34" charset="0"/>
+                          <a:cs typeface="Calibri" panose="020F0502020204030204" pitchFamily="34" charset="0"/>
+                        </a:rPr>
+                        <a:t> (s)</a:t>
+                      </a:r>
+                    </a:p>
+                  </a:txBody>
+                  <a:tcPr marL="81828" marR="81828" anchor="ctr">
+                    <a:solidFill>
+                      <a:schemeClr val="bg2">
+                        <a:lumMod val="75000"/>
+                      </a:schemeClr>
+                    </a:solidFill>
+                  </a:tcPr>
+                </a:tc>
+                <a:tc>
+                  <a:txBody>
+                    <a:bodyPr/>
+                    <a:lstStyle/>
+                    <a:p>
+                      <a:pPr algn="ctr"/>
+                      <a:r>
+                        <a:rPr lang="pt-PT" sz="1400" b="0" dirty="0">
+                          <a:latin typeface="Calibri" panose="020F0502020204030204" pitchFamily="34" charset="0"/>
+                          <a:ea typeface="Calibri" panose="020F0502020204030204" pitchFamily="34" charset="0"/>
+                          <a:cs typeface="Calibri" panose="020F0502020204030204" pitchFamily="34" charset="0"/>
+                        </a:rPr>
+                        <a:t>Standard </a:t>
+                      </a:r>
+                      <a:r>
+                        <a:rPr lang="pt-PT" sz="1400" b="0" dirty="0" err="1">
+                          <a:latin typeface="Calibri" panose="020F0502020204030204" pitchFamily="34" charset="0"/>
+                          <a:ea typeface="Calibri" panose="020F0502020204030204" pitchFamily="34" charset="0"/>
+                          <a:cs typeface="Calibri" panose="020F0502020204030204" pitchFamily="34" charset="0"/>
+                        </a:rPr>
+                        <a:t>deviation</a:t>
+                      </a:r>
+                      <a:r>
+                        <a:rPr lang="pt-PT" sz="1400" b="0" dirty="0">
+                          <a:latin typeface="Calibri" panose="020F0502020204030204" pitchFamily="34" charset="0"/>
+                          <a:ea typeface="Calibri" panose="020F0502020204030204" pitchFamily="34" charset="0"/>
+                          <a:cs typeface="Calibri" panose="020F0502020204030204" pitchFamily="34" charset="0"/>
+                        </a:rPr>
+                        <a:t> (s)</a:t>
+                      </a:r>
+                    </a:p>
+                  </a:txBody>
+                  <a:tcPr marL="81828" marR="81828" anchor="ctr">
+                    <a:solidFill>
+                      <a:schemeClr val="bg2">
+                        <a:lumMod val="75000"/>
+                      </a:schemeClr>
+                    </a:solidFill>
+                  </a:tcPr>
+                </a:tc>
+                <a:tc>
+                  <a:txBody>
+                    <a:bodyPr/>
+                    <a:lstStyle/>
+                    <a:p>
+                      <a:pPr algn="ctr"/>
+                      <a:r>
+                        <a:rPr lang="pt-PT" sz="1400" b="0" dirty="0" err="1">
+                          <a:latin typeface="Calibri" panose="020F0502020204030204" pitchFamily="34" charset="0"/>
+                          <a:ea typeface="Calibri" panose="020F0502020204030204" pitchFamily="34" charset="0"/>
+                          <a:cs typeface="Calibri" panose="020F0502020204030204" pitchFamily="34" charset="0"/>
+                        </a:rPr>
+                        <a:t>Median</a:t>
+                      </a:r>
+                      <a:r>
+                        <a:rPr lang="pt-PT" sz="1400" b="0" dirty="0">
+                          <a:latin typeface="Calibri" panose="020F0502020204030204" pitchFamily="34" charset="0"/>
+                          <a:ea typeface="Calibri" panose="020F0502020204030204" pitchFamily="34" charset="0"/>
+                          <a:cs typeface="Calibri" panose="020F0502020204030204" pitchFamily="34" charset="0"/>
+                        </a:rPr>
+                        <a:t> (s)</a:t>
+                      </a:r>
+                    </a:p>
+                  </a:txBody>
+                  <a:tcPr marL="81828" marR="81828" anchor="ctr">
+                    <a:solidFill>
+                      <a:schemeClr val="bg2">
+                        <a:lumMod val="75000"/>
+                      </a:schemeClr>
+                    </a:solidFill>
+                  </a:tcPr>
+                </a:tc>
+                <a:tc>
+                  <a:txBody>
+                    <a:bodyPr/>
+                    <a:lstStyle/>
+                    <a:p>
+                      <a:pPr algn="ctr"/>
+                      <a:r>
+                        <a:rPr lang="pt-PT" sz="1400" b="0" dirty="0">
+                          <a:latin typeface="Calibri" panose="020F0502020204030204" pitchFamily="34" charset="0"/>
+                          <a:ea typeface="Calibri" panose="020F0502020204030204" pitchFamily="34" charset="0"/>
+                          <a:cs typeface="Calibri" panose="020F0502020204030204" pitchFamily="34" charset="0"/>
+                        </a:rPr>
+                        <a:t>Standard </a:t>
+                      </a:r>
+                      <a:r>
+                        <a:rPr lang="pt-PT" sz="1400" b="0" dirty="0" err="1">
+                          <a:latin typeface="Calibri" panose="020F0502020204030204" pitchFamily="34" charset="0"/>
+                          <a:ea typeface="Calibri" panose="020F0502020204030204" pitchFamily="34" charset="0"/>
+                          <a:cs typeface="Calibri" panose="020F0502020204030204" pitchFamily="34" charset="0"/>
+                        </a:rPr>
+                        <a:t>deviation</a:t>
+                      </a:r>
+                      <a:r>
+                        <a:rPr lang="pt-PT" sz="1400" b="0" dirty="0">
+                          <a:latin typeface="Calibri" panose="020F0502020204030204" pitchFamily="34" charset="0"/>
+                          <a:ea typeface="Calibri" panose="020F0502020204030204" pitchFamily="34" charset="0"/>
+                          <a:cs typeface="Calibri" panose="020F0502020204030204" pitchFamily="34" charset="0"/>
+                        </a:rPr>
+                        <a:t> (s)</a:t>
+                      </a:r>
+                    </a:p>
+                  </a:txBody>
+                  <a:tcPr marL="81828" marR="81828" anchor="ctr">
+                    <a:solidFill>
+                      <a:schemeClr val="bg2">
+                        <a:lumMod val="75000"/>
+                      </a:schemeClr>
+                    </a:solidFill>
+                  </a:tcPr>
+                </a:tc>
+                <a:tc>
+                  <a:txBody>
+                    <a:bodyPr/>
+                    <a:lstStyle/>
+                    <a:p>
+                      <a:pPr algn="ctr"/>
+                      <a:r>
+                        <a:rPr lang="pt-PT" sz="1400" b="0" dirty="0" err="1">
+                          <a:latin typeface="Calibri" panose="020F0502020204030204" pitchFamily="34" charset="0"/>
+                          <a:ea typeface="Calibri" panose="020F0502020204030204" pitchFamily="34" charset="0"/>
+                          <a:cs typeface="Calibri" panose="020F0502020204030204" pitchFamily="34" charset="0"/>
+                        </a:rPr>
+                        <a:t>Median</a:t>
+                      </a:r>
+                      <a:r>
+                        <a:rPr lang="pt-PT" sz="1400" b="0" dirty="0">
+                          <a:latin typeface="Calibri" panose="020F0502020204030204" pitchFamily="34" charset="0"/>
+                          <a:ea typeface="Calibri" panose="020F0502020204030204" pitchFamily="34" charset="0"/>
+                          <a:cs typeface="Calibri" panose="020F0502020204030204" pitchFamily="34" charset="0"/>
+                        </a:rPr>
+                        <a:t> (s)</a:t>
+                      </a:r>
+                    </a:p>
+                  </a:txBody>
+                  <a:tcPr marL="81828" marR="81828" anchor="ctr">
+                    <a:solidFill>
+                      <a:schemeClr val="bg2">
+                        <a:lumMod val="75000"/>
+                      </a:schemeClr>
+                    </a:solidFill>
+                  </a:tcPr>
+                </a:tc>
+                <a:tc>
+                  <a:txBody>
+                    <a:bodyPr/>
+                    <a:lstStyle/>
+                    <a:p>
+                      <a:pPr algn="ctr"/>
+                      <a:r>
+                        <a:rPr lang="pt-PT" sz="1400" b="0" dirty="0">
+                          <a:latin typeface="Calibri" panose="020F0502020204030204" pitchFamily="34" charset="0"/>
+                          <a:ea typeface="Calibri" panose="020F0502020204030204" pitchFamily="34" charset="0"/>
+                          <a:cs typeface="Calibri" panose="020F0502020204030204" pitchFamily="34" charset="0"/>
+                        </a:rPr>
+                        <a:t>Standard </a:t>
+                      </a:r>
+                      <a:r>
+                        <a:rPr lang="pt-PT" sz="1400" b="0" dirty="0" err="1">
+                          <a:latin typeface="Calibri" panose="020F0502020204030204" pitchFamily="34" charset="0"/>
+                          <a:ea typeface="Calibri" panose="020F0502020204030204" pitchFamily="34" charset="0"/>
+                          <a:cs typeface="Calibri" panose="020F0502020204030204" pitchFamily="34" charset="0"/>
+                        </a:rPr>
+                        <a:t>deviation</a:t>
+                      </a:r>
+                      <a:r>
+                        <a:rPr lang="pt-PT" sz="1400" b="0" dirty="0">
+                          <a:latin typeface="Calibri" panose="020F0502020204030204" pitchFamily="34" charset="0"/>
+                          <a:ea typeface="Calibri" panose="020F0502020204030204" pitchFamily="34" charset="0"/>
+                          <a:cs typeface="Calibri" panose="020F0502020204030204" pitchFamily="34" charset="0"/>
+                        </a:rPr>
+                        <a:t> (s)</a:t>
+                      </a:r>
+                    </a:p>
+                  </a:txBody>
+                  <a:tcPr marL="81828" marR="81828" anchor="ctr">
+                    <a:solidFill>
+                      <a:schemeClr val="bg2">
+                        <a:lumMod val="75000"/>
+                      </a:schemeClr>
+                    </a:solidFill>
+                  </a:tcPr>
+                </a:tc>
+                <a:tc>
+                  <a:txBody>
+                    <a:bodyPr/>
+                    <a:lstStyle/>
+                    <a:p>
+                      <a:pPr algn="ctr"/>
+                      <a:r>
+                        <a:rPr lang="pt-PT" sz="1400" b="0" dirty="0" err="1">
+                          <a:latin typeface="Calibri" panose="020F0502020204030204" pitchFamily="34" charset="0"/>
+                          <a:ea typeface="Calibri" panose="020F0502020204030204" pitchFamily="34" charset="0"/>
+                          <a:cs typeface="Calibri" panose="020F0502020204030204" pitchFamily="34" charset="0"/>
+                        </a:rPr>
+                        <a:t>Median</a:t>
+                      </a:r>
+                      <a:r>
+                        <a:rPr lang="pt-PT" sz="1400" b="0" dirty="0">
+                          <a:latin typeface="Calibri" panose="020F0502020204030204" pitchFamily="34" charset="0"/>
+                          <a:ea typeface="Calibri" panose="020F0502020204030204" pitchFamily="34" charset="0"/>
+                          <a:cs typeface="Calibri" panose="020F0502020204030204" pitchFamily="34" charset="0"/>
+                        </a:rPr>
+                        <a:t> (s)</a:t>
+                      </a:r>
+                    </a:p>
+                  </a:txBody>
+                  <a:tcPr marL="81828" marR="81828" anchor="ctr">
+                    <a:solidFill>
+                      <a:schemeClr val="bg2">
+                        <a:lumMod val="75000"/>
+                      </a:schemeClr>
+                    </a:solidFill>
+                  </a:tcPr>
+                </a:tc>
+                <a:tc>
+                  <a:txBody>
+                    <a:bodyPr/>
+                    <a:lstStyle/>
+                    <a:p>
+                      <a:pPr algn="ctr"/>
+                      <a:r>
+                        <a:rPr lang="pt-PT" sz="1400" b="0" dirty="0">
+                          <a:latin typeface="Calibri" panose="020F0502020204030204" pitchFamily="34" charset="0"/>
+                          <a:ea typeface="Calibri" panose="020F0502020204030204" pitchFamily="34" charset="0"/>
+                          <a:cs typeface="Calibri" panose="020F0502020204030204" pitchFamily="34" charset="0"/>
+                        </a:rPr>
+                        <a:t>Standard </a:t>
+                      </a:r>
+                      <a:r>
+                        <a:rPr lang="pt-PT" sz="1400" b="0" dirty="0" err="1">
+                          <a:latin typeface="Calibri" panose="020F0502020204030204" pitchFamily="34" charset="0"/>
+                          <a:ea typeface="Calibri" panose="020F0502020204030204" pitchFamily="34" charset="0"/>
+                          <a:cs typeface="Calibri" panose="020F0502020204030204" pitchFamily="34" charset="0"/>
+                        </a:rPr>
+                        <a:t>deviation</a:t>
+                      </a:r>
+                      <a:r>
+                        <a:rPr lang="pt-PT" sz="1400" b="0" dirty="0">
+                          <a:latin typeface="Calibri" panose="020F0502020204030204" pitchFamily="34" charset="0"/>
+                          <a:ea typeface="Calibri" panose="020F0502020204030204" pitchFamily="34" charset="0"/>
+                          <a:cs typeface="Calibri" panose="020F0502020204030204" pitchFamily="34" charset="0"/>
+                        </a:rPr>
+                        <a:t> (s)</a:t>
+                      </a:r>
+                    </a:p>
+                  </a:txBody>
+                  <a:tcPr marL="81828" marR="81828" anchor="ctr">
+                    <a:solidFill>
+                      <a:schemeClr val="bg2">
+                        <a:lumMod val="75000"/>
+                      </a:schemeClr>
+                    </a:solidFill>
+                  </a:tcPr>
+                </a:tc>
+                <a:extLst>
+                  <a:ext uri="{0D108BD9-81ED-4DB2-BD59-A6C34878D82A}">
+                    <a16:rowId xmlns:a16="http://schemas.microsoft.com/office/drawing/2014/main" val="60976799"/>
+                  </a:ext>
+                </a:extLst>
+              </a:tr>
+              <a:tr h="370840">
+                <a:tc>
+                  <a:txBody>
+                    <a:bodyPr/>
+                    <a:lstStyle/>
+                    <a:p>
+                      <a:pPr algn="ctr"/>
+                      <a:r>
+                        <a:rPr lang="pt-PT" b="0" dirty="0">
+                          <a:latin typeface="Calibri" panose="020F0502020204030204" pitchFamily="34" charset="0"/>
+                          <a:ea typeface="Calibri" panose="020F0502020204030204" pitchFamily="34" charset="0"/>
+                          <a:cs typeface="Calibri" panose="020F0502020204030204" pitchFamily="34" charset="0"/>
+                        </a:rPr>
+                        <a:t>0.026864</a:t>
+                      </a:r>
+                    </a:p>
+                  </a:txBody>
+                  <a:tcPr marL="81828" marR="81828"/>
+                </a:tc>
+                <a:tc>
+                  <a:txBody>
+                    <a:bodyPr/>
+                    <a:lstStyle/>
+                    <a:p>
+                      <a:pPr marL="0" marR="0" lvl="0" indent="0" algn="ctr" defTabSz="914400" rtl="0" eaLnBrk="1" fontAlgn="auto" latinLnBrk="0" hangingPunct="1">
+                        <a:lnSpc>
+                          <a:spcPct val="100000"/>
+                        </a:lnSpc>
+                        <a:spcBef>
+                          <a:spcPts val="0"/>
+                        </a:spcBef>
+                        <a:spcAft>
+                          <a:spcPts val="0"/>
+                        </a:spcAft>
+                        <a:buClrTx/>
+                        <a:buSzTx/>
+                        <a:buFontTx/>
+                        <a:buNone/>
+                        <a:tabLst/>
+                        <a:defRPr/>
+                      </a:pPr>
+                      <a:r>
+                        <a:rPr lang="pt-PT" b="0" dirty="0">
+                          <a:latin typeface="Calibri" panose="020F0502020204030204" pitchFamily="34" charset="0"/>
+                          <a:ea typeface="Calibri" panose="020F0502020204030204" pitchFamily="34" charset="0"/>
+                          <a:cs typeface="Calibri" panose="020F0502020204030204" pitchFamily="34" charset="0"/>
+                        </a:rPr>
+                        <a:t>0.012453</a:t>
+                      </a:r>
+                    </a:p>
+                  </a:txBody>
+                  <a:tcPr marL="81828" marR="81828"/>
+                </a:tc>
+                <a:tc>
+                  <a:txBody>
+                    <a:bodyPr/>
+                    <a:lstStyle/>
+                    <a:p>
+                      <a:pPr algn="ctr"/>
+                      <a:r>
+                        <a:rPr lang="pt-PT" b="0" dirty="0">
+                          <a:latin typeface="Calibri" panose="020F0502020204030204" pitchFamily="34" charset="0"/>
+                          <a:ea typeface="Calibri" panose="020F0502020204030204" pitchFamily="34" charset="0"/>
+                          <a:cs typeface="Calibri" panose="020F0502020204030204" pitchFamily="34" charset="0"/>
+                        </a:rPr>
+                        <a:t>0.020446</a:t>
+                      </a:r>
+                    </a:p>
+                  </a:txBody>
+                  <a:tcPr marL="81828" marR="81828"/>
+                </a:tc>
+                <a:tc>
+                  <a:txBody>
+                    <a:bodyPr/>
+                    <a:lstStyle/>
+                    <a:p>
+                      <a:pPr marL="0" marR="0" lvl="0" indent="0" algn="ctr" defTabSz="914400" rtl="0" eaLnBrk="1" fontAlgn="auto" latinLnBrk="0" hangingPunct="1">
+                        <a:lnSpc>
+                          <a:spcPct val="100000"/>
+                        </a:lnSpc>
+                        <a:spcBef>
+                          <a:spcPts val="0"/>
+                        </a:spcBef>
+                        <a:spcAft>
+                          <a:spcPts val="0"/>
+                        </a:spcAft>
+                        <a:buClrTx/>
+                        <a:buSzTx/>
+                        <a:buFontTx/>
+                        <a:buNone/>
+                        <a:tabLst/>
+                        <a:defRPr/>
+                      </a:pPr>
+                      <a:r>
+                        <a:rPr lang="pt-PT" b="0" dirty="0">
+                          <a:latin typeface="Calibri" panose="020F0502020204030204" pitchFamily="34" charset="0"/>
+                          <a:ea typeface="Calibri" panose="020F0502020204030204" pitchFamily="34" charset="0"/>
+                          <a:cs typeface="Calibri" panose="020F0502020204030204" pitchFamily="34" charset="0"/>
+                        </a:rPr>
+                        <a:t>0.005223</a:t>
+                      </a:r>
+                    </a:p>
+                  </a:txBody>
+                  <a:tcPr marL="81828" marR="81828"/>
+                </a:tc>
+                <a:tc>
+                  <a:txBody>
+                    <a:bodyPr/>
+                    <a:lstStyle/>
+                    <a:p>
+                      <a:pPr algn="ctr"/>
+                      <a:r>
+                        <a:rPr lang="pt-PT" b="0" dirty="0">
+                          <a:latin typeface="Calibri" panose="020F0502020204030204" pitchFamily="34" charset="0"/>
+                          <a:ea typeface="Calibri" panose="020F0502020204030204" pitchFamily="34" charset="0"/>
+                          <a:cs typeface="Calibri" panose="020F0502020204030204" pitchFamily="34" charset="0"/>
+                        </a:rPr>
+                        <a:t>0.024906</a:t>
+                      </a:r>
+                    </a:p>
+                  </a:txBody>
+                  <a:tcPr marL="81828" marR="81828"/>
+                </a:tc>
+                <a:tc>
+                  <a:txBody>
+                    <a:bodyPr/>
+                    <a:lstStyle/>
+                    <a:p>
+                      <a:pPr marL="0" marR="0" lvl="0" indent="0" algn="ctr" defTabSz="914400" rtl="0" eaLnBrk="1" fontAlgn="auto" latinLnBrk="0" hangingPunct="1">
+                        <a:lnSpc>
+                          <a:spcPct val="100000"/>
+                        </a:lnSpc>
+                        <a:spcBef>
+                          <a:spcPts val="0"/>
+                        </a:spcBef>
+                        <a:spcAft>
+                          <a:spcPts val="0"/>
+                        </a:spcAft>
+                        <a:buClrTx/>
+                        <a:buSzTx/>
+                        <a:buFontTx/>
+                        <a:buNone/>
+                        <a:tabLst/>
+                        <a:defRPr/>
+                      </a:pPr>
+                      <a:r>
+                        <a:rPr lang="pt-PT" b="0" dirty="0">
+                          <a:latin typeface="Calibri" panose="020F0502020204030204" pitchFamily="34" charset="0"/>
+                          <a:ea typeface="Calibri" panose="020F0502020204030204" pitchFamily="34" charset="0"/>
+                          <a:cs typeface="Calibri" panose="020F0502020204030204" pitchFamily="34" charset="0"/>
+                        </a:rPr>
+                        <a:t>0.007404</a:t>
+                      </a:r>
+                    </a:p>
+                  </a:txBody>
+                  <a:tcPr marL="81828" marR="81828"/>
+                </a:tc>
+                <a:tc>
+                  <a:txBody>
+                    <a:bodyPr/>
+                    <a:lstStyle/>
+                    <a:p>
+                      <a:pPr algn="ctr"/>
+                      <a:r>
+                        <a:rPr lang="pt-PT" b="0" dirty="0">
+                          <a:latin typeface="Calibri" panose="020F0502020204030204" pitchFamily="34" charset="0"/>
+                          <a:ea typeface="Calibri" panose="020F0502020204030204" pitchFamily="34" charset="0"/>
+                          <a:cs typeface="Calibri" panose="020F0502020204030204" pitchFamily="34" charset="0"/>
+                        </a:rPr>
+                        <a:t>0.026550</a:t>
+                      </a:r>
+                    </a:p>
+                  </a:txBody>
+                  <a:tcPr marL="81828" marR="81828"/>
+                </a:tc>
+                <a:tc>
+                  <a:txBody>
+                    <a:bodyPr/>
+                    <a:lstStyle/>
+                    <a:p>
+                      <a:pPr marL="0" marR="0" lvl="0" indent="0" algn="ctr" defTabSz="914400" rtl="0" eaLnBrk="1" fontAlgn="auto" latinLnBrk="0" hangingPunct="1">
+                        <a:lnSpc>
+                          <a:spcPct val="100000"/>
+                        </a:lnSpc>
+                        <a:spcBef>
+                          <a:spcPts val="0"/>
+                        </a:spcBef>
+                        <a:spcAft>
+                          <a:spcPts val="0"/>
+                        </a:spcAft>
+                        <a:buClrTx/>
+                        <a:buSzTx/>
+                        <a:buFontTx/>
+                        <a:buNone/>
+                        <a:tabLst/>
+                        <a:defRPr/>
+                      </a:pPr>
+                      <a:r>
+                        <a:rPr lang="pt-PT" b="0" dirty="0">
+                          <a:latin typeface="Calibri" panose="020F0502020204030204" pitchFamily="34" charset="0"/>
+                          <a:ea typeface="Calibri" panose="020F0502020204030204" pitchFamily="34" charset="0"/>
+                          <a:cs typeface="Calibri" panose="020F0502020204030204" pitchFamily="34" charset="0"/>
+                        </a:rPr>
+                        <a:t>0.015925</a:t>
+                      </a:r>
+                    </a:p>
+                  </a:txBody>
+                  <a:tcPr marL="81828" marR="81828"/>
+                </a:tc>
+                <a:extLst>
+                  <a:ext uri="{0D108BD9-81ED-4DB2-BD59-A6C34878D82A}">
+                    <a16:rowId xmlns:a16="http://schemas.microsoft.com/office/drawing/2014/main" val="939384820"/>
+                  </a:ext>
+                </a:extLst>
+              </a:tr>
+            </a:tbl>
+          </a:graphicData>
+        </a:graphic>
+      </p:graphicFrame>
+      <p:sp>
+        <p:nvSpPr>
+          <p:cNvPr id="3" name="CaixaDeTexto 2">
+            <a:extLst>
+              <a:ext uri="{FF2B5EF4-FFF2-40B4-BE49-F238E27FC236}">
+                <a16:creationId xmlns:a16="http://schemas.microsoft.com/office/drawing/2014/main" id="{0636F3CD-6811-DE2F-0689-164BB80C3227}"/>
+              </a:ext>
+            </a:extLst>
+          </p:cNvPr>
+          <p:cNvSpPr txBox="1"/>
+          <p:nvPr/>
+        </p:nvSpPr>
+        <p:spPr>
+          <a:xfrm>
+            <a:off x="153495" y="1857539"/>
+            <a:ext cx="1297482" cy="646331"/>
+          </a:xfrm>
+          <a:prstGeom prst="rect">
+            <a:avLst/>
+          </a:prstGeom>
+          <a:noFill/>
+        </p:spPr>
+        <p:txBody>
+          <a:bodyPr wrap="square" rtlCol="0">
+            <a:spAutoFit/>
+          </a:bodyPr>
+          <a:lstStyle/>
+          <a:p>
+            <a:r>
+              <a:rPr lang="pt-PT" sz="1200" dirty="0"/>
+              <a:t>PC1:</a:t>
+            </a:r>
+          </a:p>
+          <a:p>
+            <a:r>
+              <a:rPr lang="pt-PT" sz="1200" dirty="0"/>
+              <a:t>→ </a:t>
+            </a:r>
+            <a:r>
+              <a:rPr lang="pt-PT" sz="1200" dirty="0" err="1"/>
+              <a:t>Lubuntu</a:t>
+            </a:r>
+            <a:r>
+              <a:rPr lang="pt-PT" sz="1200" dirty="0"/>
+              <a:t> VM  </a:t>
+            </a:r>
+          </a:p>
+          <a:p>
+            <a:r>
+              <a:rPr lang="pt-PT" sz="1200" dirty="0"/>
+              <a:t>→ 8 cores</a:t>
+            </a:r>
+          </a:p>
+        </p:txBody>
+      </p:sp>
+      <p:sp>
+        <p:nvSpPr>
+          <p:cNvPr id="5" name="CaixaDeTexto 4">
+            <a:extLst>
+              <a:ext uri="{FF2B5EF4-FFF2-40B4-BE49-F238E27FC236}">
+                <a16:creationId xmlns:a16="http://schemas.microsoft.com/office/drawing/2014/main" id="{05F3E89E-BD3E-9062-9DE8-F0224FD9AE24}"/>
+              </a:ext>
+            </a:extLst>
+          </p:cNvPr>
+          <p:cNvSpPr txBox="1"/>
+          <p:nvPr/>
+        </p:nvSpPr>
+        <p:spPr>
+          <a:xfrm>
+            <a:off x="153495" y="4194339"/>
+            <a:ext cx="1297482" cy="646331"/>
+          </a:xfrm>
+          <a:prstGeom prst="rect">
+            <a:avLst/>
+          </a:prstGeom>
+          <a:noFill/>
+        </p:spPr>
+        <p:txBody>
+          <a:bodyPr wrap="square" rtlCol="0">
+            <a:spAutoFit/>
+          </a:bodyPr>
+          <a:lstStyle/>
+          <a:p>
+            <a:r>
+              <a:rPr lang="pt-PT" sz="1200" dirty="0"/>
+              <a:t>PC2:</a:t>
+            </a:r>
+          </a:p>
+          <a:p>
+            <a:r>
+              <a:rPr lang="pt-PT" sz="1200" dirty="0"/>
+              <a:t>→ Ubuntu VM  → 4 cores</a:t>
+            </a:r>
+          </a:p>
+        </p:txBody>
+      </p:sp>
     </p:spTree>
     <p:extLst>
       <p:ext uri="{BB962C8B-B14F-4D97-AF65-F5344CB8AC3E}">
@@ -5585,10 +6379,40 @@
       </p:grpSpPr>
       <p:sp>
         <p:nvSpPr>
-          <p:cNvPr id="2" name="Título 1">
+          <p:cNvPr id="3" name="Marcador de Posição de Conteúdo 2">
             <a:extLst>
               <a:ext uri="{FF2B5EF4-FFF2-40B4-BE49-F238E27FC236}">
-                <a16:creationId xmlns:a16="http://schemas.microsoft.com/office/drawing/2014/main" id="{C7D52C90-E3ED-4F3F-A8E5-D53ABE83C150}"/>
+                <a16:creationId xmlns:a16="http://schemas.microsoft.com/office/drawing/2014/main" id="{51785857-EE14-DADB-1C8E-45E0CDC1B7C7}"/>
+              </a:ext>
+            </a:extLst>
+          </p:cNvPr>
+          <p:cNvSpPr>
+            <a:spLocks noGrp="1"/>
+          </p:cNvSpPr>
+          <p:nvPr>
+            <p:ph idx="1"/>
+          </p:nvPr>
+        </p:nvSpPr>
+        <p:spPr>
+          <a:xfrm>
+            <a:off x="1261872" y="1828800"/>
+            <a:ext cx="8595360" cy="4351337"/>
+          </a:xfrm>
+        </p:spPr>
+        <p:txBody>
+          <a:bodyPr/>
+          <a:lstStyle/>
+          <a:p>
+            <a:endParaRPr lang="pt-PT" dirty="0"/>
+          </a:p>
+        </p:txBody>
+      </p:sp>
+      <p:sp>
+        <p:nvSpPr>
+          <p:cNvPr id="6" name="Título 1">
+            <a:extLst>
+              <a:ext uri="{FF2B5EF4-FFF2-40B4-BE49-F238E27FC236}">
+                <a16:creationId xmlns:a16="http://schemas.microsoft.com/office/drawing/2014/main" id="{88823953-442A-9117-0A2B-53DA082E6B19}"/>
               </a:ext>
             </a:extLst>
           </p:cNvPr>
@@ -5601,7 +6425,7 @@
         </p:nvSpPr>
         <p:spPr>
           <a:xfrm>
-            <a:off x="1451579" y="1039907"/>
+            <a:off x="995172" y="900652"/>
             <a:ext cx="9603275" cy="813848"/>
           </a:xfrm>
         </p:spPr>
@@ -5620,7 +6444,7 @@
               <a:t>Problem</a:t>
             </a:r>
             <a:r>
-              <a:rPr lang="pt-PT" sz="3600" b="1" dirty="0">
+              <a:rPr lang="pt-PT" sz="3600" b="1">
                 <a:latin typeface="Calibri" panose="020F0502020204030204" pitchFamily="34" charset="0"/>
                 <a:ea typeface="Calibri" panose="020F0502020204030204" pitchFamily="34" charset="0"/>
                 <a:cs typeface="Calibri" panose="020F0502020204030204" pitchFamily="34" charset="0"/>
@@ -5680,89 +6504,6 @@
           <a:chExt cx="0" cy="0"/>
         </a:xfrm>
       </p:grpSpPr>
-      <p:sp>
-        <p:nvSpPr>
-          <p:cNvPr id="2" name="Título 1">
-            <a:extLst>
-              <a:ext uri="{FF2B5EF4-FFF2-40B4-BE49-F238E27FC236}">
-                <a16:creationId xmlns:a16="http://schemas.microsoft.com/office/drawing/2014/main" id="{C7D52C90-E3ED-4F3F-A8E5-D53ABE83C150}"/>
-              </a:ext>
-            </a:extLst>
-          </p:cNvPr>
-          <p:cNvSpPr>
-            <a:spLocks noGrp="1"/>
-          </p:cNvSpPr>
-          <p:nvPr>
-            <p:ph type="title"/>
-          </p:nvPr>
-        </p:nvSpPr>
-        <p:spPr>
-          <a:xfrm>
-            <a:off x="1451579" y="1039907"/>
-            <a:ext cx="9603275" cy="813848"/>
-          </a:xfrm>
-        </p:spPr>
-        <p:txBody>
-          <a:bodyPr>
-            <a:normAutofit fontScale="90000"/>
-          </a:bodyPr>
-          <a:lstStyle/>
-          <a:p>
-            <a:r>
-              <a:rPr lang="pt-PT" sz="3600" b="1" dirty="0" err="1">
-                <a:latin typeface="Calibri" panose="020F0502020204030204" pitchFamily="34" charset="0"/>
-                <a:ea typeface="Calibri" panose="020F0502020204030204" pitchFamily="34" charset="0"/>
-                <a:cs typeface="Calibri" panose="020F0502020204030204" pitchFamily="34" charset="0"/>
-              </a:rPr>
-              <a:t>Problem</a:t>
-            </a:r>
-            <a:r>
-              <a:rPr lang="pt-PT" sz="3600" b="1" dirty="0">
-                <a:latin typeface="Calibri" panose="020F0502020204030204" pitchFamily="34" charset="0"/>
-                <a:ea typeface="Calibri" panose="020F0502020204030204" pitchFamily="34" charset="0"/>
-                <a:cs typeface="Calibri" panose="020F0502020204030204" pitchFamily="34" charset="0"/>
-              </a:rPr>
-              <a:t> 2</a:t>
-            </a:r>
-            <a:br>
-              <a:rPr lang="pt-PT" dirty="0">
-                <a:latin typeface="Calibri" panose="020F0502020204030204" pitchFamily="34" charset="0"/>
-                <a:ea typeface="Calibri" panose="020F0502020204030204" pitchFamily="34" charset="0"/>
-                <a:cs typeface="Calibri" panose="020F0502020204030204" pitchFamily="34" charset="0"/>
-              </a:rPr>
-            </a:br>
-            <a:r>
-              <a:rPr lang="pt-PT" sz="2200" dirty="0" err="1">
-                <a:latin typeface="Calibri" panose="020F0502020204030204" pitchFamily="34" charset="0"/>
-                <a:ea typeface="Calibri" panose="020F0502020204030204" pitchFamily="34" charset="0"/>
-                <a:cs typeface="Calibri" panose="020F0502020204030204" pitchFamily="34" charset="0"/>
-              </a:rPr>
-              <a:t>Entities</a:t>
-            </a:r>
-            <a:r>
-              <a:rPr lang="pt-PT" sz="2200" dirty="0">
-                <a:latin typeface="Calibri" panose="020F0502020204030204" pitchFamily="34" charset="0"/>
-                <a:ea typeface="Calibri" panose="020F0502020204030204" pitchFamily="34" charset="0"/>
-                <a:cs typeface="Calibri" panose="020F0502020204030204" pitchFamily="34" charset="0"/>
-              </a:rPr>
-              <a:t> </a:t>
-            </a:r>
-            <a:r>
-              <a:rPr lang="pt-PT" sz="2200" dirty="0" err="1">
-                <a:latin typeface="Calibri" panose="020F0502020204030204" pitchFamily="34" charset="0"/>
-                <a:ea typeface="Calibri" panose="020F0502020204030204" pitchFamily="34" charset="0"/>
-                <a:cs typeface="Calibri" panose="020F0502020204030204" pitchFamily="34" charset="0"/>
-              </a:rPr>
-              <a:t>diagram</a:t>
-            </a:r>
-            <a:endParaRPr lang="pt-PT" dirty="0">
-              <a:latin typeface="Calibri" panose="020F0502020204030204" pitchFamily="34" charset="0"/>
-              <a:ea typeface="Calibri" panose="020F0502020204030204" pitchFamily="34" charset="0"/>
-              <a:cs typeface="Calibri" panose="020F0502020204030204" pitchFamily="34" charset="0"/>
-            </a:endParaRPr>
-          </a:p>
-        </p:txBody>
-      </p:sp>
       <p:sp>
         <p:nvSpPr>
           <p:cNvPr id="4" name="Retângulo 3">
@@ -5805,15 +6546,7 @@
           <a:p>
             <a:r>
               <a:rPr lang="pt-PT" dirty="0" err="1"/>
-              <a:t>Shared</a:t>
-            </a:r>
-            <a:r>
-              <a:rPr lang="pt-PT" dirty="0"/>
-              <a:t> </a:t>
-            </a:r>
-            <a:r>
-              <a:rPr lang="pt-PT" dirty="0" err="1"/>
-              <a:t>Region</a:t>
+              <a:t>SharedRegion</a:t>
             </a:r>
             <a:endParaRPr lang="pt-PT" sz="1400" dirty="0"/>
           </a:p>
@@ -6970,6 +7703,108 @@
           </a:p>
         </p:txBody>
       </p:sp>
+      <p:sp>
+        <p:nvSpPr>
+          <p:cNvPr id="6" name="Título 1">
+            <a:extLst>
+              <a:ext uri="{FF2B5EF4-FFF2-40B4-BE49-F238E27FC236}">
+                <a16:creationId xmlns:a16="http://schemas.microsoft.com/office/drawing/2014/main" id="{AA536782-B645-6CF0-03BE-FBF10EA64741}"/>
+              </a:ext>
+            </a:extLst>
+          </p:cNvPr>
+          <p:cNvSpPr txBox="1">
+            <a:spLocks/>
+          </p:cNvSpPr>
+          <p:nvPr/>
+        </p:nvSpPr>
+        <p:spPr>
+          <a:xfrm>
+            <a:off x="960944" y="700831"/>
+            <a:ext cx="9603275" cy="813848"/>
+          </a:xfrm>
+          <a:prstGeom prst="rect">
+            <a:avLst/>
+          </a:prstGeom>
+        </p:spPr>
+        <p:txBody>
+          <a:bodyPr vert="horz" lIns="91440" tIns="45720" rIns="91440" bIns="45720" rtlCol="0" anchor="b">
+            <a:normAutofit fontScale="97500" lnSpcReduction="10000"/>
+          </a:bodyPr>
+          <a:lstStyle>
+            <a:lvl1pPr algn="l" defTabSz="914400" rtl="0" eaLnBrk="1" latinLnBrk="0" hangingPunct="1">
+              <a:lnSpc>
+                <a:spcPct val="90000"/>
+              </a:lnSpc>
+              <a:spcBef>
+                <a:spcPct val="0"/>
+              </a:spcBef>
+              <a:buNone/>
+              <a:defRPr sz="4400" kern="1200" spc="-50" baseline="0">
+                <a:solidFill>
+                  <a:schemeClr val="tx1"/>
+                </a:solidFill>
+                <a:latin typeface="+mj-lt"/>
+                <a:ea typeface="+mj-ea"/>
+                <a:cs typeface="+mj-cs"/>
+              </a:defRPr>
+            </a:lvl1pPr>
+          </a:lstStyle>
+          <a:p>
+            <a:r>
+              <a:rPr lang="pt-PT" sz="3600" b="1" dirty="0" err="1">
+                <a:latin typeface="Calibri" panose="020F0502020204030204" pitchFamily="34" charset="0"/>
+                <a:ea typeface="Calibri" panose="020F0502020204030204" pitchFamily="34" charset="0"/>
+                <a:cs typeface="Calibri" panose="020F0502020204030204" pitchFamily="34" charset="0"/>
+              </a:rPr>
+              <a:t>Problem</a:t>
+            </a:r>
+            <a:r>
+              <a:rPr lang="pt-PT" sz="3600" b="1" dirty="0">
+                <a:latin typeface="Calibri" panose="020F0502020204030204" pitchFamily="34" charset="0"/>
+                <a:ea typeface="Calibri" panose="020F0502020204030204" pitchFamily="34" charset="0"/>
+                <a:cs typeface="Calibri" panose="020F0502020204030204" pitchFamily="34" charset="0"/>
+              </a:rPr>
+              <a:t> 2</a:t>
+            </a:r>
+            <a:br>
+              <a:rPr lang="pt-PT" dirty="0">
+                <a:latin typeface="Calibri" panose="020F0502020204030204" pitchFamily="34" charset="0"/>
+                <a:ea typeface="Calibri" panose="020F0502020204030204" pitchFamily="34" charset="0"/>
+                <a:cs typeface="Calibri" panose="020F0502020204030204" pitchFamily="34" charset="0"/>
+              </a:rPr>
+            </a:br>
+            <a:r>
+              <a:rPr lang="pt-PT" sz="2200" dirty="0" err="1">
+                <a:latin typeface="Calibri" panose="020F0502020204030204" pitchFamily="34" charset="0"/>
+                <a:ea typeface="Calibri" panose="020F0502020204030204" pitchFamily="34" charset="0"/>
+                <a:cs typeface="Calibri" panose="020F0502020204030204" pitchFamily="34" charset="0"/>
+              </a:rPr>
+              <a:t>Entities</a:t>
+            </a:r>
+            <a:r>
+              <a:rPr lang="pt-PT" sz="2200" dirty="0">
+                <a:latin typeface="Calibri" panose="020F0502020204030204" pitchFamily="34" charset="0"/>
+                <a:ea typeface="Calibri" panose="020F0502020204030204" pitchFamily="34" charset="0"/>
+                <a:cs typeface="Calibri" panose="020F0502020204030204" pitchFamily="34" charset="0"/>
+              </a:rPr>
+              <a:t> </a:t>
+            </a:r>
+            <a:r>
+              <a:rPr lang="pt-PT" sz="2200" dirty="0" err="1">
+                <a:latin typeface="Calibri" panose="020F0502020204030204" pitchFamily="34" charset="0"/>
+                <a:ea typeface="Calibri" panose="020F0502020204030204" pitchFamily="34" charset="0"/>
+                <a:cs typeface="Calibri" panose="020F0502020204030204" pitchFamily="34" charset="0"/>
+              </a:rPr>
+              <a:t>diagram</a:t>
+            </a:r>
+            <a:endParaRPr lang="pt-PT" dirty="0">
+              <a:latin typeface="Calibri" panose="020F0502020204030204" pitchFamily="34" charset="0"/>
+              <a:ea typeface="Calibri" panose="020F0502020204030204" pitchFamily="34" charset="0"/>
+              <a:cs typeface="Calibri" panose="020F0502020204030204" pitchFamily="34" charset="0"/>
+            </a:endParaRPr>
+          </a:p>
+        </p:txBody>
+      </p:sp>
     </p:spTree>
     <p:extLst>
       <p:ext uri="{BB962C8B-B14F-4D97-AF65-F5344CB8AC3E}">
@@ -7083,14 +7918,14 @@
             <p:ph idx="1"/>
             <p:extLst>
               <p:ext uri="{D42A27DB-BD31-4B8C-83A1-F6EECF244321}">
-                <p14:modId xmlns:p14="http://schemas.microsoft.com/office/powerpoint/2010/main" val="3118628679"/>
+                <p14:modId xmlns:p14="http://schemas.microsoft.com/office/powerpoint/2010/main" val="307942996"/>
               </p:ext>
             </p:extLst>
           </p:nvPr>
         </p:nvGraphicFramePr>
         <p:xfrm>
           <a:off x="1450977" y="1289985"/>
-          <a:ext cx="9603277" cy="2407920"/>
+          <a:ext cx="9603277" cy="2286000"/>
         </p:xfrm>
         <a:graphic>
           <a:graphicData uri="http://schemas.openxmlformats.org/drawingml/2006/table">
@@ -7351,21 +8186,24 @@
                     <a:p>
                       <a:pPr algn="ctr"/>
                       <a:r>
-                        <a:rPr lang="pt-PT" sz="1600" dirty="0" err="1">
+                        <a:rPr lang="pt-PT" sz="1200" b="0" dirty="0" err="1">
                           <a:latin typeface="Calibri" panose="020F0502020204030204" pitchFamily="34" charset="0"/>
                           <a:ea typeface="Calibri" panose="020F0502020204030204" pitchFamily="34" charset="0"/>
                           <a:cs typeface="Calibri" panose="020F0502020204030204" pitchFamily="34" charset="0"/>
                         </a:rPr>
                         <a:t>Median</a:t>
                       </a:r>
-                      <a:endParaRPr lang="pt-PT" sz="1600" dirty="0">
-                        <a:latin typeface="Calibri" panose="020F0502020204030204" pitchFamily="34" charset="0"/>
-                        <a:ea typeface="Calibri" panose="020F0502020204030204" pitchFamily="34" charset="0"/>
-                        <a:cs typeface="Calibri" panose="020F0502020204030204" pitchFamily="34" charset="0"/>
-                      </a:endParaRPr>
-                    </a:p>
-                  </a:txBody>
-                  <a:tcPr anchor="ctr">
+                      <a:r>
+                        <a:rPr lang="pt-PT" sz="1200" b="0" dirty="0">
+                          <a:latin typeface="Calibri" panose="020F0502020204030204" pitchFamily="34" charset="0"/>
+                          <a:ea typeface="Calibri" panose="020F0502020204030204" pitchFamily="34" charset="0"/>
+                          <a:cs typeface="Calibri" panose="020F0502020204030204" pitchFamily="34" charset="0"/>
+                        </a:rPr>
+                        <a:t> (s)</a:t>
+                      </a:r>
+                    </a:p>
+                  </a:txBody>
+                  <a:tcPr marL="81828" marR="81828" anchor="ctr">
                     <a:solidFill>
                       <a:schemeClr val="bg2">
                         <a:lumMod val="75000"/>
@@ -7380,7 +8218,7 @@
                     <a:p>
                       <a:pPr algn="ctr"/>
                       <a:r>
-                        <a:rPr lang="pt-PT" sz="1600" dirty="0">
+                        <a:rPr lang="pt-PT" sz="1200" b="0" dirty="0">
                           <a:latin typeface="Calibri" panose="020F0502020204030204" pitchFamily="34" charset="0"/>
                           <a:ea typeface="Calibri" panose="020F0502020204030204" pitchFamily="34" charset="0"/>
                           <a:cs typeface="Calibri" panose="020F0502020204030204" pitchFamily="34" charset="0"/>
@@ -7388,21 +8226,24 @@
                         <a:t>Standard </a:t>
                       </a:r>
                       <a:r>
-                        <a:rPr lang="pt-PT" sz="1600" dirty="0" err="1">
+                        <a:rPr lang="pt-PT" sz="1200" b="0" dirty="0" err="1">
                           <a:latin typeface="Calibri" panose="020F0502020204030204" pitchFamily="34" charset="0"/>
                           <a:ea typeface="Calibri" panose="020F0502020204030204" pitchFamily="34" charset="0"/>
                           <a:cs typeface="Calibri" panose="020F0502020204030204" pitchFamily="34" charset="0"/>
                         </a:rPr>
                         <a:t>deviation</a:t>
                       </a:r>
-                      <a:endParaRPr lang="pt-PT" sz="1600" dirty="0">
-                        <a:latin typeface="Calibri" panose="020F0502020204030204" pitchFamily="34" charset="0"/>
-                        <a:ea typeface="Calibri" panose="020F0502020204030204" pitchFamily="34" charset="0"/>
-                        <a:cs typeface="Calibri" panose="020F0502020204030204" pitchFamily="34" charset="0"/>
-                      </a:endParaRPr>
-                    </a:p>
-                  </a:txBody>
-                  <a:tcPr anchor="ctr">
+                      <a:r>
+                        <a:rPr lang="pt-PT" sz="1200" b="0" dirty="0">
+                          <a:latin typeface="Calibri" panose="020F0502020204030204" pitchFamily="34" charset="0"/>
+                          <a:ea typeface="Calibri" panose="020F0502020204030204" pitchFamily="34" charset="0"/>
+                          <a:cs typeface="Calibri" panose="020F0502020204030204" pitchFamily="34" charset="0"/>
+                        </a:rPr>
+                        <a:t> (s)</a:t>
+                      </a:r>
+                    </a:p>
+                  </a:txBody>
+                  <a:tcPr marL="81828" marR="81828" anchor="ctr">
                     <a:solidFill>
                       <a:schemeClr val="bg2">
                         <a:lumMod val="75000"/>
@@ -7417,21 +8258,24 @@
                     <a:p>
                       <a:pPr algn="ctr"/>
                       <a:r>
-                        <a:rPr lang="pt-PT" sz="1600" dirty="0" err="1">
+                        <a:rPr lang="pt-PT" sz="1200" b="0" dirty="0" err="1">
                           <a:latin typeface="Calibri" panose="020F0502020204030204" pitchFamily="34" charset="0"/>
                           <a:ea typeface="Calibri" panose="020F0502020204030204" pitchFamily="34" charset="0"/>
                           <a:cs typeface="Calibri" panose="020F0502020204030204" pitchFamily="34" charset="0"/>
                         </a:rPr>
                         <a:t>Median</a:t>
                       </a:r>
-                      <a:endParaRPr lang="pt-PT" sz="1600" dirty="0">
-                        <a:latin typeface="Calibri" panose="020F0502020204030204" pitchFamily="34" charset="0"/>
-                        <a:ea typeface="Calibri" panose="020F0502020204030204" pitchFamily="34" charset="0"/>
-                        <a:cs typeface="Calibri" panose="020F0502020204030204" pitchFamily="34" charset="0"/>
-                      </a:endParaRPr>
-                    </a:p>
-                  </a:txBody>
-                  <a:tcPr anchor="ctr">
+                      <a:r>
+                        <a:rPr lang="pt-PT" sz="1200" b="0" dirty="0">
+                          <a:latin typeface="Calibri" panose="020F0502020204030204" pitchFamily="34" charset="0"/>
+                          <a:ea typeface="Calibri" panose="020F0502020204030204" pitchFamily="34" charset="0"/>
+                          <a:cs typeface="Calibri" panose="020F0502020204030204" pitchFamily="34" charset="0"/>
+                        </a:rPr>
+                        <a:t> (s)</a:t>
+                      </a:r>
+                    </a:p>
+                  </a:txBody>
+                  <a:tcPr marL="81828" marR="81828" anchor="ctr">
                     <a:solidFill>
                       <a:schemeClr val="bg2">
                         <a:lumMod val="75000"/>
@@ -7446,7 +8290,7 @@
                     <a:p>
                       <a:pPr algn="ctr"/>
                       <a:r>
-                        <a:rPr lang="pt-PT" sz="1600" dirty="0">
+                        <a:rPr lang="pt-PT" sz="1200" b="0" dirty="0">
                           <a:latin typeface="Calibri" panose="020F0502020204030204" pitchFamily="34" charset="0"/>
                           <a:ea typeface="Calibri" panose="020F0502020204030204" pitchFamily="34" charset="0"/>
                           <a:cs typeface="Calibri" panose="020F0502020204030204" pitchFamily="34" charset="0"/>
@@ -7454,21 +8298,24 @@
                         <a:t>Standard </a:t>
                       </a:r>
                       <a:r>
-                        <a:rPr lang="pt-PT" sz="1600" dirty="0" err="1">
+                        <a:rPr lang="pt-PT" sz="1200" b="0" dirty="0" err="1">
                           <a:latin typeface="Calibri" panose="020F0502020204030204" pitchFamily="34" charset="0"/>
                           <a:ea typeface="Calibri" panose="020F0502020204030204" pitchFamily="34" charset="0"/>
                           <a:cs typeface="Calibri" panose="020F0502020204030204" pitchFamily="34" charset="0"/>
                         </a:rPr>
                         <a:t>deviation</a:t>
                       </a:r>
-                      <a:endParaRPr lang="pt-PT" sz="1600" dirty="0">
-                        <a:latin typeface="Calibri" panose="020F0502020204030204" pitchFamily="34" charset="0"/>
-                        <a:ea typeface="Calibri" panose="020F0502020204030204" pitchFamily="34" charset="0"/>
-                        <a:cs typeface="Calibri" panose="020F0502020204030204" pitchFamily="34" charset="0"/>
-                      </a:endParaRPr>
-                    </a:p>
-                  </a:txBody>
-                  <a:tcPr anchor="ctr">
+                      <a:r>
+                        <a:rPr lang="pt-PT" sz="1200" b="0" dirty="0">
+                          <a:latin typeface="Calibri" panose="020F0502020204030204" pitchFamily="34" charset="0"/>
+                          <a:ea typeface="Calibri" panose="020F0502020204030204" pitchFamily="34" charset="0"/>
+                          <a:cs typeface="Calibri" panose="020F0502020204030204" pitchFamily="34" charset="0"/>
+                        </a:rPr>
+                        <a:t> (s)</a:t>
+                      </a:r>
+                    </a:p>
+                  </a:txBody>
+                  <a:tcPr marL="81828" marR="81828" anchor="ctr">
                     <a:solidFill>
                       <a:schemeClr val="bg2">
                         <a:lumMod val="75000"/>
@@ -7483,21 +8330,24 @@
                     <a:p>
                       <a:pPr algn="ctr"/>
                       <a:r>
-                        <a:rPr lang="pt-PT" sz="1600" dirty="0" err="1">
+                        <a:rPr lang="pt-PT" sz="1200" b="0" dirty="0" err="1">
                           <a:latin typeface="Calibri" panose="020F0502020204030204" pitchFamily="34" charset="0"/>
                           <a:ea typeface="Calibri" panose="020F0502020204030204" pitchFamily="34" charset="0"/>
                           <a:cs typeface="Calibri" panose="020F0502020204030204" pitchFamily="34" charset="0"/>
                         </a:rPr>
                         <a:t>Median</a:t>
                       </a:r>
-                      <a:endParaRPr lang="pt-PT" sz="1600" dirty="0">
-                        <a:latin typeface="Calibri" panose="020F0502020204030204" pitchFamily="34" charset="0"/>
-                        <a:ea typeface="Calibri" panose="020F0502020204030204" pitchFamily="34" charset="0"/>
-                        <a:cs typeface="Calibri" panose="020F0502020204030204" pitchFamily="34" charset="0"/>
-                      </a:endParaRPr>
-                    </a:p>
-                  </a:txBody>
-                  <a:tcPr anchor="ctr">
+                      <a:r>
+                        <a:rPr lang="pt-PT" sz="1200" b="0" dirty="0">
+                          <a:latin typeface="Calibri" panose="020F0502020204030204" pitchFamily="34" charset="0"/>
+                          <a:ea typeface="Calibri" panose="020F0502020204030204" pitchFamily="34" charset="0"/>
+                          <a:cs typeface="Calibri" panose="020F0502020204030204" pitchFamily="34" charset="0"/>
+                        </a:rPr>
+                        <a:t> (s)</a:t>
+                      </a:r>
+                    </a:p>
+                  </a:txBody>
+                  <a:tcPr marL="81828" marR="81828" anchor="ctr">
                     <a:solidFill>
                       <a:schemeClr val="bg2">
                         <a:lumMod val="75000"/>
@@ -7512,7 +8362,7 @@
                     <a:p>
                       <a:pPr algn="ctr"/>
                       <a:r>
-                        <a:rPr lang="pt-PT" sz="1600" dirty="0">
+                        <a:rPr lang="pt-PT" sz="1200" b="0" dirty="0">
                           <a:latin typeface="Calibri" panose="020F0502020204030204" pitchFamily="34" charset="0"/>
                           <a:ea typeface="Calibri" panose="020F0502020204030204" pitchFamily="34" charset="0"/>
                           <a:cs typeface="Calibri" panose="020F0502020204030204" pitchFamily="34" charset="0"/>
@@ -7520,21 +8370,24 @@
                         <a:t>Standard </a:t>
                       </a:r>
                       <a:r>
-                        <a:rPr lang="pt-PT" sz="1600" dirty="0" err="1">
+                        <a:rPr lang="pt-PT" sz="1200" b="0" dirty="0" err="1">
                           <a:latin typeface="Calibri" panose="020F0502020204030204" pitchFamily="34" charset="0"/>
                           <a:ea typeface="Calibri" panose="020F0502020204030204" pitchFamily="34" charset="0"/>
                           <a:cs typeface="Calibri" panose="020F0502020204030204" pitchFamily="34" charset="0"/>
                         </a:rPr>
                         <a:t>deviation</a:t>
                       </a:r>
-                      <a:endParaRPr lang="pt-PT" sz="1600" dirty="0">
-                        <a:latin typeface="Calibri" panose="020F0502020204030204" pitchFamily="34" charset="0"/>
-                        <a:ea typeface="Calibri" panose="020F0502020204030204" pitchFamily="34" charset="0"/>
-                        <a:cs typeface="Calibri" panose="020F0502020204030204" pitchFamily="34" charset="0"/>
-                      </a:endParaRPr>
-                    </a:p>
-                  </a:txBody>
-                  <a:tcPr anchor="ctr">
+                      <a:r>
+                        <a:rPr lang="pt-PT" sz="1200" b="0" dirty="0">
+                          <a:latin typeface="Calibri" panose="020F0502020204030204" pitchFamily="34" charset="0"/>
+                          <a:ea typeface="Calibri" panose="020F0502020204030204" pitchFamily="34" charset="0"/>
+                          <a:cs typeface="Calibri" panose="020F0502020204030204" pitchFamily="34" charset="0"/>
+                        </a:rPr>
+                        <a:t> (s)</a:t>
+                      </a:r>
+                    </a:p>
+                  </a:txBody>
+                  <a:tcPr marL="81828" marR="81828" anchor="ctr">
                     <a:solidFill>
                       <a:schemeClr val="bg2">
                         <a:lumMod val="75000"/>
@@ -7549,21 +8402,24 @@
                     <a:p>
                       <a:pPr algn="ctr"/>
                       <a:r>
-                        <a:rPr lang="pt-PT" sz="1600" dirty="0" err="1">
+                        <a:rPr lang="pt-PT" sz="1200" b="0" dirty="0" err="1">
                           <a:latin typeface="Calibri" panose="020F0502020204030204" pitchFamily="34" charset="0"/>
                           <a:ea typeface="Calibri" panose="020F0502020204030204" pitchFamily="34" charset="0"/>
                           <a:cs typeface="Calibri" panose="020F0502020204030204" pitchFamily="34" charset="0"/>
                         </a:rPr>
                         <a:t>Median</a:t>
                       </a:r>
-                      <a:endParaRPr lang="pt-PT" sz="1600" dirty="0">
-                        <a:latin typeface="Calibri" panose="020F0502020204030204" pitchFamily="34" charset="0"/>
-                        <a:ea typeface="Calibri" panose="020F0502020204030204" pitchFamily="34" charset="0"/>
-                        <a:cs typeface="Calibri" panose="020F0502020204030204" pitchFamily="34" charset="0"/>
-                      </a:endParaRPr>
-                    </a:p>
-                  </a:txBody>
-                  <a:tcPr anchor="ctr">
+                      <a:r>
+                        <a:rPr lang="pt-PT" sz="1200" b="0" dirty="0">
+                          <a:latin typeface="Calibri" panose="020F0502020204030204" pitchFamily="34" charset="0"/>
+                          <a:ea typeface="Calibri" panose="020F0502020204030204" pitchFamily="34" charset="0"/>
+                          <a:cs typeface="Calibri" panose="020F0502020204030204" pitchFamily="34" charset="0"/>
+                        </a:rPr>
+                        <a:t> (s)</a:t>
+                      </a:r>
+                    </a:p>
+                  </a:txBody>
+                  <a:tcPr marL="81828" marR="81828" anchor="ctr">
                     <a:solidFill>
                       <a:schemeClr val="bg2">
                         <a:lumMod val="75000"/>
@@ -7578,7 +8434,7 @@
                     <a:p>
                       <a:pPr algn="ctr"/>
                       <a:r>
-                        <a:rPr lang="pt-PT" sz="1600" dirty="0">
+                        <a:rPr lang="pt-PT" sz="1200" b="0" dirty="0">
                           <a:latin typeface="Calibri" panose="020F0502020204030204" pitchFamily="34" charset="0"/>
                           <a:ea typeface="Calibri" panose="020F0502020204030204" pitchFamily="34" charset="0"/>
                           <a:cs typeface="Calibri" panose="020F0502020204030204" pitchFamily="34" charset="0"/>
@@ -7586,21 +8442,24 @@
                         <a:t>Standard </a:t>
                       </a:r>
                       <a:r>
-                        <a:rPr lang="pt-PT" sz="1600" dirty="0" err="1">
+                        <a:rPr lang="pt-PT" sz="1200" b="0" dirty="0" err="1">
                           <a:latin typeface="Calibri" panose="020F0502020204030204" pitchFamily="34" charset="0"/>
                           <a:ea typeface="Calibri" panose="020F0502020204030204" pitchFamily="34" charset="0"/>
                           <a:cs typeface="Calibri" panose="020F0502020204030204" pitchFamily="34" charset="0"/>
                         </a:rPr>
                         <a:t>deviation</a:t>
                       </a:r>
-                      <a:endParaRPr lang="pt-PT" sz="1600" dirty="0">
-                        <a:latin typeface="Calibri" panose="020F0502020204030204" pitchFamily="34" charset="0"/>
-                        <a:ea typeface="Calibri" panose="020F0502020204030204" pitchFamily="34" charset="0"/>
-                        <a:cs typeface="Calibri" panose="020F0502020204030204" pitchFamily="34" charset="0"/>
-                      </a:endParaRPr>
-                    </a:p>
-                  </a:txBody>
-                  <a:tcPr anchor="ctr">
+                      <a:r>
+                        <a:rPr lang="pt-PT" sz="1200" b="0" dirty="0">
+                          <a:latin typeface="Calibri" panose="020F0502020204030204" pitchFamily="34" charset="0"/>
+                          <a:ea typeface="Calibri" panose="020F0502020204030204" pitchFamily="34" charset="0"/>
+                          <a:cs typeface="Calibri" panose="020F0502020204030204" pitchFamily="34" charset="0"/>
+                        </a:rPr>
+                        <a:t> (s)</a:t>
+                      </a:r>
+                    </a:p>
+                  </a:txBody>
+                  <a:tcPr marL="81828" marR="81828" anchor="ctr">
                     <a:solidFill>
                       <a:schemeClr val="bg2">
                         <a:lumMod val="75000"/>
@@ -8501,14 +9360,14 @@
           <p:nvPr>
             <p:extLst>
               <p:ext uri="{D42A27DB-BD31-4B8C-83A1-F6EECF244321}">
-                <p14:modId xmlns:p14="http://schemas.microsoft.com/office/powerpoint/2010/main" val="1773529267"/>
+                <p14:modId xmlns:p14="http://schemas.microsoft.com/office/powerpoint/2010/main" val="3399152762"/>
               </p:ext>
             </p:extLst>
           </p:nvPr>
         </p:nvGraphicFramePr>
         <p:xfrm>
           <a:off x="1449882" y="4070385"/>
-          <a:ext cx="9604370" cy="2407920"/>
+          <a:ext cx="9604370" cy="2286000"/>
         </p:xfrm>
         <a:graphic>
           <a:graphicData uri="http://schemas.openxmlformats.org/drawingml/2006/table">
@@ -8769,21 +9628,24 @@
                     <a:p>
                       <a:pPr algn="ctr"/>
                       <a:r>
-                        <a:rPr lang="pt-PT" sz="1600" dirty="0" err="1">
+                        <a:rPr lang="pt-PT" sz="1200" b="0" dirty="0" err="1">
                           <a:latin typeface="Calibri" panose="020F0502020204030204" pitchFamily="34" charset="0"/>
                           <a:ea typeface="Calibri" panose="020F0502020204030204" pitchFamily="34" charset="0"/>
                           <a:cs typeface="Calibri" panose="020F0502020204030204" pitchFamily="34" charset="0"/>
                         </a:rPr>
                         <a:t>Median</a:t>
                       </a:r>
-                      <a:endParaRPr lang="pt-PT" sz="1600" dirty="0">
-                        <a:latin typeface="Calibri" panose="020F0502020204030204" pitchFamily="34" charset="0"/>
-                        <a:ea typeface="Calibri" panose="020F0502020204030204" pitchFamily="34" charset="0"/>
-                        <a:cs typeface="Calibri" panose="020F0502020204030204" pitchFamily="34" charset="0"/>
-                      </a:endParaRPr>
-                    </a:p>
-                  </a:txBody>
-                  <a:tcPr anchor="ctr">
+                      <a:r>
+                        <a:rPr lang="pt-PT" sz="1200" b="0" dirty="0">
+                          <a:latin typeface="Calibri" panose="020F0502020204030204" pitchFamily="34" charset="0"/>
+                          <a:ea typeface="Calibri" panose="020F0502020204030204" pitchFamily="34" charset="0"/>
+                          <a:cs typeface="Calibri" panose="020F0502020204030204" pitchFamily="34" charset="0"/>
+                        </a:rPr>
+                        <a:t> (s)</a:t>
+                      </a:r>
+                    </a:p>
+                  </a:txBody>
+                  <a:tcPr marL="81828" marR="81828" anchor="ctr">
                     <a:solidFill>
                       <a:schemeClr val="bg2">
                         <a:lumMod val="75000"/>
@@ -8798,7 +9660,7 @@
                     <a:p>
                       <a:pPr algn="ctr"/>
                       <a:r>
-                        <a:rPr lang="pt-PT" sz="1600" dirty="0">
+                        <a:rPr lang="pt-PT" sz="1200" b="0" dirty="0">
                           <a:latin typeface="Calibri" panose="020F0502020204030204" pitchFamily="34" charset="0"/>
                           <a:ea typeface="Calibri" panose="020F0502020204030204" pitchFamily="34" charset="0"/>
                           <a:cs typeface="Calibri" panose="020F0502020204030204" pitchFamily="34" charset="0"/>
@@ -8806,21 +9668,24 @@
                         <a:t>Standard </a:t>
                       </a:r>
                       <a:r>
-                        <a:rPr lang="pt-PT" sz="1600" dirty="0" err="1">
+                        <a:rPr lang="pt-PT" sz="1200" b="0" dirty="0" err="1">
                           <a:latin typeface="Calibri" panose="020F0502020204030204" pitchFamily="34" charset="0"/>
                           <a:ea typeface="Calibri" panose="020F0502020204030204" pitchFamily="34" charset="0"/>
                           <a:cs typeface="Calibri" panose="020F0502020204030204" pitchFamily="34" charset="0"/>
                         </a:rPr>
                         <a:t>deviation</a:t>
                       </a:r>
-                      <a:endParaRPr lang="pt-PT" sz="1600" dirty="0">
-                        <a:latin typeface="Calibri" panose="020F0502020204030204" pitchFamily="34" charset="0"/>
-                        <a:ea typeface="Calibri" panose="020F0502020204030204" pitchFamily="34" charset="0"/>
-                        <a:cs typeface="Calibri" panose="020F0502020204030204" pitchFamily="34" charset="0"/>
-                      </a:endParaRPr>
-                    </a:p>
-                  </a:txBody>
-                  <a:tcPr anchor="ctr">
+                      <a:r>
+                        <a:rPr lang="pt-PT" sz="1200" b="0" dirty="0">
+                          <a:latin typeface="Calibri" panose="020F0502020204030204" pitchFamily="34" charset="0"/>
+                          <a:ea typeface="Calibri" panose="020F0502020204030204" pitchFamily="34" charset="0"/>
+                          <a:cs typeface="Calibri" panose="020F0502020204030204" pitchFamily="34" charset="0"/>
+                        </a:rPr>
+                        <a:t> (s)</a:t>
+                      </a:r>
+                    </a:p>
+                  </a:txBody>
+                  <a:tcPr marL="81828" marR="81828" anchor="ctr">
                     <a:solidFill>
                       <a:schemeClr val="bg2">
                         <a:lumMod val="75000"/>
@@ -8835,21 +9700,24 @@
                     <a:p>
                       <a:pPr algn="ctr"/>
                       <a:r>
-                        <a:rPr lang="pt-PT" sz="1600" dirty="0" err="1">
+                        <a:rPr lang="pt-PT" sz="1200" b="0" dirty="0" err="1">
                           <a:latin typeface="Calibri" panose="020F0502020204030204" pitchFamily="34" charset="0"/>
                           <a:ea typeface="Calibri" panose="020F0502020204030204" pitchFamily="34" charset="0"/>
                           <a:cs typeface="Calibri" panose="020F0502020204030204" pitchFamily="34" charset="0"/>
                         </a:rPr>
                         <a:t>Median</a:t>
                       </a:r>
-                      <a:endParaRPr lang="pt-PT" sz="1600" dirty="0">
-                        <a:latin typeface="Calibri" panose="020F0502020204030204" pitchFamily="34" charset="0"/>
-                        <a:ea typeface="Calibri" panose="020F0502020204030204" pitchFamily="34" charset="0"/>
-                        <a:cs typeface="Calibri" panose="020F0502020204030204" pitchFamily="34" charset="0"/>
-                      </a:endParaRPr>
-                    </a:p>
-                  </a:txBody>
-                  <a:tcPr anchor="ctr">
+                      <a:r>
+                        <a:rPr lang="pt-PT" sz="1200" b="0" dirty="0">
+                          <a:latin typeface="Calibri" panose="020F0502020204030204" pitchFamily="34" charset="0"/>
+                          <a:ea typeface="Calibri" panose="020F0502020204030204" pitchFamily="34" charset="0"/>
+                          <a:cs typeface="Calibri" panose="020F0502020204030204" pitchFamily="34" charset="0"/>
+                        </a:rPr>
+                        <a:t> (s)</a:t>
+                      </a:r>
+                    </a:p>
+                  </a:txBody>
+                  <a:tcPr marL="81828" marR="81828" anchor="ctr">
                     <a:solidFill>
                       <a:schemeClr val="bg2">
                         <a:lumMod val="75000"/>
@@ -8864,7 +9732,7 @@
                     <a:p>
                       <a:pPr algn="ctr"/>
                       <a:r>
-                        <a:rPr lang="pt-PT" sz="1600" dirty="0">
+                        <a:rPr lang="pt-PT" sz="1200" b="0" dirty="0">
                           <a:latin typeface="Calibri" panose="020F0502020204030204" pitchFamily="34" charset="0"/>
                           <a:ea typeface="Calibri" panose="020F0502020204030204" pitchFamily="34" charset="0"/>
                           <a:cs typeface="Calibri" panose="020F0502020204030204" pitchFamily="34" charset="0"/>
@@ -8872,21 +9740,24 @@
                         <a:t>Standard </a:t>
                       </a:r>
                       <a:r>
-                        <a:rPr lang="pt-PT" sz="1600" dirty="0" err="1">
+                        <a:rPr lang="pt-PT" sz="1200" b="0" dirty="0" err="1">
                           <a:latin typeface="Calibri" panose="020F0502020204030204" pitchFamily="34" charset="0"/>
                           <a:ea typeface="Calibri" panose="020F0502020204030204" pitchFamily="34" charset="0"/>
                           <a:cs typeface="Calibri" panose="020F0502020204030204" pitchFamily="34" charset="0"/>
                         </a:rPr>
                         <a:t>deviation</a:t>
                       </a:r>
-                      <a:endParaRPr lang="pt-PT" sz="1600" dirty="0">
-                        <a:latin typeface="Calibri" panose="020F0502020204030204" pitchFamily="34" charset="0"/>
-                        <a:ea typeface="Calibri" panose="020F0502020204030204" pitchFamily="34" charset="0"/>
-                        <a:cs typeface="Calibri" panose="020F0502020204030204" pitchFamily="34" charset="0"/>
-                      </a:endParaRPr>
-                    </a:p>
-                  </a:txBody>
-                  <a:tcPr anchor="ctr">
+                      <a:r>
+                        <a:rPr lang="pt-PT" sz="1200" b="0" dirty="0">
+                          <a:latin typeface="Calibri" panose="020F0502020204030204" pitchFamily="34" charset="0"/>
+                          <a:ea typeface="Calibri" panose="020F0502020204030204" pitchFamily="34" charset="0"/>
+                          <a:cs typeface="Calibri" panose="020F0502020204030204" pitchFamily="34" charset="0"/>
+                        </a:rPr>
+                        <a:t> (s)</a:t>
+                      </a:r>
+                    </a:p>
+                  </a:txBody>
+                  <a:tcPr marL="81828" marR="81828" anchor="ctr">
                     <a:solidFill>
                       <a:schemeClr val="bg2">
                         <a:lumMod val="75000"/>
@@ -8901,21 +9772,24 @@
                     <a:p>
                       <a:pPr algn="ctr"/>
                       <a:r>
-                        <a:rPr lang="pt-PT" sz="1600" dirty="0" err="1">
+                        <a:rPr lang="pt-PT" sz="1200" b="0" dirty="0" err="1">
                           <a:latin typeface="Calibri" panose="020F0502020204030204" pitchFamily="34" charset="0"/>
                           <a:ea typeface="Calibri" panose="020F0502020204030204" pitchFamily="34" charset="0"/>
                           <a:cs typeface="Calibri" panose="020F0502020204030204" pitchFamily="34" charset="0"/>
                         </a:rPr>
                         <a:t>Median</a:t>
                       </a:r>
-                      <a:endParaRPr lang="pt-PT" sz="1600" dirty="0">
-                        <a:latin typeface="Calibri" panose="020F0502020204030204" pitchFamily="34" charset="0"/>
-                        <a:ea typeface="Calibri" panose="020F0502020204030204" pitchFamily="34" charset="0"/>
-                        <a:cs typeface="Calibri" panose="020F0502020204030204" pitchFamily="34" charset="0"/>
-                      </a:endParaRPr>
-                    </a:p>
-                  </a:txBody>
-                  <a:tcPr anchor="ctr">
+                      <a:r>
+                        <a:rPr lang="pt-PT" sz="1200" b="0" dirty="0">
+                          <a:latin typeface="Calibri" panose="020F0502020204030204" pitchFamily="34" charset="0"/>
+                          <a:ea typeface="Calibri" panose="020F0502020204030204" pitchFamily="34" charset="0"/>
+                          <a:cs typeface="Calibri" panose="020F0502020204030204" pitchFamily="34" charset="0"/>
+                        </a:rPr>
+                        <a:t> (s)</a:t>
+                      </a:r>
+                    </a:p>
+                  </a:txBody>
+                  <a:tcPr marL="81828" marR="81828" anchor="ctr">
                     <a:solidFill>
                       <a:schemeClr val="bg2">
                         <a:lumMod val="75000"/>
@@ -8930,7 +9804,7 @@
                     <a:p>
                       <a:pPr algn="ctr"/>
                       <a:r>
-                        <a:rPr lang="pt-PT" sz="1600" dirty="0">
+                        <a:rPr lang="pt-PT" sz="1200" b="0" dirty="0">
                           <a:latin typeface="Calibri" panose="020F0502020204030204" pitchFamily="34" charset="0"/>
                           <a:ea typeface="Calibri" panose="020F0502020204030204" pitchFamily="34" charset="0"/>
                           <a:cs typeface="Calibri" panose="020F0502020204030204" pitchFamily="34" charset="0"/>
@@ -8938,21 +9812,24 @@
                         <a:t>Standard </a:t>
                       </a:r>
                       <a:r>
-                        <a:rPr lang="pt-PT" sz="1600" dirty="0" err="1">
+                        <a:rPr lang="pt-PT" sz="1200" b="0" dirty="0" err="1">
                           <a:latin typeface="Calibri" panose="020F0502020204030204" pitchFamily="34" charset="0"/>
                           <a:ea typeface="Calibri" panose="020F0502020204030204" pitchFamily="34" charset="0"/>
                           <a:cs typeface="Calibri" panose="020F0502020204030204" pitchFamily="34" charset="0"/>
                         </a:rPr>
                         <a:t>deviation</a:t>
                       </a:r>
-                      <a:endParaRPr lang="pt-PT" sz="1600" dirty="0">
-                        <a:latin typeface="Calibri" panose="020F0502020204030204" pitchFamily="34" charset="0"/>
-                        <a:ea typeface="Calibri" panose="020F0502020204030204" pitchFamily="34" charset="0"/>
-                        <a:cs typeface="Calibri" panose="020F0502020204030204" pitchFamily="34" charset="0"/>
-                      </a:endParaRPr>
-                    </a:p>
-                  </a:txBody>
-                  <a:tcPr anchor="ctr">
+                      <a:r>
+                        <a:rPr lang="pt-PT" sz="1200" b="0" dirty="0">
+                          <a:latin typeface="Calibri" panose="020F0502020204030204" pitchFamily="34" charset="0"/>
+                          <a:ea typeface="Calibri" panose="020F0502020204030204" pitchFamily="34" charset="0"/>
+                          <a:cs typeface="Calibri" panose="020F0502020204030204" pitchFamily="34" charset="0"/>
+                        </a:rPr>
+                        <a:t> (s)</a:t>
+                      </a:r>
+                    </a:p>
+                  </a:txBody>
+                  <a:tcPr marL="81828" marR="81828" anchor="ctr">
                     <a:solidFill>
                       <a:schemeClr val="bg2">
                         <a:lumMod val="75000"/>
@@ -8967,21 +9844,24 @@
                     <a:p>
                       <a:pPr algn="ctr"/>
                       <a:r>
-                        <a:rPr lang="pt-PT" sz="1600" dirty="0" err="1">
+                        <a:rPr lang="pt-PT" sz="1200" b="0" dirty="0" err="1">
                           <a:latin typeface="Calibri" panose="020F0502020204030204" pitchFamily="34" charset="0"/>
                           <a:ea typeface="Calibri" panose="020F0502020204030204" pitchFamily="34" charset="0"/>
                           <a:cs typeface="Calibri" panose="020F0502020204030204" pitchFamily="34" charset="0"/>
                         </a:rPr>
                         <a:t>Median</a:t>
                       </a:r>
-                      <a:endParaRPr lang="pt-PT" sz="1600" dirty="0">
-                        <a:latin typeface="Calibri" panose="020F0502020204030204" pitchFamily="34" charset="0"/>
-                        <a:ea typeface="Calibri" panose="020F0502020204030204" pitchFamily="34" charset="0"/>
-                        <a:cs typeface="Calibri" panose="020F0502020204030204" pitchFamily="34" charset="0"/>
-                      </a:endParaRPr>
-                    </a:p>
-                  </a:txBody>
-                  <a:tcPr anchor="ctr">
+                      <a:r>
+                        <a:rPr lang="pt-PT" sz="1200" b="0" dirty="0">
+                          <a:latin typeface="Calibri" panose="020F0502020204030204" pitchFamily="34" charset="0"/>
+                          <a:ea typeface="Calibri" panose="020F0502020204030204" pitchFamily="34" charset="0"/>
+                          <a:cs typeface="Calibri" panose="020F0502020204030204" pitchFamily="34" charset="0"/>
+                        </a:rPr>
+                        <a:t> (s)</a:t>
+                      </a:r>
+                    </a:p>
+                  </a:txBody>
+                  <a:tcPr marL="81828" marR="81828" anchor="ctr">
                     <a:solidFill>
                       <a:schemeClr val="bg2">
                         <a:lumMod val="75000"/>
@@ -8996,7 +9876,7 @@
                     <a:p>
                       <a:pPr algn="ctr"/>
                       <a:r>
-                        <a:rPr lang="pt-PT" sz="1600" dirty="0">
+                        <a:rPr lang="pt-PT" sz="1200" b="0" dirty="0">
                           <a:latin typeface="Calibri" panose="020F0502020204030204" pitchFamily="34" charset="0"/>
                           <a:ea typeface="Calibri" panose="020F0502020204030204" pitchFamily="34" charset="0"/>
                           <a:cs typeface="Calibri" panose="020F0502020204030204" pitchFamily="34" charset="0"/>
@@ -9004,21 +9884,24 @@
                         <a:t>Standard </a:t>
                       </a:r>
                       <a:r>
-                        <a:rPr lang="pt-PT" sz="1600" dirty="0" err="1">
+                        <a:rPr lang="pt-PT" sz="1200" b="0" dirty="0" err="1">
                           <a:latin typeface="Calibri" panose="020F0502020204030204" pitchFamily="34" charset="0"/>
                           <a:ea typeface="Calibri" panose="020F0502020204030204" pitchFamily="34" charset="0"/>
                           <a:cs typeface="Calibri" panose="020F0502020204030204" pitchFamily="34" charset="0"/>
                         </a:rPr>
                         <a:t>deviation</a:t>
                       </a:r>
-                      <a:endParaRPr lang="pt-PT" sz="1600" dirty="0">
-                        <a:latin typeface="Calibri" panose="020F0502020204030204" pitchFamily="34" charset="0"/>
-                        <a:ea typeface="Calibri" panose="020F0502020204030204" pitchFamily="34" charset="0"/>
-                        <a:cs typeface="Calibri" panose="020F0502020204030204" pitchFamily="34" charset="0"/>
-                      </a:endParaRPr>
-                    </a:p>
-                  </a:txBody>
-                  <a:tcPr anchor="ctr">
+                      <a:r>
+                        <a:rPr lang="pt-PT" sz="1200" b="0" dirty="0">
+                          <a:latin typeface="Calibri" panose="020F0502020204030204" pitchFamily="34" charset="0"/>
+                          <a:ea typeface="Calibri" panose="020F0502020204030204" pitchFamily="34" charset="0"/>
+                          <a:cs typeface="Calibri" panose="020F0502020204030204" pitchFamily="34" charset="0"/>
+                        </a:rPr>
+                        <a:t> (s)</a:t>
+                      </a:r>
+                    </a:p>
+                  </a:txBody>
+                  <a:tcPr marL="81828" marR="81828" anchor="ctr">
                     <a:solidFill>
                       <a:schemeClr val="bg2">
                         <a:lumMod val="75000"/>
@@ -9063,7 +9946,7 @@
                           <a:ea typeface="Calibri" panose="020F0502020204030204" pitchFamily="34" charset="0"/>
                           <a:cs typeface="Calibri" panose="020F0502020204030204" pitchFamily="34" charset="0"/>
                         </a:rPr>
-                        <a:t> </a:t>
+                        <a:t>0.002775</a:t>
                       </a:r>
                     </a:p>
                   </a:txBody>
@@ -9074,12 +9957,49 @@
                     <a:bodyPr/>
                     <a:lstStyle/>
                     <a:p>
+                      <a:pPr marL="0" marR="0" lvl="0" indent="0" algn="ctr" defTabSz="914400" rtl="0" eaLnBrk="1" fontAlgn="auto" latinLnBrk="0" hangingPunct="1">
+                        <a:lnSpc>
+                          <a:spcPct val="100000"/>
+                        </a:lnSpc>
+                        <a:spcBef>
+                          <a:spcPts val="0"/>
+                        </a:spcBef>
+                        <a:spcAft>
+                          <a:spcPts val="0"/>
+                        </a:spcAft>
+                        <a:buClrTx/>
+                        <a:buSzTx/>
+                        <a:buFontTx/>
+                        <a:buNone/>
+                        <a:tabLst/>
+                        <a:defRPr/>
+                      </a:pPr>
+                      <a:r>
+                        <a:rPr lang="pt-PT" sz="1400" dirty="0">
+                          <a:latin typeface="Calibri" panose="020F0502020204030204" pitchFamily="34" charset="0"/>
+                          <a:ea typeface="Calibri" panose="020F0502020204030204" pitchFamily="34" charset="0"/>
+                          <a:cs typeface="Calibri" panose="020F0502020204030204" pitchFamily="34" charset="0"/>
+                        </a:rPr>
+                        <a:t>0.000770</a:t>
+                      </a:r>
+                    </a:p>
+                  </a:txBody>
+                  <a:tcPr anchor="ctr"/>
+                </a:tc>
+                <a:tc>
+                  <a:txBody>
+                    <a:bodyPr/>
+                    <a:lstStyle/>
+                    <a:p>
                       <a:pPr algn="ctr"/>
-                      <a:endParaRPr lang="pt-PT" sz="1400" dirty="0">
-                        <a:latin typeface="Calibri" panose="020F0502020204030204" pitchFamily="34" charset="0"/>
-                        <a:ea typeface="Calibri" panose="020F0502020204030204" pitchFamily="34" charset="0"/>
-                        <a:cs typeface="Calibri" panose="020F0502020204030204" pitchFamily="34" charset="0"/>
-                      </a:endParaRPr>
+                      <a:r>
+                        <a:rPr lang="pt-PT" sz="1400" dirty="0">
+                          <a:latin typeface="Calibri" panose="020F0502020204030204" pitchFamily="34" charset="0"/>
+                          <a:ea typeface="Calibri" panose="020F0502020204030204" pitchFamily="34" charset="0"/>
+                          <a:cs typeface="Calibri" panose="020F0502020204030204" pitchFamily="34" charset="0"/>
+                        </a:rPr>
+                        <a:t>0.005476</a:t>
+                      </a:r>
                     </a:p>
                   </a:txBody>
                   <a:tcPr anchor="ctr"/>
@@ -9089,12 +10009,49 @@
                     <a:bodyPr/>
                     <a:lstStyle/>
                     <a:p>
+                      <a:pPr marL="0" marR="0" lvl="0" indent="0" algn="ctr" defTabSz="914400" rtl="0" eaLnBrk="1" fontAlgn="auto" latinLnBrk="0" hangingPunct="1">
+                        <a:lnSpc>
+                          <a:spcPct val="100000"/>
+                        </a:lnSpc>
+                        <a:spcBef>
+                          <a:spcPts val="0"/>
+                        </a:spcBef>
+                        <a:spcAft>
+                          <a:spcPts val="0"/>
+                        </a:spcAft>
+                        <a:buClrTx/>
+                        <a:buSzTx/>
+                        <a:buFontTx/>
+                        <a:buNone/>
+                        <a:tabLst/>
+                        <a:defRPr/>
+                      </a:pPr>
+                      <a:r>
+                        <a:rPr lang="pt-PT" sz="1400" dirty="0">
+                          <a:latin typeface="Calibri" panose="020F0502020204030204" pitchFamily="34" charset="0"/>
+                          <a:ea typeface="Calibri" panose="020F0502020204030204" pitchFamily="34" charset="0"/>
+                          <a:cs typeface="Calibri" panose="020F0502020204030204" pitchFamily="34" charset="0"/>
+                        </a:rPr>
+                        <a:t>0.004615</a:t>
+                      </a:r>
+                    </a:p>
+                  </a:txBody>
+                  <a:tcPr anchor="ctr"/>
+                </a:tc>
+                <a:tc>
+                  <a:txBody>
+                    <a:bodyPr/>
+                    <a:lstStyle/>
+                    <a:p>
                       <a:pPr algn="ctr"/>
-                      <a:endParaRPr lang="pt-PT" sz="1400" dirty="0">
-                        <a:latin typeface="Calibri" panose="020F0502020204030204" pitchFamily="34" charset="0"/>
-                        <a:ea typeface="Calibri" panose="020F0502020204030204" pitchFamily="34" charset="0"/>
-                        <a:cs typeface="Calibri" panose="020F0502020204030204" pitchFamily="34" charset="0"/>
-                      </a:endParaRPr>
+                      <a:r>
+                        <a:rPr lang="pt-PT" sz="1400" dirty="0">
+                          <a:latin typeface="Calibri" panose="020F0502020204030204" pitchFamily="34" charset="0"/>
+                          <a:ea typeface="Calibri" panose="020F0502020204030204" pitchFamily="34" charset="0"/>
+                          <a:cs typeface="Calibri" panose="020F0502020204030204" pitchFamily="34" charset="0"/>
+                        </a:rPr>
+                        <a:t>0.008056</a:t>
+                      </a:r>
                     </a:p>
                   </a:txBody>
                   <a:tcPr anchor="ctr"/>
@@ -9104,12 +10061,49 @@
                     <a:bodyPr/>
                     <a:lstStyle/>
                     <a:p>
+                      <a:pPr marL="0" marR="0" lvl="0" indent="0" algn="ctr" defTabSz="914400" rtl="0" eaLnBrk="1" fontAlgn="auto" latinLnBrk="0" hangingPunct="1">
+                        <a:lnSpc>
+                          <a:spcPct val="100000"/>
+                        </a:lnSpc>
+                        <a:spcBef>
+                          <a:spcPts val="0"/>
+                        </a:spcBef>
+                        <a:spcAft>
+                          <a:spcPts val="0"/>
+                        </a:spcAft>
+                        <a:buClrTx/>
+                        <a:buSzTx/>
+                        <a:buFontTx/>
+                        <a:buNone/>
+                        <a:tabLst/>
+                        <a:defRPr/>
+                      </a:pPr>
+                      <a:r>
+                        <a:rPr lang="pt-PT" sz="1400" dirty="0">
+                          <a:latin typeface="Calibri" panose="020F0502020204030204" pitchFamily="34" charset="0"/>
+                          <a:ea typeface="Calibri" panose="020F0502020204030204" pitchFamily="34" charset="0"/>
+                          <a:cs typeface="Calibri" panose="020F0502020204030204" pitchFamily="34" charset="0"/>
+                        </a:rPr>
+                        <a:t>0.009762</a:t>
+                      </a:r>
+                    </a:p>
+                  </a:txBody>
+                  <a:tcPr anchor="ctr"/>
+                </a:tc>
+                <a:tc>
+                  <a:txBody>
+                    <a:bodyPr/>
+                    <a:lstStyle/>
+                    <a:p>
                       <a:pPr algn="ctr"/>
-                      <a:endParaRPr lang="pt-PT" sz="1400" dirty="0">
-                        <a:latin typeface="Calibri" panose="020F0502020204030204" pitchFamily="34" charset="0"/>
-                        <a:ea typeface="Calibri" panose="020F0502020204030204" pitchFamily="34" charset="0"/>
-                        <a:cs typeface="Calibri" panose="020F0502020204030204" pitchFamily="34" charset="0"/>
-                      </a:endParaRPr>
+                      <a:r>
+                        <a:rPr lang="pt-PT" sz="1400" dirty="0">
+                          <a:latin typeface="Calibri" panose="020F0502020204030204" pitchFamily="34" charset="0"/>
+                          <a:ea typeface="Calibri" panose="020F0502020204030204" pitchFamily="34" charset="0"/>
+                          <a:cs typeface="Calibri" panose="020F0502020204030204" pitchFamily="34" charset="0"/>
+                        </a:rPr>
+                        <a:t>0.007601</a:t>
+                      </a:r>
                     </a:p>
                   </a:txBody>
                   <a:tcPr anchor="ctr"/>
@@ -9119,57 +10113,31 @@
                     <a:bodyPr/>
                     <a:lstStyle/>
                     <a:p>
-                      <a:pPr algn="ctr"/>
-                      <a:endParaRPr lang="pt-PT" sz="1400" dirty="0">
-                        <a:latin typeface="Calibri" panose="020F0502020204030204" pitchFamily="34" charset="0"/>
-                        <a:ea typeface="Calibri" panose="020F0502020204030204" pitchFamily="34" charset="0"/>
-                        <a:cs typeface="Calibri" panose="020F0502020204030204" pitchFamily="34" charset="0"/>
-                      </a:endParaRPr>
-                    </a:p>
-                  </a:txBody>
-                  <a:tcPr anchor="ctr"/>
-                </a:tc>
-                <a:tc>
-                  <a:txBody>
-                    <a:bodyPr/>
-                    <a:lstStyle/>
-                    <a:p>
-                      <a:pPr algn="ctr"/>
-                      <a:endParaRPr lang="pt-PT" sz="1400" dirty="0">
-                        <a:latin typeface="Calibri" panose="020F0502020204030204" pitchFamily="34" charset="0"/>
-                        <a:ea typeface="Calibri" panose="020F0502020204030204" pitchFamily="34" charset="0"/>
-                        <a:cs typeface="Calibri" panose="020F0502020204030204" pitchFamily="34" charset="0"/>
-                      </a:endParaRPr>
-                    </a:p>
-                  </a:txBody>
-                  <a:tcPr anchor="ctr"/>
-                </a:tc>
-                <a:tc>
-                  <a:txBody>
-                    <a:bodyPr/>
-                    <a:lstStyle/>
-                    <a:p>
-                      <a:pPr algn="ctr"/>
-                      <a:endParaRPr lang="pt-PT" sz="1400" dirty="0">
-                        <a:latin typeface="Calibri" panose="020F0502020204030204" pitchFamily="34" charset="0"/>
-                        <a:ea typeface="Calibri" panose="020F0502020204030204" pitchFamily="34" charset="0"/>
-                        <a:cs typeface="Calibri" panose="020F0502020204030204" pitchFamily="34" charset="0"/>
-                      </a:endParaRPr>
-                    </a:p>
-                  </a:txBody>
-                  <a:tcPr anchor="ctr"/>
-                </a:tc>
-                <a:tc>
-                  <a:txBody>
-                    <a:bodyPr/>
-                    <a:lstStyle/>
-                    <a:p>
-                      <a:pPr algn="ctr"/>
-                      <a:endParaRPr lang="pt-PT" sz="1400" dirty="0">
-                        <a:latin typeface="Calibri" panose="020F0502020204030204" pitchFamily="34" charset="0"/>
-                        <a:ea typeface="Calibri" panose="020F0502020204030204" pitchFamily="34" charset="0"/>
-                        <a:cs typeface="Calibri" panose="020F0502020204030204" pitchFamily="34" charset="0"/>
-                      </a:endParaRPr>
+                      <a:pPr marL="0" marR="0" lvl="0" indent="0" algn="ctr" defTabSz="914400" rtl="0" eaLnBrk="1" fontAlgn="auto" latinLnBrk="0" hangingPunct="1">
+                        <a:lnSpc>
+                          <a:spcPct val="100000"/>
+                        </a:lnSpc>
+                        <a:spcBef>
+                          <a:spcPts val="0"/>
+                        </a:spcBef>
+                        <a:spcAft>
+                          <a:spcPts val="0"/>
+                        </a:spcAft>
+                        <a:buClrTx/>
+                        <a:buSzTx/>
+                        <a:buFontTx/>
+                        <a:buNone/>
+                        <a:tabLst/>
+                        <a:defRPr/>
+                      </a:pPr>
+                      <a:r>
+                        <a:rPr lang="pt-PT" sz="1400" dirty="0">
+                          <a:latin typeface="Calibri" panose="020F0502020204030204" pitchFamily="34" charset="0"/>
+                          <a:ea typeface="Calibri" panose="020F0502020204030204" pitchFamily="34" charset="0"/>
+                          <a:cs typeface="Calibri" panose="020F0502020204030204" pitchFamily="34" charset="0"/>
+                        </a:rPr>
+                        <a:t>0.007706</a:t>
+                      </a:r>
                     </a:p>
                   </a:txBody>
                   <a:tcPr anchor="ctr"/>
@@ -9205,11 +10173,14 @@
                     <a:lstStyle/>
                     <a:p>
                       <a:pPr algn="ctr"/>
-                      <a:endParaRPr lang="pt-PT" sz="1400" dirty="0">
-                        <a:latin typeface="Calibri" panose="020F0502020204030204" pitchFamily="34" charset="0"/>
-                        <a:ea typeface="Calibri" panose="020F0502020204030204" pitchFamily="34" charset="0"/>
-                        <a:cs typeface="Calibri" panose="020F0502020204030204" pitchFamily="34" charset="0"/>
-                      </a:endParaRPr>
+                      <a:r>
+                        <a:rPr lang="pt-PT" sz="1400" dirty="0">
+                          <a:latin typeface="Calibri" panose="020F0502020204030204" pitchFamily="34" charset="0"/>
+                          <a:ea typeface="Calibri" panose="020F0502020204030204" pitchFamily="34" charset="0"/>
+                          <a:cs typeface="Calibri" panose="020F0502020204030204" pitchFamily="34" charset="0"/>
+                        </a:rPr>
+                        <a:t>0.299569</a:t>
+                      </a:r>
                     </a:p>
                   </a:txBody>
                   <a:tcPr anchor="ctr"/>
@@ -9219,12 +10190,49 @@
                     <a:bodyPr/>
                     <a:lstStyle/>
                     <a:p>
+                      <a:pPr marL="0" marR="0" lvl="0" indent="0" algn="ctr" defTabSz="914400" rtl="0" eaLnBrk="1" fontAlgn="auto" latinLnBrk="0" hangingPunct="1">
+                        <a:lnSpc>
+                          <a:spcPct val="100000"/>
+                        </a:lnSpc>
+                        <a:spcBef>
+                          <a:spcPts val="0"/>
+                        </a:spcBef>
+                        <a:spcAft>
+                          <a:spcPts val="0"/>
+                        </a:spcAft>
+                        <a:buClrTx/>
+                        <a:buSzTx/>
+                        <a:buFontTx/>
+                        <a:buNone/>
+                        <a:tabLst/>
+                        <a:defRPr/>
+                      </a:pPr>
+                      <a:r>
+                        <a:rPr lang="pt-PT" sz="1400" dirty="0">
+                          <a:latin typeface="Calibri" panose="020F0502020204030204" pitchFamily="34" charset="0"/>
+                          <a:ea typeface="Calibri" panose="020F0502020204030204" pitchFamily="34" charset="0"/>
+                          <a:cs typeface="Calibri" panose="020F0502020204030204" pitchFamily="34" charset="0"/>
+                        </a:rPr>
+                        <a:t>0.030652</a:t>
+                      </a:r>
+                    </a:p>
+                  </a:txBody>
+                  <a:tcPr anchor="ctr"/>
+                </a:tc>
+                <a:tc>
+                  <a:txBody>
+                    <a:bodyPr/>
+                    <a:lstStyle/>
+                    <a:p>
                       <a:pPr algn="ctr"/>
-                      <a:endParaRPr lang="pt-PT" sz="1400" dirty="0">
-                        <a:latin typeface="Calibri" panose="020F0502020204030204" pitchFamily="34" charset="0"/>
-                        <a:ea typeface="Calibri" panose="020F0502020204030204" pitchFamily="34" charset="0"/>
-                        <a:cs typeface="Calibri" panose="020F0502020204030204" pitchFamily="34" charset="0"/>
-                      </a:endParaRPr>
+                      <a:r>
+                        <a:rPr lang="pt-PT" sz="1400" dirty="0">
+                          <a:latin typeface="Calibri" panose="020F0502020204030204" pitchFamily="34" charset="0"/>
+                          <a:ea typeface="Calibri" panose="020F0502020204030204" pitchFamily="34" charset="0"/>
+                          <a:cs typeface="Calibri" panose="020F0502020204030204" pitchFamily="34" charset="0"/>
+                        </a:rPr>
+                        <a:t>0.270263</a:t>
+                      </a:r>
                     </a:p>
                   </a:txBody>
                   <a:tcPr anchor="ctr"/>
@@ -9234,12 +10242,49 @@
                     <a:bodyPr/>
                     <a:lstStyle/>
                     <a:p>
+                      <a:pPr marL="0" marR="0" lvl="0" indent="0" algn="ctr" defTabSz="914400" rtl="0" eaLnBrk="1" fontAlgn="auto" latinLnBrk="0" hangingPunct="1">
+                        <a:lnSpc>
+                          <a:spcPct val="100000"/>
+                        </a:lnSpc>
+                        <a:spcBef>
+                          <a:spcPts val="0"/>
+                        </a:spcBef>
+                        <a:spcAft>
+                          <a:spcPts val="0"/>
+                        </a:spcAft>
+                        <a:buClrTx/>
+                        <a:buSzTx/>
+                        <a:buFontTx/>
+                        <a:buNone/>
+                        <a:tabLst/>
+                        <a:defRPr/>
+                      </a:pPr>
+                      <a:r>
+                        <a:rPr lang="pt-PT" sz="1400" dirty="0">
+                          <a:latin typeface="Calibri" panose="020F0502020204030204" pitchFamily="34" charset="0"/>
+                          <a:ea typeface="Calibri" panose="020F0502020204030204" pitchFamily="34" charset="0"/>
+                          <a:cs typeface="Calibri" panose="020F0502020204030204" pitchFamily="34" charset="0"/>
+                        </a:rPr>
+                        <a:t>0.023774</a:t>
+                      </a:r>
+                    </a:p>
+                  </a:txBody>
+                  <a:tcPr anchor="ctr"/>
+                </a:tc>
+                <a:tc>
+                  <a:txBody>
+                    <a:bodyPr/>
+                    <a:lstStyle/>
+                    <a:p>
                       <a:pPr algn="ctr"/>
-                      <a:endParaRPr lang="pt-PT" sz="1400" dirty="0">
-                        <a:latin typeface="Calibri" panose="020F0502020204030204" pitchFamily="34" charset="0"/>
-                        <a:ea typeface="Calibri" panose="020F0502020204030204" pitchFamily="34" charset="0"/>
-                        <a:cs typeface="Calibri" panose="020F0502020204030204" pitchFamily="34" charset="0"/>
-                      </a:endParaRPr>
+                      <a:r>
+                        <a:rPr lang="pt-PT" sz="1400" dirty="0">
+                          <a:latin typeface="Calibri" panose="020F0502020204030204" pitchFamily="34" charset="0"/>
+                          <a:ea typeface="Calibri" panose="020F0502020204030204" pitchFamily="34" charset="0"/>
+                          <a:cs typeface="Calibri" panose="020F0502020204030204" pitchFamily="34" charset="0"/>
+                        </a:rPr>
+                        <a:t>0.254095</a:t>
+                      </a:r>
                     </a:p>
                   </a:txBody>
                   <a:tcPr anchor="ctr"/>
@@ -9249,12 +10294,49 @@
                     <a:bodyPr/>
                     <a:lstStyle/>
                     <a:p>
+                      <a:pPr marL="0" marR="0" lvl="0" indent="0" algn="ctr" defTabSz="914400" rtl="0" eaLnBrk="1" fontAlgn="auto" latinLnBrk="0" hangingPunct="1">
+                        <a:lnSpc>
+                          <a:spcPct val="100000"/>
+                        </a:lnSpc>
+                        <a:spcBef>
+                          <a:spcPts val="0"/>
+                        </a:spcBef>
+                        <a:spcAft>
+                          <a:spcPts val="0"/>
+                        </a:spcAft>
+                        <a:buClrTx/>
+                        <a:buSzTx/>
+                        <a:buFontTx/>
+                        <a:buNone/>
+                        <a:tabLst/>
+                        <a:defRPr/>
+                      </a:pPr>
+                      <a:r>
+                        <a:rPr lang="pt-PT" sz="1400" dirty="0">
+                          <a:latin typeface="Calibri" panose="020F0502020204030204" pitchFamily="34" charset="0"/>
+                          <a:ea typeface="Calibri" panose="020F0502020204030204" pitchFamily="34" charset="0"/>
+                          <a:cs typeface="Calibri" panose="020F0502020204030204" pitchFamily="34" charset="0"/>
+                        </a:rPr>
+                        <a:t>0.028820</a:t>
+                      </a:r>
+                    </a:p>
+                  </a:txBody>
+                  <a:tcPr anchor="ctr"/>
+                </a:tc>
+                <a:tc>
+                  <a:txBody>
+                    <a:bodyPr/>
+                    <a:lstStyle/>
+                    <a:p>
                       <a:pPr algn="ctr"/>
-                      <a:endParaRPr lang="pt-PT" sz="1400" dirty="0">
-                        <a:latin typeface="Calibri" panose="020F0502020204030204" pitchFamily="34" charset="0"/>
-                        <a:ea typeface="Calibri" panose="020F0502020204030204" pitchFamily="34" charset="0"/>
-                        <a:cs typeface="Calibri" panose="020F0502020204030204" pitchFamily="34" charset="0"/>
-                      </a:endParaRPr>
+                      <a:r>
+                        <a:rPr lang="pt-PT" sz="1400" dirty="0">
+                          <a:latin typeface="Calibri" panose="020F0502020204030204" pitchFamily="34" charset="0"/>
+                          <a:ea typeface="Calibri" panose="020F0502020204030204" pitchFamily="34" charset="0"/>
+                          <a:cs typeface="Calibri" panose="020F0502020204030204" pitchFamily="34" charset="0"/>
+                        </a:rPr>
+                        <a:t>0.287229</a:t>
+                      </a:r>
                     </a:p>
                   </a:txBody>
                   <a:tcPr anchor="ctr"/>
@@ -9264,57 +10346,31 @@
                     <a:bodyPr/>
                     <a:lstStyle/>
                     <a:p>
-                      <a:pPr algn="ctr"/>
-                      <a:endParaRPr lang="pt-PT" sz="1400" dirty="0">
-                        <a:latin typeface="Calibri" panose="020F0502020204030204" pitchFamily="34" charset="0"/>
-                        <a:ea typeface="Calibri" panose="020F0502020204030204" pitchFamily="34" charset="0"/>
-                        <a:cs typeface="Calibri" panose="020F0502020204030204" pitchFamily="34" charset="0"/>
-                      </a:endParaRPr>
-                    </a:p>
-                  </a:txBody>
-                  <a:tcPr anchor="ctr"/>
-                </a:tc>
-                <a:tc>
-                  <a:txBody>
-                    <a:bodyPr/>
-                    <a:lstStyle/>
-                    <a:p>
-                      <a:pPr algn="ctr"/>
-                      <a:endParaRPr lang="pt-PT" sz="1400" dirty="0">
-                        <a:latin typeface="Calibri" panose="020F0502020204030204" pitchFamily="34" charset="0"/>
-                        <a:ea typeface="Calibri" panose="020F0502020204030204" pitchFamily="34" charset="0"/>
-                        <a:cs typeface="Calibri" panose="020F0502020204030204" pitchFamily="34" charset="0"/>
-                      </a:endParaRPr>
-                    </a:p>
-                  </a:txBody>
-                  <a:tcPr anchor="ctr"/>
-                </a:tc>
-                <a:tc>
-                  <a:txBody>
-                    <a:bodyPr/>
-                    <a:lstStyle/>
-                    <a:p>
-                      <a:pPr algn="ctr"/>
-                      <a:endParaRPr lang="pt-PT" sz="1400" dirty="0">
-                        <a:latin typeface="Calibri" panose="020F0502020204030204" pitchFamily="34" charset="0"/>
-                        <a:ea typeface="Calibri" panose="020F0502020204030204" pitchFamily="34" charset="0"/>
-                        <a:cs typeface="Calibri" panose="020F0502020204030204" pitchFamily="34" charset="0"/>
-                      </a:endParaRPr>
-                    </a:p>
-                  </a:txBody>
-                  <a:tcPr anchor="ctr"/>
-                </a:tc>
-                <a:tc>
-                  <a:txBody>
-                    <a:bodyPr/>
-                    <a:lstStyle/>
-                    <a:p>
-                      <a:pPr algn="ctr"/>
-                      <a:endParaRPr lang="pt-PT" sz="1400" dirty="0">
-                        <a:latin typeface="Calibri" panose="020F0502020204030204" pitchFamily="34" charset="0"/>
-                        <a:ea typeface="Calibri" panose="020F0502020204030204" pitchFamily="34" charset="0"/>
-                        <a:cs typeface="Calibri" panose="020F0502020204030204" pitchFamily="34" charset="0"/>
-                      </a:endParaRPr>
+                      <a:pPr marL="0" marR="0" lvl="0" indent="0" algn="ctr" defTabSz="914400" rtl="0" eaLnBrk="1" fontAlgn="auto" latinLnBrk="0" hangingPunct="1">
+                        <a:lnSpc>
+                          <a:spcPct val="100000"/>
+                        </a:lnSpc>
+                        <a:spcBef>
+                          <a:spcPts val="0"/>
+                        </a:spcBef>
+                        <a:spcAft>
+                          <a:spcPts val="0"/>
+                        </a:spcAft>
+                        <a:buClrTx/>
+                        <a:buSzTx/>
+                        <a:buFontTx/>
+                        <a:buNone/>
+                        <a:tabLst/>
+                        <a:defRPr/>
+                      </a:pPr>
+                      <a:r>
+                        <a:rPr lang="pt-PT" sz="1400" dirty="0">
+                          <a:latin typeface="Calibri" panose="020F0502020204030204" pitchFamily="34" charset="0"/>
+                          <a:ea typeface="Calibri" panose="020F0502020204030204" pitchFamily="34" charset="0"/>
+                          <a:cs typeface="Calibri" panose="020F0502020204030204" pitchFamily="34" charset="0"/>
+                        </a:rPr>
+                        <a:t>0.047620</a:t>
+                      </a:r>
                     </a:p>
                   </a:txBody>
                   <a:tcPr anchor="ctr"/>
@@ -9350,11 +10406,14 @@
                     <a:lstStyle/>
                     <a:p>
                       <a:pPr algn="ctr"/>
-                      <a:endParaRPr lang="pt-PT" sz="1400" dirty="0">
-                        <a:latin typeface="Calibri" panose="020F0502020204030204" pitchFamily="34" charset="0"/>
-                        <a:ea typeface="Calibri" panose="020F0502020204030204" pitchFamily="34" charset="0"/>
-                        <a:cs typeface="Calibri" panose="020F0502020204030204" pitchFamily="34" charset="0"/>
-                      </a:endParaRPr>
+                      <a:r>
+                        <a:rPr lang="pt-PT" sz="1400" dirty="0">
+                          <a:latin typeface="Calibri" panose="020F0502020204030204" pitchFamily="34" charset="0"/>
+                          <a:ea typeface="Calibri" panose="020F0502020204030204" pitchFamily="34" charset="0"/>
+                          <a:cs typeface="Calibri" panose="020F0502020204030204" pitchFamily="34" charset="0"/>
+                        </a:rPr>
+                        <a:t>0.994728</a:t>
+                      </a:r>
                     </a:p>
                   </a:txBody>
                   <a:tcPr anchor="ctr"/>
@@ -9364,12 +10423,49 @@
                     <a:bodyPr/>
                     <a:lstStyle/>
                     <a:p>
+                      <a:pPr marL="0" marR="0" lvl="0" indent="0" algn="ctr" defTabSz="914400" rtl="0" eaLnBrk="1" fontAlgn="auto" latinLnBrk="0" hangingPunct="1">
+                        <a:lnSpc>
+                          <a:spcPct val="100000"/>
+                        </a:lnSpc>
+                        <a:spcBef>
+                          <a:spcPts val="0"/>
+                        </a:spcBef>
+                        <a:spcAft>
+                          <a:spcPts val="0"/>
+                        </a:spcAft>
+                        <a:buClrTx/>
+                        <a:buSzTx/>
+                        <a:buFontTx/>
+                        <a:buNone/>
+                        <a:tabLst/>
+                        <a:defRPr/>
+                      </a:pPr>
+                      <a:r>
+                        <a:rPr lang="pt-PT" sz="1400" dirty="0">
+                          <a:latin typeface="Calibri" panose="020F0502020204030204" pitchFamily="34" charset="0"/>
+                          <a:ea typeface="Calibri" panose="020F0502020204030204" pitchFamily="34" charset="0"/>
+                          <a:cs typeface="Calibri" panose="020F0502020204030204" pitchFamily="34" charset="0"/>
+                        </a:rPr>
+                        <a:t>0.0303520</a:t>
+                      </a:r>
+                    </a:p>
+                  </a:txBody>
+                  <a:tcPr anchor="ctr"/>
+                </a:tc>
+                <a:tc>
+                  <a:txBody>
+                    <a:bodyPr/>
+                    <a:lstStyle/>
+                    <a:p>
                       <a:pPr algn="ctr"/>
-                      <a:endParaRPr lang="pt-PT" sz="1400" dirty="0">
-                        <a:latin typeface="Calibri" panose="020F0502020204030204" pitchFamily="34" charset="0"/>
-                        <a:ea typeface="Calibri" panose="020F0502020204030204" pitchFamily="34" charset="0"/>
-                        <a:cs typeface="Calibri" panose="020F0502020204030204" pitchFamily="34" charset="0"/>
-                      </a:endParaRPr>
+                      <a:r>
+                        <a:rPr lang="pt-PT" sz="1400" dirty="0">
+                          <a:latin typeface="Calibri" panose="020F0502020204030204" pitchFamily="34" charset="0"/>
+                          <a:ea typeface="Calibri" panose="020F0502020204030204" pitchFamily="34" charset="0"/>
+                          <a:cs typeface="Calibri" panose="020F0502020204030204" pitchFamily="34" charset="0"/>
+                        </a:rPr>
+                        <a:t>0.912594</a:t>
+                      </a:r>
                     </a:p>
                   </a:txBody>
                   <a:tcPr anchor="ctr"/>
@@ -9379,12 +10475,49 @@
                     <a:bodyPr/>
                     <a:lstStyle/>
                     <a:p>
+                      <a:pPr marL="0" marR="0" lvl="0" indent="0" algn="ctr" defTabSz="914400" rtl="0" eaLnBrk="1" fontAlgn="auto" latinLnBrk="0" hangingPunct="1">
+                        <a:lnSpc>
+                          <a:spcPct val="100000"/>
+                        </a:lnSpc>
+                        <a:spcBef>
+                          <a:spcPts val="0"/>
+                        </a:spcBef>
+                        <a:spcAft>
+                          <a:spcPts val="0"/>
+                        </a:spcAft>
+                        <a:buClrTx/>
+                        <a:buSzTx/>
+                        <a:buFontTx/>
+                        <a:buNone/>
+                        <a:tabLst/>
+                        <a:defRPr/>
+                      </a:pPr>
+                      <a:r>
+                        <a:rPr lang="pt-PT" sz="1400" dirty="0">
+                          <a:latin typeface="Calibri" panose="020F0502020204030204" pitchFamily="34" charset="0"/>
+                          <a:ea typeface="Calibri" panose="020F0502020204030204" pitchFamily="34" charset="0"/>
+                          <a:cs typeface="Calibri" panose="020F0502020204030204" pitchFamily="34" charset="0"/>
+                        </a:rPr>
+                        <a:t>0.0615767</a:t>
+                      </a:r>
+                    </a:p>
+                  </a:txBody>
+                  <a:tcPr anchor="ctr"/>
+                </a:tc>
+                <a:tc>
+                  <a:txBody>
+                    <a:bodyPr/>
+                    <a:lstStyle/>
+                    <a:p>
                       <a:pPr algn="ctr"/>
-                      <a:endParaRPr lang="pt-PT" sz="1400" dirty="0">
-                        <a:latin typeface="Calibri" panose="020F0502020204030204" pitchFamily="34" charset="0"/>
-                        <a:ea typeface="Calibri" panose="020F0502020204030204" pitchFamily="34" charset="0"/>
-                        <a:cs typeface="Calibri" panose="020F0502020204030204" pitchFamily="34" charset="0"/>
-                      </a:endParaRPr>
+                      <a:r>
+                        <a:rPr lang="pt-PT" sz="1400" dirty="0">
+                          <a:latin typeface="Calibri" panose="020F0502020204030204" pitchFamily="34" charset="0"/>
+                          <a:ea typeface="Calibri" panose="020F0502020204030204" pitchFamily="34" charset="0"/>
+                          <a:cs typeface="Calibri" panose="020F0502020204030204" pitchFamily="34" charset="0"/>
+                        </a:rPr>
+                        <a:t>0.919737</a:t>
+                      </a:r>
                     </a:p>
                   </a:txBody>
                   <a:tcPr anchor="ctr"/>
@@ -9394,12 +10527,49 @@
                     <a:bodyPr/>
                     <a:lstStyle/>
                     <a:p>
+                      <a:pPr marL="0" marR="0" lvl="0" indent="0" algn="ctr" defTabSz="914400" rtl="0" eaLnBrk="1" fontAlgn="auto" latinLnBrk="0" hangingPunct="1">
+                        <a:lnSpc>
+                          <a:spcPct val="100000"/>
+                        </a:lnSpc>
+                        <a:spcBef>
+                          <a:spcPts val="0"/>
+                        </a:spcBef>
+                        <a:spcAft>
+                          <a:spcPts val="0"/>
+                        </a:spcAft>
+                        <a:buClrTx/>
+                        <a:buSzTx/>
+                        <a:buFontTx/>
+                        <a:buNone/>
+                        <a:tabLst/>
+                        <a:defRPr/>
+                      </a:pPr>
+                      <a:r>
+                        <a:rPr lang="pt-PT" sz="1400" dirty="0">
+                          <a:latin typeface="Calibri" panose="020F0502020204030204" pitchFamily="34" charset="0"/>
+                          <a:ea typeface="Calibri" panose="020F0502020204030204" pitchFamily="34" charset="0"/>
+                          <a:cs typeface="Calibri" panose="020F0502020204030204" pitchFamily="34" charset="0"/>
+                        </a:rPr>
+                        <a:t>0.044286</a:t>
+                      </a:r>
+                    </a:p>
+                  </a:txBody>
+                  <a:tcPr anchor="ctr"/>
+                </a:tc>
+                <a:tc>
+                  <a:txBody>
+                    <a:bodyPr/>
+                    <a:lstStyle/>
+                    <a:p>
                       <a:pPr algn="ctr"/>
-                      <a:endParaRPr lang="pt-PT" sz="1400" dirty="0">
-                        <a:latin typeface="Calibri" panose="020F0502020204030204" pitchFamily="34" charset="0"/>
-                        <a:ea typeface="Calibri" panose="020F0502020204030204" pitchFamily="34" charset="0"/>
-                        <a:cs typeface="Calibri" panose="020F0502020204030204" pitchFamily="34" charset="0"/>
-                      </a:endParaRPr>
+                      <a:r>
+                        <a:rPr lang="pt-PT" sz="1400" dirty="0">
+                          <a:latin typeface="Calibri" panose="020F0502020204030204" pitchFamily="34" charset="0"/>
+                          <a:ea typeface="Calibri" panose="020F0502020204030204" pitchFamily="34" charset="0"/>
+                          <a:cs typeface="Calibri" panose="020F0502020204030204" pitchFamily="34" charset="0"/>
+                        </a:rPr>
+                        <a:t>0.943953</a:t>
+                      </a:r>
                     </a:p>
                   </a:txBody>
                   <a:tcPr anchor="ctr"/>
@@ -9409,57 +10579,31 @@
                     <a:bodyPr/>
                     <a:lstStyle/>
                     <a:p>
-                      <a:pPr algn="ctr"/>
-                      <a:endParaRPr lang="pt-PT" sz="1400" dirty="0">
-                        <a:latin typeface="Calibri" panose="020F0502020204030204" pitchFamily="34" charset="0"/>
-                        <a:ea typeface="Calibri" panose="020F0502020204030204" pitchFamily="34" charset="0"/>
-                        <a:cs typeface="Calibri" panose="020F0502020204030204" pitchFamily="34" charset="0"/>
-                      </a:endParaRPr>
-                    </a:p>
-                  </a:txBody>
-                  <a:tcPr anchor="ctr"/>
-                </a:tc>
-                <a:tc>
-                  <a:txBody>
-                    <a:bodyPr/>
-                    <a:lstStyle/>
-                    <a:p>
-                      <a:pPr algn="ctr"/>
-                      <a:endParaRPr lang="pt-PT" sz="1400" dirty="0">
-                        <a:latin typeface="Calibri" panose="020F0502020204030204" pitchFamily="34" charset="0"/>
-                        <a:ea typeface="Calibri" panose="020F0502020204030204" pitchFamily="34" charset="0"/>
-                        <a:cs typeface="Calibri" panose="020F0502020204030204" pitchFamily="34" charset="0"/>
-                      </a:endParaRPr>
-                    </a:p>
-                  </a:txBody>
-                  <a:tcPr anchor="ctr"/>
-                </a:tc>
-                <a:tc>
-                  <a:txBody>
-                    <a:bodyPr/>
-                    <a:lstStyle/>
-                    <a:p>
-                      <a:pPr algn="ctr"/>
-                      <a:endParaRPr lang="pt-PT" sz="1400" dirty="0">
-                        <a:latin typeface="Calibri" panose="020F0502020204030204" pitchFamily="34" charset="0"/>
-                        <a:ea typeface="Calibri" panose="020F0502020204030204" pitchFamily="34" charset="0"/>
-                        <a:cs typeface="Calibri" panose="020F0502020204030204" pitchFamily="34" charset="0"/>
-                      </a:endParaRPr>
-                    </a:p>
-                  </a:txBody>
-                  <a:tcPr anchor="ctr"/>
-                </a:tc>
-                <a:tc>
-                  <a:txBody>
-                    <a:bodyPr/>
-                    <a:lstStyle/>
-                    <a:p>
-                      <a:pPr algn="ctr"/>
-                      <a:endParaRPr lang="pt-PT" sz="1400" dirty="0">
-                        <a:latin typeface="Calibri" panose="020F0502020204030204" pitchFamily="34" charset="0"/>
-                        <a:ea typeface="Calibri" panose="020F0502020204030204" pitchFamily="34" charset="0"/>
-                        <a:cs typeface="Calibri" panose="020F0502020204030204" pitchFamily="34" charset="0"/>
-                      </a:endParaRPr>
+                      <a:pPr marL="0" marR="0" lvl="0" indent="0" algn="ctr" defTabSz="914400" rtl="0" eaLnBrk="1" fontAlgn="auto" latinLnBrk="0" hangingPunct="1">
+                        <a:lnSpc>
+                          <a:spcPct val="100000"/>
+                        </a:lnSpc>
+                        <a:spcBef>
+                          <a:spcPts val="0"/>
+                        </a:spcBef>
+                        <a:spcAft>
+                          <a:spcPts val="0"/>
+                        </a:spcAft>
+                        <a:buClrTx/>
+                        <a:buSzTx/>
+                        <a:buFontTx/>
+                        <a:buNone/>
+                        <a:tabLst/>
+                        <a:defRPr/>
+                      </a:pPr>
+                      <a:r>
+                        <a:rPr lang="pt-PT" sz="1400" dirty="0">
+                          <a:latin typeface="Calibri" panose="020F0502020204030204" pitchFamily="34" charset="0"/>
+                          <a:ea typeface="Calibri" panose="020F0502020204030204" pitchFamily="34" charset="0"/>
+                          <a:cs typeface="Calibri" panose="020F0502020204030204" pitchFamily="34" charset="0"/>
+                        </a:rPr>
+                        <a:t>0.0380660</a:t>
+                      </a:r>
                     </a:p>
                   </a:txBody>
                   <a:tcPr anchor="ctr"/>
@@ -9495,11 +10639,14 @@
                     <a:lstStyle/>
                     <a:p>
                       <a:pPr algn="ctr"/>
-                      <a:endParaRPr lang="pt-PT" sz="1400" dirty="0">
-                        <a:latin typeface="Calibri" panose="020F0502020204030204" pitchFamily="34" charset="0"/>
-                        <a:ea typeface="Calibri" panose="020F0502020204030204" pitchFamily="34" charset="0"/>
-                        <a:cs typeface="Calibri" panose="020F0502020204030204" pitchFamily="34" charset="0"/>
-                      </a:endParaRPr>
+                      <a:r>
+                        <a:rPr lang="pt-PT" sz="1400" dirty="0">
+                          <a:latin typeface="Calibri" panose="020F0502020204030204" pitchFamily="34" charset="0"/>
+                          <a:ea typeface="Calibri" panose="020F0502020204030204" pitchFamily="34" charset="0"/>
+                          <a:cs typeface="Calibri" panose="020F0502020204030204" pitchFamily="34" charset="0"/>
+                        </a:rPr>
+                        <a:t>16.101655</a:t>
+                      </a:r>
                     </a:p>
                   </a:txBody>
                   <a:tcPr anchor="ctr"/>
@@ -9509,12 +10656,49 @@
                     <a:bodyPr/>
                     <a:lstStyle/>
                     <a:p>
+                      <a:pPr marL="0" marR="0" lvl="0" indent="0" algn="ctr" defTabSz="914400" rtl="0" eaLnBrk="1" fontAlgn="auto" latinLnBrk="0" hangingPunct="1">
+                        <a:lnSpc>
+                          <a:spcPct val="100000"/>
+                        </a:lnSpc>
+                        <a:spcBef>
+                          <a:spcPts val="0"/>
+                        </a:spcBef>
+                        <a:spcAft>
+                          <a:spcPts val="0"/>
+                        </a:spcAft>
+                        <a:buClrTx/>
+                        <a:buSzTx/>
+                        <a:buFontTx/>
+                        <a:buNone/>
+                        <a:tabLst/>
+                        <a:defRPr/>
+                      </a:pPr>
+                      <a:r>
+                        <a:rPr lang="pt-PT" sz="1400" dirty="0">
+                          <a:latin typeface="Calibri" panose="020F0502020204030204" pitchFamily="34" charset="0"/>
+                          <a:ea typeface="Calibri" panose="020F0502020204030204" pitchFamily="34" charset="0"/>
+                          <a:cs typeface="Calibri" panose="020F0502020204030204" pitchFamily="34" charset="0"/>
+                        </a:rPr>
+                        <a:t>0.178125</a:t>
+                      </a:r>
+                    </a:p>
+                  </a:txBody>
+                  <a:tcPr anchor="ctr"/>
+                </a:tc>
+                <a:tc>
+                  <a:txBody>
+                    <a:bodyPr/>
+                    <a:lstStyle/>
+                    <a:p>
                       <a:pPr algn="ctr"/>
-                      <a:endParaRPr lang="pt-PT" sz="1400" dirty="0">
-                        <a:latin typeface="Calibri" panose="020F0502020204030204" pitchFamily="34" charset="0"/>
-                        <a:ea typeface="Calibri" panose="020F0502020204030204" pitchFamily="34" charset="0"/>
-                        <a:cs typeface="Calibri" panose="020F0502020204030204" pitchFamily="34" charset="0"/>
-                      </a:endParaRPr>
+                      <a:r>
+                        <a:rPr lang="pt-PT" sz="1400" dirty="0">
+                          <a:latin typeface="Calibri" panose="020F0502020204030204" pitchFamily="34" charset="0"/>
+                          <a:ea typeface="Calibri" panose="020F0502020204030204" pitchFamily="34" charset="0"/>
+                          <a:cs typeface="Calibri" panose="020F0502020204030204" pitchFamily="34" charset="0"/>
+                        </a:rPr>
+                        <a:t>12.858210</a:t>
+                      </a:r>
                     </a:p>
                   </a:txBody>
                   <a:tcPr anchor="ctr"/>
@@ -9524,12 +10708,49 @@
                     <a:bodyPr/>
                     <a:lstStyle/>
                     <a:p>
+                      <a:pPr marL="0" marR="0" lvl="0" indent="0" algn="ctr" defTabSz="914400" rtl="0" eaLnBrk="1" fontAlgn="auto" latinLnBrk="0" hangingPunct="1">
+                        <a:lnSpc>
+                          <a:spcPct val="100000"/>
+                        </a:lnSpc>
+                        <a:spcBef>
+                          <a:spcPts val="0"/>
+                        </a:spcBef>
+                        <a:spcAft>
+                          <a:spcPts val="0"/>
+                        </a:spcAft>
+                        <a:buClrTx/>
+                        <a:buSzTx/>
+                        <a:buFontTx/>
+                        <a:buNone/>
+                        <a:tabLst/>
+                        <a:defRPr/>
+                      </a:pPr>
+                      <a:r>
+                        <a:rPr lang="pt-PT" sz="1400" dirty="0">
+                          <a:latin typeface="Calibri" panose="020F0502020204030204" pitchFamily="34" charset="0"/>
+                          <a:ea typeface="Calibri" panose="020F0502020204030204" pitchFamily="34" charset="0"/>
+                          <a:cs typeface="Calibri" panose="020F0502020204030204" pitchFamily="34" charset="0"/>
+                        </a:rPr>
+                        <a:t>0.186560</a:t>
+                      </a:r>
+                    </a:p>
+                  </a:txBody>
+                  <a:tcPr anchor="ctr"/>
+                </a:tc>
+                <a:tc>
+                  <a:txBody>
+                    <a:bodyPr/>
+                    <a:lstStyle/>
+                    <a:p>
                       <a:pPr algn="ctr"/>
-                      <a:endParaRPr lang="pt-PT" sz="1400" dirty="0">
-                        <a:latin typeface="Calibri" panose="020F0502020204030204" pitchFamily="34" charset="0"/>
-                        <a:ea typeface="Calibri" panose="020F0502020204030204" pitchFamily="34" charset="0"/>
-                        <a:cs typeface="Calibri" panose="020F0502020204030204" pitchFamily="34" charset="0"/>
-                      </a:endParaRPr>
+                      <a:r>
+                        <a:rPr lang="pt-PT" sz="1400" dirty="0">
+                          <a:latin typeface="Calibri" panose="020F0502020204030204" pitchFamily="34" charset="0"/>
+                          <a:ea typeface="Calibri" panose="020F0502020204030204" pitchFamily="34" charset="0"/>
+                          <a:cs typeface="Calibri" panose="020F0502020204030204" pitchFamily="34" charset="0"/>
+                        </a:rPr>
+                        <a:t>12.686568</a:t>
+                      </a:r>
                     </a:p>
                   </a:txBody>
                   <a:tcPr anchor="ctr"/>
@@ -9539,12 +10760,49 @@
                     <a:bodyPr/>
                     <a:lstStyle/>
                     <a:p>
+                      <a:pPr marL="0" marR="0" lvl="0" indent="0" algn="ctr" defTabSz="914400" rtl="0" eaLnBrk="1" fontAlgn="auto" latinLnBrk="0" hangingPunct="1">
+                        <a:lnSpc>
+                          <a:spcPct val="100000"/>
+                        </a:lnSpc>
+                        <a:spcBef>
+                          <a:spcPts val="0"/>
+                        </a:spcBef>
+                        <a:spcAft>
+                          <a:spcPts val="0"/>
+                        </a:spcAft>
+                        <a:buClrTx/>
+                        <a:buSzTx/>
+                        <a:buFontTx/>
+                        <a:buNone/>
+                        <a:tabLst/>
+                        <a:defRPr/>
+                      </a:pPr>
+                      <a:r>
+                        <a:rPr lang="pt-PT" sz="1400" dirty="0">
+                          <a:latin typeface="Calibri" panose="020F0502020204030204" pitchFamily="34" charset="0"/>
+                          <a:ea typeface="Calibri" panose="020F0502020204030204" pitchFamily="34" charset="0"/>
+                          <a:cs typeface="Calibri" panose="020F0502020204030204" pitchFamily="34" charset="0"/>
+                        </a:rPr>
+                        <a:t>0.281215</a:t>
+                      </a:r>
+                    </a:p>
+                  </a:txBody>
+                  <a:tcPr anchor="ctr"/>
+                </a:tc>
+                <a:tc>
+                  <a:txBody>
+                    <a:bodyPr/>
+                    <a:lstStyle/>
+                    <a:p>
                       <a:pPr algn="ctr"/>
-                      <a:endParaRPr lang="pt-PT" sz="1400" dirty="0">
-                        <a:latin typeface="Calibri" panose="020F0502020204030204" pitchFamily="34" charset="0"/>
-                        <a:ea typeface="Calibri" panose="020F0502020204030204" pitchFamily="34" charset="0"/>
-                        <a:cs typeface="Calibri" panose="020F0502020204030204" pitchFamily="34" charset="0"/>
-                      </a:endParaRPr>
+                      <a:r>
+                        <a:rPr lang="pt-PT" sz="1400" dirty="0">
+                          <a:latin typeface="Calibri" panose="020F0502020204030204" pitchFamily="34" charset="0"/>
+                          <a:ea typeface="Calibri" panose="020F0502020204030204" pitchFamily="34" charset="0"/>
+                          <a:cs typeface="Calibri" panose="020F0502020204030204" pitchFamily="34" charset="0"/>
+                        </a:rPr>
+                        <a:t>12.424148</a:t>
+                      </a:r>
                     </a:p>
                   </a:txBody>
                   <a:tcPr anchor="ctr"/>
@@ -9554,57 +10812,31 @@
                     <a:bodyPr/>
                     <a:lstStyle/>
                     <a:p>
-                      <a:pPr algn="ctr"/>
-                      <a:endParaRPr lang="pt-PT" sz="1400" dirty="0">
-                        <a:latin typeface="Calibri" panose="020F0502020204030204" pitchFamily="34" charset="0"/>
-                        <a:ea typeface="Calibri" panose="020F0502020204030204" pitchFamily="34" charset="0"/>
-                        <a:cs typeface="Calibri" panose="020F0502020204030204" pitchFamily="34" charset="0"/>
-                      </a:endParaRPr>
-                    </a:p>
-                  </a:txBody>
-                  <a:tcPr anchor="ctr"/>
-                </a:tc>
-                <a:tc>
-                  <a:txBody>
-                    <a:bodyPr/>
-                    <a:lstStyle/>
-                    <a:p>
-                      <a:pPr algn="ctr"/>
-                      <a:endParaRPr lang="pt-PT" sz="1400" dirty="0">
-                        <a:latin typeface="Calibri" panose="020F0502020204030204" pitchFamily="34" charset="0"/>
-                        <a:ea typeface="Calibri" panose="020F0502020204030204" pitchFamily="34" charset="0"/>
-                        <a:cs typeface="Calibri" panose="020F0502020204030204" pitchFamily="34" charset="0"/>
-                      </a:endParaRPr>
-                    </a:p>
-                  </a:txBody>
-                  <a:tcPr anchor="ctr"/>
-                </a:tc>
-                <a:tc>
-                  <a:txBody>
-                    <a:bodyPr/>
-                    <a:lstStyle/>
-                    <a:p>
-                      <a:pPr algn="ctr"/>
-                      <a:endParaRPr lang="pt-PT" sz="1400" dirty="0">
-                        <a:latin typeface="Calibri" panose="020F0502020204030204" pitchFamily="34" charset="0"/>
-                        <a:ea typeface="Calibri" panose="020F0502020204030204" pitchFamily="34" charset="0"/>
-                        <a:cs typeface="Calibri" panose="020F0502020204030204" pitchFamily="34" charset="0"/>
-                      </a:endParaRPr>
-                    </a:p>
-                  </a:txBody>
-                  <a:tcPr anchor="ctr"/>
-                </a:tc>
-                <a:tc>
-                  <a:txBody>
-                    <a:bodyPr/>
-                    <a:lstStyle/>
-                    <a:p>
-                      <a:pPr algn="ctr"/>
-                      <a:endParaRPr lang="pt-PT" sz="1400" dirty="0">
-                        <a:latin typeface="Calibri" panose="020F0502020204030204" pitchFamily="34" charset="0"/>
-                        <a:ea typeface="Calibri" panose="020F0502020204030204" pitchFamily="34" charset="0"/>
-                        <a:cs typeface="Calibri" panose="020F0502020204030204" pitchFamily="34" charset="0"/>
-                      </a:endParaRPr>
+                      <a:pPr marL="0" marR="0" lvl="0" indent="0" algn="ctr" defTabSz="914400" rtl="0" eaLnBrk="1" fontAlgn="auto" latinLnBrk="0" hangingPunct="1">
+                        <a:lnSpc>
+                          <a:spcPct val="100000"/>
+                        </a:lnSpc>
+                        <a:spcBef>
+                          <a:spcPts val="0"/>
+                        </a:spcBef>
+                        <a:spcAft>
+                          <a:spcPts val="0"/>
+                        </a:spcAft>
+                        <a:buClrTx/>
+                        <a:buSzTx/>
+                        <a:buFontTx/>
+                        <a:buNone/>
+                        <a:tabLst/>
+                        <a:defRPr/>
+                      </a:pPr>
+                      <a:r>
+                        <a:rPr lang="pt-PT" sz="1400" dirty="0">
+                          <a:latin typeface="Calibri" panose="020F0502020204030204" pitchFamily="34" charset="0"/>
+                          <a:ea typeface="Calibri" panose="020F0502020204030204" pitchFamily="34" charset="0"/>
+                          <a:cs typeface="Calibri" panose="020F0502020204030204" pitchFamily="34" charset="0"/>
+                        </a:rPr>
+                        <a:t>0.316890</a:t>
+                      </a:r>
                     </a:p>
                   </a:txBody>
                   <a:tcPr anchor="ctr"/>
@@ -9633,7 +10865,7 @@
         </p:nvSpPr>
         <p:spPr>
           <a:xfrm>
-            <a:off x="0" y="1289985"/>
+            <a:off x="151321" y="2141284"/>
             <a:ext cx="1297482" cy="646331"/>
           </a:xfrm>
           <a:prstGeom prst="rect">
@@ -9688,7 +10920,7 @@
         </p:nvSpPr>
         <p:spPr>
           <a:xfrm>
-            <a:off x="1079" y="4070385"/>
+            <a:off x="152400" y="4921684"/>
             <a:ext cx="1297482" cy="646331"/>
           </a:xfrm>
           <a:prstGeom prst="rect">
@@ -9763,7 +10995,7 @@
         </p:nvSpPr>
         <p:spPr>
           <a:xfrm>
-            <a:off x="1451579" y="1039907"/>
+            <a:off x="995172" y="900652"/>
             <a:ext cx="9603275" cy="813848"/>
           </a:xfrm>
         </p:spPr>

</xml_diff>

<commit_message>
deti logo in presentation
</commit_message>
<xml_diff>
--- a/CLE1_T3G5/present.pptx
+++ b/CLE1_T3G5/present.pptx
@@ -286,7 +286,7 @@
           <a:p>
             <a:fld id="{65E3D7AB-6C06-41C6-99AC-C74008AD09CE}" type="datetimeFigureOut">
               <a:rPr lang="pt-PT" smtClean="0"/>
-              <a:t>22/03/2023</a:t>
+              <a:t>23/03/2023</a:t>
             </a:fld>
             <a:endParaRPr lang="pt-PT"/>
           </a:p>
@@ -514,7 +514,7 @@
           <a:p>
             <a:fld id="{65E3D7AB-6C06-41C6-99AC-C74008AD09CE}" type="datetimeFigureOut">
               <a:rPr lang="pt-PT" smtClean="0"/>
-              <a:t>22/03/2023</a:t>
+              <a:t>23/03/2023</a:t>
             </a:fld>
             <a:endParaRPr lang="pt-PT"/>
           </a:p>
@@ -694,7 +694,7 @@
           <a:p>
             <a:fld id="{65E3D7AB-6C06-41C6-99AC-C74008AD09CE}" type="datetimeFigureOut">
               <a:rPr lang="pt-PT" smtClean="0"/>
-              <a:t>22/03/2023</a:t>
+              <a:t>23/03/2023</a:t>
             </a:fld>
             <a:endParaRPr lang="pt-PT"/>
           </a:p>
@@ -864,7 +864,7 @@
           <a:p>
             <a:fld id="{65E3D7AB-6C06-41C6-99AC-C74008AD09CE}" type="datetimeFigureOut">
               <a:rPr lang="pt-PT" smtClean="0"/>
-              <a:t>22/03/2023</a:t>
+              <a:t>23/03/2023</a:t>
             </a:fld>
             <a:endParaRPr lang="pt-PT"/>
           </a:p>
@@ -1118,7 +1118,7 @@
           <a:p>
             <a:fld id="{65E3D7AB-6C06-41C6-99AC-C74008AD09CE}" type="datetimeFigureOut">
               <a:rPr lang="pt-PT" smtClean="0"/>
-              <a:t>22/03/2023</a:t>
+              <a:t>23/03/2023</a:t>
             </a:fld>
             <a:endParaRPr lang="pt-PT"/>
           </a:p>
@@ -1444,7 +1444,7 @@
           <a:p>
             <a:fld id="{65E3D7AB-6C06-41C6-99AC-C74008AD09CE}" type="datetimeFigureOut">
               <a:rPr lang="pt-PT" smtClean="0"/>
-              <a:t>22/03/2023</a:t>
+              <a:t>23/03/2023</a:t>
             </a:fld>
             <a:endParaRPr lang="pt-PT"/>
           </a:p>
@@ -1895,7 +1895,7 @@
           <a:p>
             <a:fld id="{65E3D7AB-6C06-41C6-99AC-C74008AD09CE}" type="datetimeFigureOut">
               <a:rPr lang="pt-PT" smtClean="0"/>
-              <a:t>22/03/2023</a:t>
+              <a:t>23/03/2023</a:t>
             </a:fld>
             <a:endParaRPr lang="pt-PT"/>
           </a:p>
@@ -2013,7 +2013,7 @@
           <a:p>
             <a:fld id="{65E3D7AB-6C06-41C6-99AC-C74008AD09CE}" type="datetimeFigureOut">
               <a:rPr lang="pt-PT" smtClean="0"/>
-              <a:t>22/03/2023</a:t>
+              <a:t>23/03/2023</a:t>
             </a:fld>
             <a:endParaRPr lang="pt-PT"/>
           </a:p>
@@ -2108,7 +2108,7 @@
           <a:p>
             <a:fld id="{65E3D7AB-6C06-41C6-99AC-C74008AD09CE}" type="datetimeFigureOut">
               <a:rPr lang="pt-PT" smtClean="0"/>
-              <a:t>22/03/2023</a:t>
+              <a:t>23/03/2023</a:t>
             </a:fld>
             <a:endParaRPr lang="pt-PT"/>
           </a:p>
@@ -2395,7 +2395,7 @@
           <a:p>
             <a:fld id="{65E3D7AB-6C06-41C6-99AC-C74008AD09CE}" type="datetimeFigureOut">
               <a:rPr lang="pt-PT" smtClean="0"/>
-              <a:t>22/03/2023</a:t>
+              <a:t>23/03/2023</a:t>
             </a:fld>
             <a:endParaRPr lang="pt-PT"/>
           </a:p>
@@ -2717,7 +2717,7 @@
           <a:p>
             <a:fld id="{65E3D7AB-6C06-41C6-99AC-C74008AD09CE}" type="datetimeFigureOut">
               <a:rPr lang="pt-PT" smtClean="0"/>
-              <a:t>22/03/2023</a:t>
+              <a:t>23/03/2023</a:t>
             </a:fld>
             <a:endParaRPr lang="pt-PT"/>
           </a:p>
@@ -2971,7 +2971,7 @@
           <a:p>
             <a:fld id="{65E3D7AB-6C06-41C6-99AC-C74008AD09CE}" type="datetimeFigureOut">
               <a:rPr lang="pt-PT" smtClean="0"/>
-              <a:t>22/03/2023</a:t>
+              <a:t>23/03/2023</a:t>
             </a:fld>
             <a:endParaRPr lang="pt-PT"/>
           </a:p>
@@ -3543,6 +3543,66 @@
           </a:p>
         </p:txBody>
       </p:sp>
+      <p:pic>
+        <p:nvPicPr>
+          <p:cNvPr id="1028" name="Picture 4" descr="Mestrado em Engenharia Informática - DETI | UA">
+            <a:extLst>
+              <a:ext uri="{FF2B5EF4-FFF2-40B4-BE49-F238E27FC236}">
+                <a16:creationId xmlns:a16="http://schemas.microsoft.com/office/drawing/2014/main" id="{39F91E5E-0695-43A9-986F-B551523EDC36}"/>
+              </a:ext>
+            </a:extLst>
+          </p:cNvPr>
+          <p:cNvPicPr>
+            <a:picLocks noChangeAspect="1" noChangeArrowheads="1"/>
+          </p:cNvPicPr>
+          <p:nvPr/>
+        </p:nvPicPr>
+        <p:blipFill>
+          <a:blip r:embed="rId2">
+            <a:extLst>
+              <a:ext uri="{28A0092B-C50C-407E-A947-70E740481C1C}">
+                <a14:useLocalDpi xmlns:a14="http://schemas.microsoft.com/office/drawing/2010/main" val="0"/>
+              </a:ext>
+            </a:extLst>
+          </a:blip>
+          <a:srcRect/>
+          <a:stretch>
+            <a:fillRect/>
+          </a:stretch>
+        </p:blipFill>
+        <p:spPr bwMode="auto">
+          <a:xfrm>
+            <a:off x="1261872" y="758952"/>
+            <a:ext cx="5038725" cy="904875"/>
+          </a:xfrm>
+          <a:prstGeom prst="rect">
+            <a:avLst/>
+          </a:prstGeom>
+          <a:ln w="38100" cap="sq">
+            <a:solidFill>
+              <a:srgbClr val="000000"/>
+            </a:solidFill>
+            <a:prstDash val="solid"/>
+            <a:miter lim="800000"/>
+          </a:ln>
+          <a:effectLst>
+            <a:outerShdw blurRad="50800" dist="38100" dir="2700000" algn="tl" rotWithShape="0">
+              <a:srgbClr val="000000">
+                <a:alpha val="43000"/>
+              </a:srgbClr>
+            </a:outerShdw>
+          </a:effectLst>
+          <a:extLst>
+            <a:ext uri="{909E8E84-426E-40DD-AFC4-6F175D3DCCD1}">
+              <a14:hiddenFill xmlns:a14="http://schemas.microsoft.com/office/drawing/2010/main">
+                <a:solidFill>
+                  <a:srgbClr val="FFFFFF"/>
+                </a:solidFill>
+              </a14:hiddenFill>
+            </a:ext>
+          </a:extLst>
+        </p:spPr>
+      </p:pic>
     </p:spTree>
     <p:extLst>
       <p:ext uri="{BB962C8B-B14F-4D97-AF65-F5344CB8AC3E}">

</xml_diff>

<commit_message>
added submission zip file
</commit_message>
<xml_diff>
--- a/CLE1_T3G5/present.pptx
+++ b/CLE1_T3G5/present.pptx
@@ -3533,12 +3533,20 @@
           </a:p>
           <a:p>
             <a:r>
+              <a:rPr lang="pt-PT">
+                <a:latin typeface="Calibri" panose="020F0502020204030204" pitchFamily="34" charset="0"/>
+                <a:ea typeface="Calibri" panose="020F0502020204030204" pitchFamily="34" charset="0"/>
+                <a:cs typeface="Calibri" panose="020F0502020204030204" pitchFamily="34" charset="0"/>
+              </a:rPr>
+              <a:t>Luís Batista</a:t>
+            </a:r>
+            <a:r>
               <a:rPr lang="pt-PT" dirty="0">
                 <a:latin typeface="Calibri" panose="020F0502020204030204" pitchFamily="34" charset="0"/>
                 <a:ea typeface="Calibri" panose="020F0502020204030204" pitchFamily="34" charset="0"/>
                 <a:cs typeface="Calibri" panose="020F0502020204030204" pitchFamily="34" charset="0"/>
               </a:rPr>
-              <a:t>Luís batista, nº 115279</a:t>
+              <a:t>, nº 115279</a:t>
             </a:r>
           </a:p>
         </p:txBody>

</xml_diff>